<commit_message>
Some work done on methods
Can't get much more done until we have actual results
</commit_message>
<xml_diff>
--- a/nBodyPoster.pptx
+++ b/nBodyPoster.pptx
@@ -53,7 +53,7 @@
       </p:grpSpPr>
       <p:sp>
         <p:nvSpPr>
-          <p:cNvPr id="24" name="PlaceHolder 1"/>
+          <p:cNvPr id="23" name="PlaceHolder 1"/>
           <p:cNvSpPr>
             <a:spLocks noGrp="1"/>
           </p:cNvSpPr>
@@ -64,7 +64,7 @@
         <p:spPr>
           <a:xfrm>
             <a:off x="2346840" y="3686040"/>
-            <a:ext cx="28224720" cy="7400520"/>
+            <a:ext cx="28224000" cy="7399800"/>
           </a:xfrm>
           <a:prstGeom prst="rect">
             <a:avLst/>
@@ -74,18 +74,15 @@
           <a:bodyPr lIns="0" rIns="0" tIns="0" bIns="0" anchor="ctr"/>
           <a:p>
             <a:pPr algn="ctr"/>
-            <a:endParaRPr b="0" lang="en-US" sz="9160" spc="-1" strike="noStrike">
-              <a:solidFill>
-                <a:srgbClr val="000000"/>
-              </a:solidFill>
-              <a:latin typeface="Gill Sans"/>
-            </a:endParaRPr>
-          </a:p>
-        </p:txBody>
-      </p:sp>
-      <p:sp>
-        <p:nvSpPr>
-          <p:cNvPr id="25" name="PlaceHolder 2"/>
+            <a:endParaRPr b="0" lang="en-US" sz="4400" spc="-1" strike="noStrike">
+              <a:latin typeface="Arial"/>
+            </a:endParaRPr>
+          </a:p>
+        </p:txBody>
+      </p:sp>
+      <p:sp>
+        <p:nvSpPr>
+          <p:cNvPr id="24" name="PlaceHolder 2"/>
           <p:cNvSpPr>
             <a:spLocks noGrp="1"/>
           </p:cNvSpPr>
@@ -95,8 +92,8 @@
         </p:nvSpPr>
         <p:spPr>
           <a:xfrm>
-            <a:off x="2346840" y="11315880"/>
-            <a:ext cx="28224720" cy="1212840"/>
+            <a:off x="1645920" y="5135040"/>
+            <a:ext cx="29625840" cy="6070680"/>
           </a:xfrm>
           <a:prstGeom prst="rect">
             <a:avLst/>
@@ -107,18 +104,15 @@
             <a:normAutofit/>
           </a:bodyPr>
           <a:p>
-            <a:endParaRPr b="0" lang="en-US" sz="8550" spc="-1" strike="noStrike">
-              <a:solidFill>
-                <a:srgbClr val="000000"/>
-              </a:solidFill>
-              <a:latin typeface="Gill Sans"/>
-            </a:endParaRPr>
-          </a:p>
-        </p:txBody>
-      </p:sp>
-      <p:sp>
-        <p:nvSpPr>
-          <p:cNvPr id="26" name="PlaceHolder 3"/>
+            <a:endParaRPr b="0" lang="en-US" sz="3200" spc="-1" strike="noStrike">
+              <a:latin typeface="Arial"/>
+            </a:endParaRPr>
+          </a:p>
+        </p:txBody>
+      </p:sp>
+      <p:sp>
+        <p:nvSpPr>
+          <p:cNvPr id="25" name="PlaceHolder 3"/>
           <p:cNvSpPr>
             <a:spLocks noGrp="1"/>
           </p:cNvSpPr>
@@ -128,8 +122,8 @@
         </p:nvSpPr>
         <p:spPr>
           <a:xfrm>
-            <a:off x="2346840" y="12644280"/>
-            <a:ext cx="28224720" cy="1212840"/>
+            <a:off x="1645920" y="11782800"/>
+            <a:ext cx="29625840" cy="6070680"/>
           </a:xfrm>
           <a:prstGeom prst="rect">
             <a:avLst/>
@@ -140,11 +134,8 @@
             <a:normAutofit/>
           </a:bodyPr>
           <a:p>
-            <a:endParaRPr b="0" lang="en-US" sz="8550" spc="-1" strike="noStrike">
-              <a:solidFill>
-                <a:srgbClr val="000000"/>
-              </a:solidFill>
-              <a:latin typeface="Gill Sans"/>
+            <a:endParaRPr b="0" lang="en-US" sz="3200" spc="-1" strike="noStrike">
+              <a:latin typeface="Arial"/>
             </a:endParaRPr>
           </a:p>
         </p:txBody>
@@ -173,7 +164,7 @@
       </p:grpSpPr>
       <p:sp>
         <p:nvSpPr>
-          <p:cNvPr id="27" name="PlaceHolder 1"/>
+          <p:cNvPr id="26" name="PlaceHolder 1"/>
           <p:cNvSpPr>
             <a:spLocks noGrp="1"/>
           </p:cNvSpPr>
@@ -184,7 +175,7 @@
         <p:spPr>
           <a:xfrm>
             <a:off x="2346840" y="3686040"/>
-            <a:ext cx="28224720" cy="7400520"/>
+            <a:ext cx="28224000" cy="7399800"/>
           </a:xfrm>
           <a:prstGeom prst="rect">
             <a:avLst/>
@@ -194,18 +185,15 @@
           <a:bodyPr lIns="0" rIns="0" tIns="0" bIns="0" anchor="ctr"/>
           <a:p>
             <a:pPr algn="ctr"/>
-            <a:endParaRPr b="0" lang="en-US" sz="9160" spc="-1" strike="noStrike">
-              <a:solidFill>
-                <a:srgbClr val="000000"/>
-              </a:solidFill>
-              <a:latin typeface="Gill Sans"/>
-            </a:endParaRPr>
-          </a:p>
-        </p:txBody>
-      </p:sp>
-      <p:sp>
-        <p:nvSpPr>
-          <p:cNvPr id="28" name="PlaceHolder 2"/>
+            <a:endParaRPr b="0" lang="en-US" sz="4400" spc="-1" strike="noStrike">
+              <a:latin typeface="Arial"/>
+            </a:endParaRPr>
+          </a:p>
+        </p:txBody>
+      </p:sp>
+      <p:sp>
+        <p:nvSpPr>
+          <p:cNvPr id="27" name="PlaceHolder 2"/>
           <p:cNvSpPr>
             <a:spLocks noGrp="1"/>
           </p:cNvSpPr>
@@ -215,8 +203,8 @@
         </p:nvSpPr>
         <p:spPr>
           <a:xfrm>
-            <a:off x="2346840" y="11315880"/>
-            <a:ext cx="13773600" cy="1212840"/>
+            <a:off x="1645920" y="5135040"/>
+            <a:ext cx="14457240" cy="6070680"/>
           </a:xfrm>
           <a:prstGeom prst="rect">
             <a:avLst/>
@@ -227,18 +215,15 @@
             <a:normAutofit/>
           </a:bodyPr>
           <a:p>
-            <a:endParaRPr b="0" lang="en-US" sz="8550" spc="-1" strike="noStrike">
-              <a:solidFill>
-                <a:srgbClr val="000000"/>
-              </a:solidFill>
-              <a:latin typeface="Gill Sans"/>
-            </a:endParaRPr>
-          </a:p>
-        </p:txBody>
-      </p:sp>
-      <p:sp>
-        <p:nvSpPr>
-          <p:cNvPr id="29" name="PlaceHolder 3"/>
+            <a:endParaRPr b="0" lang="en-US" sz="3200" spc="-1" strike="noStrike">
+              <a:latin typeface="Arial"/>
+            </a:endParaRPr>
+          </a:p>
+        </p:txBody>
+      </p:sp>
+      <p:sp>
+        <p:nvSpPr>
+          <p:cNvPr id="28" name="PlaceHolder 3"/>
           <p:cNvSpPr>
             <a:spLocks noGrp="1"/>
           </p:cNvSpPr>
@@ -248,8 +233,8 @@
         </p:nvSpPr>
         <p:spPr>
           <a:xfrm>
-            <a:off x="16809480" y="11315880"/>
-            <a:ext cx="13773600" cy="1212840"/>
+            <a:off x="16826400" y="5135040"/>
+            <a:ext cx="14457240" cy="6070680"/>
           </a:xfrm>
           <a:prstGeom prst="rect">
             <a:avLst/>
@@ -260,18 +245,15 @@
             <a:normAutofit/>
           </a:bodyPr>
           <a:p>
-            <a:endParaRPr b="0" lang="en-US" sz="8550" spc="-1" strike="noStrike">
-              <a:solidFill>
-                <a:srgbClr val="000000"/>
-              </a:solidFill>
-              <a:latin typeface="Gill Sans"/>
-            </a:endParaRPr>
-          </a:p>
-        </p:txBody>
-      </p:sp>
-      <p:sp>
-        <p:nvSpPr>
-          <p:cNvPr id="30" name="PlaceHolder 4"/>
+            <a:endParaRPr b="0" lang="en-US" sz="3200" spc="-1" strike="noStrike">
+              <a:latin typeface="Arial"/>
+            </a:endParaRPr>
+          </a:p>
+        </p:txBody>
+      </p:sp>
+      <p:sp>
+        <p:nvSpPr>
+          <p:cNvPr id="29" name="PlaceHolder 4"/>
           <p:cNvSpPr>
             <a:spLocks noGrp="1"/>
           </p:cNvSpPr>
@@ -281,8 +263,8 @@
         </p:nvSpPr>
         <p:spPr>
           <a:xfrm>
-            <a:off x="2346840" y="12644280"/>
-            <a:ext cx="13773600" cy="1212840"/>
+            <a:off x="1645920" y="11782800"/>
+            <a:ext cx="14457240" cy="6070680"/>
           </a:xfrm>
           <a:prstGeom prst="rect">
             <a:avLst/>
@@ -293,18 +275,15 @@
             <a:normAutofit/>
           </a:bodyPr>
           <a:p>
-            <a:endParaRPr b="0" lang="en-US" sz="8550" spc="-1" strike="noStrike">
-              <a:solidFill>
-                <a:srgbClr val="000000"/>
-              </a:solidFill>
-              <a:latin typeface="Gill Sans"/>
-            </a:endParaRPr>
-          </a:p>
-        </p:txBody>
-      </p:sp>
-      <p:sp>
-        <p:nvSpPr>
-          <p:cNvPr id="31" name="PlaceHolder 5"/>
+            <a:endParaRPr b="0" lang="en-US" sz="3200" spc="-1" strike="noStrike">
+              <a:latin typeface="Arial"/>
+            </a:endParaRPr>
+          </a:p>
+        </p:txBody>
+      </p:sp>
+      <p:sp>
+        <p:nvSpPr>
+          <p:cNvPr id="30" name="PlaceHolder 5"/>
           <p:cNvSpPr>
             <a:spLocks noGrp="1"/>
           </p:cNvSpPr>
@@ -314,8 +293,8 @@
         </p:nvSpPr>
         <p:spPr>
           <a:xfrm>
-            <a:off x="16809480" y="12644280"/>
-            <a:ext cx="13773600" cy="1212840"/>
+            <a:off x="16826400" y="11782800"/>
+            <a:ext cx="14457240" cy="6070680"/>
           </a:xfrm>
           <a:prstGeom prst="rect">
             <a:avLst/>
@@ -326,11 +305,8 @@
             <a:normAutofit/>
           </a:bodyPr>
           <a:p>
-            <a:endParaRPr b="0" lang="en-US" sz="8550" spc="-1" strike="noStrike">
-              <a:solidFill>
-                <a:srgbClr val="000000"/>
-              </a:solidFill>
-              <a:latin typeface="Gill Sans"/>
+            <a:endParaRPr b="0" lang="en-US" sz="3200" spc="-1" strike="noStrike">
+              <a:latin typeface="Arial"/>
             </a:endParaRPr>
           </a:p>
         </p:txBody>
@@ -359,7 +335,7 @@
       </p:grpSpPr>
       <p:sp>
         <p:nvSpPr>
-          <p:cNvPr id="32" name="PlaceHolder 1"/>
+          <p:cNvPr id="31" name="PlaceHolder 1"/>
           <p:cNvSpPr>
             <a:spLocks noGrp="1"/>
           </p:cNvSpPr>
@@ -370,7 +346,7 @@
         <p:spPr>
           <a:xfrm>
             <a:off x="2346840" y="3686040"/>
-            <a:ext cx="28224720" cy="7400520"/>
+            <a:ext cx="28224000" cy="7399800"/>
           </a:xfrm>
           <a:prstGeom prst="rect">
             <a:avLst/>
@@ -380,18 +356,15 @@
           <a:bodyPr lIns="0" rIns="0" tIns="0" bIns="0" anchor="ctr"/>
           <a:p>
             <a:pPr algn="ctr"/>
-            <a:endParaRPr b="0" lang="en-US" sz="9160" spc="-1" strike="noStrike">
-              <a:solidFill>
-                <a:srgbClr val="000000"/>
-              </a:solidFill>
-              <a:latin typeface="Gill Sans"/>
-            </a:endParaRPr>
-          </a:p>
-        </p:txBody>
-      </p:sp>
-      <p:sp>
-        <p:nvSpPr>
-          <p:cNvPr id="33" name="PlaceHolder 2"/>
+            <a:endParaRPr b="0" lang="en-US" sz="4400" spc="-1" strike="noStrike">
+              <a:latin typeface="Arial"/>
+            </a:endParaRPr>
+          </a:p>
+        </p:txBody>
+      </p:sp>
+      <p:sp>
+        <p:nvSpPr>
+          <p:cNvPr id="32" name="PlaceHolder 2"/>
           <p:cNvSpPr>
             <a:spLocks noGrp="1"/>
           </p:cNvSpPr>
@@ -401,8 +374,8 @@
         </p:nvSpPr>
         <p:spPr>
           <a:xfrm>
-            <a:off x="2346840" y="11315880"/>
-            <a:ext cx="9088200" cy="1212840"/>
+            <a:off x="1645920" y="5135040"/>
+            <a:ext cx="9539280" cy="6070680"/>
           </a:xfrm>
           <a:prstGeom prst="rect">
             <a:avLst/>
@@ -413,18 +386,15 @@
             <a:normAutofit/>
           </a:bodyPr>
           <a:p>
-            <a:endParaRPr b="0" lang="en-US" sz="8550" spc="-1" strike="noStrike">
-              <a:solidFill>
-                <a:srgbClr val="000000"/>
-              </a:solidFill>
-              <a:latin typeface="Gill Sans"/>
-            </a:endParaRPr>
-          </a:p>
-        </p:txBody>
-      </p:sp>
-      <p:sp>
-        <p:nvSpPr>
-          <p:cNvPr id="34" name="PlaceHolder 3"/>
+            <a:endParaRPr b="0" lang="en-US" sz="3200" spc="-1" strike="noStrike">
+              <a:latin typeface="Arial"/>
+            </a:endParaRPr>
+          </a:p>
+        </p:txBody>
+      </p:sp>
+      <p:sp>
+        <p:nvSpPr>
+          <p:cNvPr id="33" name="PlaceHolder 3"/>
           <p:cNvSpPr>
             <a:spLocks noGrp="1"/>
           </p:cNvSpPr>
@@ -434,8 +404,8 @@
         </p:nvSpPr>
         <p:spPr>
           <a:xfrm>
-            <a:off x="11889720" y="11315880"/>
-            <a:ext cx="9088200" cy="1212840"/>
+            <a:off x="11662560" y="5135040"/>
+            <a:ext cx="9539280" cy="6070680"/>
           </a:xfrm>
           <a:prstGeom prst="rect">
             <a:avLst/>
@@ -446,18 +416,15 @@
             <a:normAutofit/>
           </a:bodyPr>
           <a:p>
-            <a:endParaRPr b="0" lang="en-US" sz="8550" spc="-1" strike="noStrike">
-              <a:solidFill>
-                <a:srgbClr val="000000"/>
-              </a:solidFill>
-              <a:latin typeface="Gill Sans"/>
-            </a:endParaRPr>
-          </a:p>
-        </p:txBody>
-      </p:sp>
-      <p:sp>
-        <p:nvSpPr>
-          <p:cNvPr id="35" name="PlaceHolder 4"/>
+            <a:endParaRPr b="0" lang="en-US" sz="3200" spc="-1" strike="noStrike">
+              <a:latin typeface="Arial"/>
+            </a:endParaRPr>
+          </a:p>
+        </p:txBody>
+      </p:sp>
+      <p:sp>
+        <p:nvSpPr>
+          <p:cNvPr id="34" name="PlaceHolder 4"/>
           <p:cNvSpPr>
             <a:spLocks noGrp="1"/>
           </p:cNvSpPr>
@@ -467,8 +434,8 @@
         </p:nvSpPr>
         <p:spPr>
           <a:xfrm>
-            <a:off x="21432960" y="11315880"/>
-            <a:ext cx="9088200" cy="1212840"/>
+            <a:off x="21679200" y="5135040"/>
+            <a:ext cx="9539280" cy="6070680"/>
           </a:xfrm>
           <a:prstGeom prst="rect">
             <a:avLst/>
@@ -479,18 +446,15 @@
             <a:normAutofit/>
           </a:bodyPr>
           <a:p>
-            <a:endParaRPr b="0" lang="en-US" sz="8550" spc="-1" strike="noStrike">
-              <a:solidFill>
-                <a:srgbClr val="000000"/>
-              </a:solidFill>
-              <a:latin typeface="Gill Sans"/>
-            </a:endParaRPr>
-          </a:p>
-        </p:txBody>
-      </p:sp>
-      <p:sp>
-        <p:nvSpPr>
-          <p:cNvPr id="36" name="PlaceHolder 5"/>
+            <a:endParaRPr b="0" lang="en-US" sz="3200" spc="-1" strike="noStrike">
+              <a:latin typeface="Arial"/>
+            </a:endParaRPr>
+          </a:p>
+        </p:txBody>
+      </p:sp>
+      <p:sp>
+        <p:nvSpPr>
+          <p:cNvPr id="35" name="PlaceHolder 5"/>
           <p:cNvSpPr>
             <a:spLocks noGrp="1"/>
           </p:cNvSpPr>
@@ -500,8 +464,8 @@
         </p:nvSpPr>
         <p:spPr>
           <a:xfrm>
-            <a:off x="2346840" y="12644280"/>
-            <a:ext cx="9088200" cy="1212840"/>
+            <a:off x="1645920" y="11782800"/>
+            <a:ext cx="9539280" cy="6070680"/>
           </a:xfrm>
           <a:prstGeom prst="rect">
             <a:avLst/>
@@ -512,18 +476,15 @@
             <a:normAutofit/>
           </a:bodyPr>
           <a:p>
-            <a:endParaRPr b="0" lang="en-US" sz="8550" spc="-1" strike="noStrike">
-              <a:solidFill>
-                <a:srgbClr val="000000"/>
-              </a:solidFill>
-              <a:latin typeface="Gill Sans"/>
-            </a:endParaRPr>
-          </a:p>
-        </p:txBody>
-      </p:sp>
-      <p:sp>
-        <p:nvSpPr>
-          <p:cNvPr id="37" name="PlaceHolder 6"/>
+            <a:endParaRPr b="0" lang="en-US" sz="3200" spc="-1" strike="noStrike">
+              <a:latin typeface="Arial"/>
+            </a:endParaRPr>
+          </a:p>
+        </p:txBody>
+      </p:sp>
+      <p:sp>
+        <p:nvSpPr>
+          <p:cNvPr id="36" name="PlaceHolder 6"/>
           <p:cNvSpPr>
             <a:spLocks noGrp="1"/>
           </p:cNvSpPr>
@@ -533,8 +494,8 @@
         </p:nvSpPr>
         <p:spPr>
           <a:xfrm>
-            <a:off x="11889720" y="12644280"/>
-            <a:ext cx="9088200" cy="1212840"/>
+            <a:off x="11662560" y="11782800"/>
+            <a:ext cx="9539280" cy="6070680"/>
           </a:xfrm>
           <a:prstGeom prst="rect">
             <a:avLst/>
@@ -545,18 +506,15 @@
             <a:normAutofit/>
           </a:bodyPr>
           <a:p>
-            <a:endParaRPr b="0" lang="en-US" sz="8550" spc="-1" strike="noStrike">
-              <a:solidFill>
-                <a:srgbClr val="000000"/>
-              </a:solidFill>
-              <a:latin typeface="Gill Sans"/>
-            </a:endParaRPr>
-          </a:p>
-        </p:txBody>
-      </p:sp>
-      <p:sp>
-        <p:nvSpPr>
-          <p:cNvPr id="38" name="PlaceHolder 7"/>
+            <a:endParaRPr b="0" lang="en-US" sz="3200" spc="-1" strike="noStrike">
+              <a:latin typeface="Arial"/>
+            </a:endParaRPr>
+          </a:p>
+        </p:txBody>
+      </p:sp>
+      <p:sp>
+        <p:nvSpPr>
+          <p:cNvPr id="37" name="PlaceHolder 7"/>
           <p:cNvSpPr>
             <a:spLocks noGrp="1"/>
           </p:cNvSpPr>
@@ -566,8 +524,8 @@
         </p:nvSpPr>
         <p:spPr>
           <a:xfrm>
-            <a:off x="21432960" y="12644280"/>
-            <a:ext cx="9088200" cy="1212840"/>
+            <a:off x="21679200" y="11782800"/>
+            <a:ext cx="9539280" cy="6070680"/>
           </a:xfrm>
           <a:prstGeom prst="rect">
             <a:avLst/>
@@ -578,11 +536,8 @@
             <a:normAutofit/>
           </a:bodyPr>
           <a:p>
-            <a:endParaRPr b="0" lang="en-US" sz="8550" spc="-1" strike="noStrike">
-              <a:solidFill>
-                <a:srgbClr val="000000"/>
-              </a:solidFill>
-              <a:latin typeface="Gill Sans"/>
+            <a:endParaRPr b="0" lang="en-US" sz="3200" spc="-1" strike="noStrike">
+              <a:latin typeface="Arial"/>
             </a:endParaRPr>
           </a:p>
         </p:txBody>
@@ -611,7 +566,7 @@
       </p:grpSpPr>
       <p:sp>
         <p:nvSpPr>
-          <p:cNvPr id="3" name="PlaceHolder 1"/>
+          <p:cNvPr id="2" name="PlaceHolder 1"/>
           <p:cNvSpPr>
             <a:spLocks noGrp="1"/>
           </p:cNvSpPr>
@@ -622,7 +577,7 @@
         <p:spPr>
           <a:xfrm>
             <a:off x="2346840" y="3686040"/>
-            <a:ext cx="28224720" cy="7400520"/>
+            <a:ext cx="28224000" cy="7399800"/>
           </a:xfrm>
           <a:prstGeom prst="rect">
             <a:avLst/>
@@ -632,18 +587,15 @@
           <a:bodyPr lIns="0" rIns="0" tIns="0" bIns="0" anchor="ctr"/>
           <a:p>
             <a:pPr algn="ctr"/>
-            <a:endParaRPr b="0" lang="en-US" sz="9160" spc="-1" strike="noStrike">
-              <a:solidFill>
-                <a:srgbClr val="000000"/>
-              </a:solidFill>
-              <a:latin typeface="Gill Sans"/>
-            </a:endParaRPr>
-          </a:p>
-        </p:txBody>
-      </p:sp>
-      <p:sp>
-        <p:nvSpPr>
-          <p:cNvPr id="4" name="PlaceHolder 2"/>
+            <a:endParaRPr b="0" lang="en-US" sz="4400" spc="-1" strike="noStrike">
+              <a:latin typeface="Arial"/>
+            </a:endParaRPr>
+          </a:p>
+        </p:txBody>
+      </p:sp>
+      <p:sp>
+        <p:nvSpPr>
+          <p:cNvPr id="3" name="PlaceHolder 2"/>
           <p:cNvSpPr>
             <a:spLocks noGrp="1"/>
           </p:cNvSpPr>
@@ -653,8 +605,8 @@
         </p:nvSpPr>
         <p:spPr>
           <a:xfrm>
-            <a:off x="2346840" y="11315880"/>
-            <a:ext cx="28224720" cy="2542680"/>
+            <a:off x="1645920" y="5135040"/>
+            <a:ext cx="29625840" cy="12727440"/>
           </a:xfrm>
           <a:prstGeom prst="rect">
             <a:avLst/>
@@ -694,7 +646,7 @@
       </p:grpSpPr>
       <p:sp>
         <p:nvSpPr>
-          <p:cNvPr id="5" name="PlaceHolder 1"/>
+          <p:cNvPr id="4" name="PlaceHolder 1"/>
           <p:cNvSpPr>
             <a:spLocks noGrp="1"/>
           </p:cNvSpPr>
@@ -705,7 +657,7 @@
         <p:spPr>
           <a:xfrm>
             <a:off x="2346840" y="3686040"/>
-            <a:ext cx="28224720" cy="7400520"/>
+            <a:ext cx="28224000" cy="7399800"/>
           </a:xfrm>
           <a:prstGeom prst="rect">
             <a:avLst/>
@@ -715,18 +667,15 @@
           <a:bodyPr lIns="0" rIns="0" tIns="0" bIns="0" anchor="ctr"/>
           <a:p>
             <a:pPr algn="ctr"/>
-            <a:endParaRPr b="0" lang="en-US" sz="9160" spc="-1" strike="noStrike">
-              <a:solidFill>
-                <a:srgbClr val="000000"/>
-              </a:solidFill>
-              <a:latin typeface="Gill Sans"/>
-            </a:endParaRPr>
-          </a:p>
-        </p:txBody>
-      </p:sp>
-      <p:sp>
-        <p:nvSpPr>
-          <p:cNvPr id="6" name="PlaceHolder 2"/>
+            <a:endParaRPr b="0" lang="en-US" sz="4400" spc="-1" strike="noStrike">
+              <a:latin typeface="Arial"/>
+            </a:endParaRPr>
+          </a:p>
+        </p:txBody>
+      </p:sp>
+      <p:sp>
+        <p:nvSpPr>
+          <p:cNvPr id="5" name="PlaceHolder 2"/>
           <p:cNvSpPr>
             <a:spLocks noGrp="1"/>
           </p:cNvSpPr>
@@ -736,8 +685,8 @@
         </p:nvSpPr>
         <p:spPr>
           <a:xfrm>
-            <a:off x="2346840" y="11315880"/>
-            <a:ext cx="28224720" cy="2542680"/>
+            <a:off x="1645920" y="5135040"/>
+            <a:ext cx="29625840" cy="12727440"/>
           </a:xfrm>
           <a:prstGeom prst="rect">
             <a:avLst/>
@@ -748,11 +697,8 @@
             <a:normAutofit/>
           </a:bodyPr>
           <a:p>
-            <a:endParaRPr b="0" lang="en-US" sz="8550" spc="-1" strike="noStrike">
-              <a:solidFill>
-                <a:srgbClr val="000000"/>
-              </a:solidFill>
-              <a:latin typeface="Gill Sans"/>
+            <a:endParaRPr b="0" lang="en-US" sz="3200" spc="-1" strike="noStrike">
+              <a:latin typeface="Arial"/>
             </a:endParaRPr>
           </a:p>
         </p:txBody>
@@ -781,7 +727,7 @@
       </p:grpSpPr>
       <p:sp>
         <p:nvSpPr>
-          <p:cNvPr id="7" name="PlaceHolder 1"/>
+          <p:cNvPr id="6" name="PlaceHolder 1"/>
           <p:cNvSpPr>
             <a:spLocks noGrp="1"/>
           </p:cNvSpPr>
@@ -792,7 +738,7 @@
         <p:spPr>
           <a:xfrm>
             <a:off x="2346840" y="3686040"/>
-            <a:ext cx="28224720" cy="7400520"/>
+            <a:ext cx="28224000" cy="7399800"/>
           </a:xfrm>
           <a:prstGeom prst="rect">
             <a:avLst/>
@@ -802,18 +748,15 @@
           <a:bodyPr lIns="0" rIns="0" tIns="0" bIns="0" anchor="ctr"/>
           <a:p>
             <a:pPr algn="ctr"/>
-            <a:endParaRPr b="0" lang="en-US" sz="9160" spc="-1" strike="noStrike">
-              <a:solidFill>
-                <a:srgbClr val="000000"/>
-              </a:solidFill>
-              <a:latin typeface="Gill Sans"/>
-            </a:endParaRPr>
-          </a:p>
-        </p:txBody>
-      </p:sp>
-      <p:sp>
-        <p:nvSpPr>
-          <p:cNvPr id="8" name="PlaceHolder 2"/>
+            <a:endParaRPr b="0" lang="en-US" sz="4400" spc="-1" strike="noStrike">
+              <a:latin typeface="Arial"/>
+            </a:endParaRPr>
+          </a:p>
+        </p:txBody>
+      </p:sp>
+      <p:sp>
+        <p:nvSpPr>
+          <p:cNvPr id="7" name="PlaceHolder 2"/>
           <p:cNvSpPr>
             <a:spLocks noGrp="1"/>
           </p:cNvSpPr>
@@ -823,8 +766,8 @@
         </p:nvSpPr>
         <p:spPr>
           <a:xfrm>
-            <a:off x="2346840" y="11315880"/>
-            <a:ext cx="13773600" cy="2542680"/>
+            <a:off x="1645920" y="5135040"/>
+            <a:ext cx="14457240" cy="12727440"/>
           </a:xfrm>
           <a:prstGeom prst="rect">
             <a:avLst/>
@@ -835,18 +778,15 @@
             <a:normAutofit/>
           </a:bodyPr>
           <a:p>
-            <a:endParaRPr b="0" lang="en-US" sz="8550" spc="-1" strike="noStrike">
-              <a:solidFill>
-                <a:srgbClr val="000000"/>
-              </a:solidFill>
-              <a:latin typeface="Gill Sans"/>
-            </a:endParaRPr>
-          </a:p>
-        </p:txBody>
-      </p:sp>
-      <p:sp>
-        <p:nvSpPr>
-          <p:cNvPr id="9" name="PlaceHolder 3"/>
+            <a:endParaRPr b="0" lang="en-US" sz="3200" spc="-1" strike="noStrike">
+              <a:latin typeface="Arial"/>
+            </a:endParaRPr>
+          </a:p>
+        </p:txBody>
+      </p:sp>
+      <p:sp>
+        <p:nvSpPr>
+          <p:cNvPr id="8" name="PlaceHolder 3"/>
           <p:cNvSpPr>
             <a:spLocks noGrp="1"/>
           </p:cNvSpPr>
@@ -856,8 +796,8 @@
         </p:nvSpPr>
         <p:spPr>
           <a:xfrm>
-            <a:off x="16809480" y="11315880"/>
-            <a:ext cx="13773600" cy="2542680"/>
+            <a:off x="16826400" y="5135040"/>
+            <a:ext cx="14457240" cy="12727440"/>
           </a:xfrm>
           <a:prstGeom prst="rect">
             <a:avLst/>
@@ -868,11 +808,8 @@
             <a:normAutofit/>
           </a:bodyPr>
           <a:p>
-            <a:endParaRPr b="0" lang="en-US" sz="8550" spc="-1" strike="noStrike">
-              <a:solidFill>
-                <a:srgbClr val="000000"/>
-              </a:solidFill>
-              <a:latin typeface="Gill Sans"/>
+            <a:endParaRPr b="0" lang="en-US" sz="3200" spc="-1" strike="noStrike">
+              <a:latin typeface="Arial"/>
             </a:endParaRPr>
           </a:p>
         </p:txBody>
@@ -901,7 +838,7 @@
       </p:grpSpPr>
       <p:sp>
         <p:nvSpPr>
-          <p:cNvPr id="10" name="PlaceHolder 1"/>
+          <p:cNvPr id="9" name="PlaceHolder 1"/>
           <p:cNvSpPr>
             <a:spLocks noGrp="1"/>
           </p:cNvSpPr>
@@ -912,7 +849,7 @@
         <p:spPr>
           <a:xfrm>
             <a:off x="2346840" y="3686040"/>
-            <a:ext cx="28224720" cy="7400520"/>
+            <a:ext cx="28224000" cy="7399800"/>
           </a:xfrm>
           <a:prstGeom prst="rect">
             <a:avLst/>
@@ -922,11 +859,8 @@
           <a:bodyPr lIns="0" rIns="0" tIns="0" bIns="0" anchor="ctr"/>
           <a:p>
             <a:pPr algn="ctr"/>
-            <a:endParaRPr b="0" lang="en-US" sz="9160" spc="-1" strike="noStrike">
-              <a:solidFill>
-                <a:srgbClr val="000000"/>
-              </a:solidFill>
-              <a:latin typeface="Gill Sans"/>
+            <a:endParaRPr b="0" lang="en-US" sz="4400" spc="-1" strike="noStrike">
+              <a:latin typeface="Arial"/>
             </a:endParaRPr>
           </a:p>
         </p:txBody>
@@ -955,7 +889,7 @@
       </p:grpSpPr>
       <p:sp>
         <p:nvSpPr>
-          <p:cNvPr id="11" name="PlaceHolder 1"/>
+          <p:cNvPr id="10" name="PlaceHolder 1"/>
           <p:cNvSpPr>
             <a:spLocks noGrp="1"/>
           </p:cNvSpPr>
@@ -966,7 +900,7 @@
         <p:spPr>
           <a:xfrm>
             <a:off x="2346840" y="3686040"/>
-            <a:ext cx="28224720" cy="34305840"/>
+            <a:ext cx="28224000" cy="34302240"/>
           </a:xfrm>
           <a:prstGeom prst="rect">
             <a:avLst/>
@@ -1006,7 +940,7 @@
       </p:grpSpPr>
       <p:sp>
         <p:nvSpPr>
-          <p:cNvPr id="12" name="PlaceHolder 1"/>
+          <p:cNvPr id="11" name="PlaceHolder 1"/>
           <p:cNvSpPr>
             <a:spLocks noGrp="1"/>
           </p:cNvSpPr>
@@ -1017,7 +951,7 @@
         <p:spPr>
           <a:xfrm>
             <a:off x="2346840" y="3686040"/>
-            <a:ext cx="28224720" cy="7400520"/>
+            <a:ext cx="28224000" cy="7399800"/>
           </a:xfrm>
           <a:prstGeom prst="rect">
             <a:avLst/>
@@ -1027,18 +961,15 @@
           <a:bodyPr lIns="0" rIns="0" tIns="0" bIns="0" anchor="ctr"/>
           <a:p>
             <a:pPr algn="ctr"/>
-            <a:endParaRPr b="0" lang="en-US" sz="9160" spc="-1" strike="noStrike">
-              <a:solidFill>
-                <a:srgbClr val="000000"/>
-              </a:solidFill>
-              <a:latin typeface="Gill Sans"/>
-            </a:endParaRPr>
-          </a:p>
-        </p:txBody>
-      </p:sp>
-      <p:sp>
-        <p:nvSpPr>
-          <p:cNvPr id="13" name="PlaceHolder 2"/>
+            <a:endParaRPr b="0" lang="en-US" sz="4400" spc="-1" strike="noStrike">
+              <a:latin typeface="Arial"/>
+            </a:endParaRPr>
+          </a:p>
+        </p:txBody>
+      </p:sp>
+      <p:sp>
+        <p:nvSpPr>
+          <p:cNvPr id="12" name="PlaceHolder 2"/>
           <p:cNvSpPr>
             <a:spLocks noGrp="1"/>
           </p:cNvSpPr>
@@ -1048,8 +979,8 @@
         </p:nvSpPr>
         <p:spPr>
           <a:xfrm>
-            <a:off x="2346840" y="11315880"/>
-            <a:ext cx="13773600" cy="1212840"/>
+            <a:off x="1645920" y="5135040"/>
+            <a:ext cx="14457240" cy="6070680"/>
           </a:xfrm>
           <a:prstGeom prst="rect">
             <a:avLst/>
@@ -1060,18 +991,15 @@
             <a:normAutofit/>
           </a:bodyPr>
           <a:p>
-            <a:endParaRPr b="0" lang="en-US" sz="8550" spc="-1" strike="noStrike">
-              <a:solidFill>
-                <a:srgbClr val="000000"/>
-              </a:solidFill>
-              <a:latin typeface="Gill Sans"/>
-            </a:endParaRPr>
-          </a:p>
-        </p:txBody>
-      </p:sp>
-      <p:sp>
-        <p:nvSpPr>
-          <p:cNvPr id="14" name="PlaceHolder 3"/>
+            <a:endParaRPr b="0" lang="en-US" sz="3200" spc="-1" strike="noStrike">
+              <a:latin typeface="Arial"/>
+            </a:endParaRPr>
+          </a:p>
+        </p:txBody>
+      </p:sp>
+      <p:sp>
+        <p:nvSpPr>
+          <p:cNvPr id="13" name="PlaceHolder 3"/>
           <p:cNvSpPr>
             <a:spLocks noGrp="1"/>
           </p:cNvSpPr>
@@ -1081,8 +1009,8 @@
         </p:nvSpPr>
         <p:spPr>
           <a:xfrm>
-            <a:off x="16809480" y="11315880"/>
-            <a:ext cx="13773600" cy="2542680"/>
+            <a:off x="16826400" y="5135040"/>
+            <a:ext cx="14457240" cy="12727440"/>
           </a:xfrm>
           <a:prstGeom prst="rect">
             <a:avLst/>
@@ -1093,18 +1021,15 @@
             <a:normAutofit/>
           </a:bodyPr>
           <a:p>
-            <a:endParaRPr b="0" lang="en-US" sz="8550" spc="-1" strike="noStrike">
-              <a:solidFill>
-                <a:srgbClr val="000000"/>
-              </a:solidFill>
-              <a:latin typeface="Gill Sans"/>
-            </a:endParaRPr>
-          </a:p>
-        </p:txBody>
-      </p:sp>
-      <p:sp>
-        <p:nvSpPr>
-          <p:cNvPr id="15" name="PlaceHolder 4"/>
+            <a:endParaRPr b="0" lang="en-US" sz="3200" spc="-1" strike="noStrike">
+              <a:latin typeface="Arial"/>
+            </a:endParaRPr>
+          </a:p>
+        </p:txBody>
+      </p:sp>
+      <p:sp>
+        <p:nvSpPr>
+          <p:cNvPr id="14" name="PlaceHolder 4"/>
           <p:cNvSpPr>
             <a:spLocks noGrp="1"/>
           </p:cNvSpPr>
@@ -1114,8 +1039,8 @@
         </p:nvSpPr>
         <p:spPr>
           <a:xfrm>
-            <a:off x="2346840" y="12644280"/>
-            <a:ext cx="13773600" cy="1212840"/>
+            <a:off x="1645920" y="11782800"/>
+            <a:ext cx="14457240" cy="6070680"/>
           </a:xfrm>
           <a:prstGeom prst="rect">
             <a:avLst/>
@@ -1126,11 +1051,8 @@
             <a:normAutofit/>
           </a:bodyPr>
           <a:p>
-            <a:endParaRPr b="0" lang="en-US" sz="8550" spc="-1" strike="noStrike">
-              <a:solidFill>
-                <a:srgbClr val="000000"/>
-              </a:solidFill>
-              <a:latin typeface="Gill Sans"/>
+            <a:endParaRPr b="0" lang="en-US" sz="3200" spc="-1" strike="noStrike">
+              <a:latin typeface="Arial"/>
             </a:endParaRPr>
           </a:p>
         </p:txBody>
@@ -1159,7 +1081,7 @@
       </p:grpSpPr>
       <p:sp>
         <p:nvSpPr>
-          <p:cNvPr id="16" name="PlaceHolder 1"/>
+          <p:cNvPr id="15" name="PlaceHolder 1"/>
           <p:cNvSpPr>
             <a:spLocks noGrp="1"/>
           </p:cNvSpPr>
@@ -1170,7 +1092,7 @@
         <p:spPr>
           <a:xfrm>
             <a:off x="2346840" y="3686040"/>
-            <a:ext cx="28224720" cy="7400520"/>
+            <a:ext cx="28224000" cy="7399800"/>
           </a:xfrm>
           <a:prstGeom prst="rect">
             <a:avLst/>
@@ -1180,18 +1102,15 @@
           <a:bodyPr lIns="0" rIns="0" tIns="0" bIns="0" anchor="ctr"/>
           <a:p>
             <a:pPr algn="ctr"/>
-            <a:endParaRPr b="0" lang="en-US" sz="9160" spc="-1" strike="noStrike">
-              <a:solidFill>
-                <a:srgbClr val="000000"/>
-              </a:solidFill>
-              <a:latin typeface="Gill Sans"/>
-            </a:endParaRPr>
-          </a:p>
-        </p:txBody>
-      </p:sp>
-      <p:sp>
-        <p:nvSpPr>
-          <p:cNvPr id="17" name="PlaceHolder 2"/>
+            <a:endParaRPr b="0" lang="en-US" sz="4400" spc="-1" strike="noStrike">
+              <a:latin typeface="Arial"/>
+            </a:endParaRPr>
+          </a:p>
+        </p:txBody>
+      </p:sp>
+      <p:sp>
+        <p:nvSpPr>
+          <p:cNvPr id="16" name="PlaceHolder 2"/>
           <p:cNvSpPr>
             <a:spLocks noGrp="1"/>
           </p:cNvSpPr>
@@ -1201,8 +1120,8 @@
         </p:nvSpPr>
         <p:spPr>
           <a:xfrm>
-            <a:off x="2346840" y="11315880"/>
-            <a:ext cx="13773600" cy="2542680"/>
+            <a:off x="1645920" y="5135040"/>
+            <a:ext cx="14457240" cy="12727440"/>
           </a:xfrm>
           <a:prstGeom prst="rect">
             <a:avLst/>
@@ -1213,18 +1132,15 @@
             <a:normAutofit/>
           </a:bodyPr>
           <a:p>
-            <a:endParaRPr b="0" lang="en-US" sz="8550" spc="-1" strike="noStrike">
-              <a:solidFill>
-                <a:srgbClr val="000000"/>
-              </a:solidFill>
-              <a:latin typeface="Gill Sans"/>
-            </a:endParaRPr>
-          </a:p>
-        </p:txBody>
-      </p:sp>
-      <p:sp>
-        <p:nvSpPr>
-          <p:cNvPr id="18" name="PlaceHolder 3"/>
+            <a:endParaRPr b="0" lang="en-US" sz="3200" spc="-1" strike="noStrike">
+              <a:latin typeface="Arial"/>
+            </a:endParaRPr>
+          </a:p>
+        </p:txBody>
+      </p:sp>
+      <p:sp>
+        <p:nvSpPr>
+          <p:cNvPr id="17" name="PlaceHolder 3"/>
           <p:cNvSpPr>
             <a:spLocks noGrp="1"/>
           </p:cNvSpPr>
@@ -1234,8 +1150,8 @@
         </p:nvSpPr>
         <p:spPr>
           <a:xfrm>
-            <a:off x="16809480" y="11315880"/>
-            <a:ext cx="13773600" cy="1212840"/>
+            <a:off x="16826400" y="5135040"/>
+            <a:ext cx="14457240" cy="6070680"/>
           </a:xfrm>
           <a:prstGeom prst="rect">
             <a:avLst/>
@@ -1246,18 +1162,15 @@
             <a:normAutofit/>
           </a:bodyPr>
           <a:p>
-            <a:endParaRPr b="0" lang="en-US" sz="8550" spc="-1" strike="noStrike">
-              <a:solidFill>
-                <a:srgbClr val="000000"/>
-              </a:solidFill>
-              <a:latin typeface="Gill Sans"/>
-            </a:endParaRPr>
-          </a:p>
-        </p:txBody>
-      </p:sp>
-      <p:sp>
-        <p:nvSpPr>
-          <p:cNvPr id="19" name="PlaceHolder 4"/>
+            <a:endParaRPr b="0" lang="en-US" sz="3200" spc="-1" strike="noStrike">
+              <a:latin typeface="Arial"/>
+            </a:endParaRPr>
+          </a:p>
+        </p:txBody>
+      </p:sp>
+      <p:sp>
+        <p:nvSpPr>
+          <p:cNvPr id="18" name="PlaceHolder 4"/>
           <p:cNvSpPr>
             <a:spLocks noGrp="1"/>
           </p:cNvSpPr>
@@ -1267,8 +1180,8 @@
         </p:nvSpPr>
         <p:spPr>
           <a:xfrm>
-            <a:off x="16809480" y="12644280"/>
-            <a:ext cx="13773600" cy="1212840"/>
+            <a:off x="16826400" y="11782800"/>
+            <a:ext cx="14457240" cy="6070680"/>
           </a:xfrm>
           <a:prstGeom prst="rect">
             <a:avLst/>
@@ -1279,11 +1192,8 @@
             <a:normAutofit/>
           </a:bodyPr>
           <a:p>
-            <a:endParaRPr b="0" lang="en-US" sz="8550" spc="-1" strike="noStrike">
-              <a:solidFill>
-                <a:srgbClr val="000000"/>
-              </a:solidFill>
-              <a:latin typeface="Gill Sans"/>
+            <a:endParaRPr b="0" lang="en-US" sz="3200" spc="-1" strike="noStrike">
+              <a:latin typeface="Arial"/>
             </a:endParaRPr>
           </a:p>
         </p:txBody>
@@ -1312,7 +1222,7 @@
       </p:grpSpPr>
       <p:sp>
         <p:nvSpPr>
-          <p:cNvPr id="20" name="PlaceHolder 1"/>
+          <p:cNvPr id="19" name="PlaceHolder 1"/>
           <p:cNvSpPr>
             <a:spLocks noGrp="1"/>
           </p:cNvSpPr>
@@ -1323,7 +1233,7 @@
         <p:spPr>
           <a:xfrm>
             <a:off x="2346840" y="3686040"/>
-            <a:ext cx="28224720" cy="7400520"/>
+            <a:ext cx="28224000" cy="7399800"/>
           </a:xfrm>
           <a:prstGeom prst="rect">
             <a:avLst/>
@@ -1333,18 +1243,15 @@
           <a:bodyPr lIns="0" rIns="0" tIns="0" bIns="0" anchor="ctr"/>
           <a:p>
             <a:pPr algn="ctr"/>
-            <a:endParaRPr b="0" lang="en-US" sz="9160" spc="-1" strike="noStrike">
-              <a:solidFill>
-                <a:srgbClr val="000000"/>
-              </a:solidFill>
-              <a:latin typeface="Gill Sans"/>
-            </a:endParaRPr>
-          </a:p>
-        </p:txBody>
-      </p:sp>
-      <p:sp>
-        <p:nvSpPr>
-          <p:cNvPr id="21" name="PlaceHolder 2"/>
+            <a:endParaRPr b="0" lang="en-US" sz="4400" spc="-1" strike="noStrike">
+              <a:latin typeface="Arial"/>
+            </a:endParaRPr>
+          </a:p>
+        </p:txBody>
+      </p:sp>
+      <p:sp>
+        <p:nvSpPr>
+          <p:cNvPr id="20" name="PlaceHolder 2"/>
           <p:cNvSpPr>
             <a:spLocks noGrp="1"/>
           </p:cNvSpPr>
@@ -1354,8 +1261,8 @@
         </p:nvSpPr>
         <p:spPr>
           <a:xfrm>
-            <a:off x="2346840" y="11315880"/>
-            <a:ext cx="13773600" cy="1212840"/>
+            <a:off x="1645920" y="5135040"/>
+            <a:ext cx="14457240" cy="6070680"/>
           </a:xfrm>
           <a:prstGeom prst="rect">
             <a:avLst/>
@@ -1366,18 +1273,15 @@
             <a:normAutofit/>
           </a:bodyPr>
           <a:p>
-            <a:endParaRPr b="0" lang="en-US" sz="8550" spc="-1" strike="noStrike">
-              <a:solidFill>
-                <a:srgbClr val="000000"/>
-              </a:solidFill>
-              <a:latin typeface="Gill Sans"/>
-            </a:endParaRPr>
-          </a:p>
-        </p:txBody>
-      </p:sp>
-      <p:sp>
-        <p:nvSpPr>
-          <p:cNvPr id="22" name="PlaceHolder 3"/>
+            <a:endParaRPr b="0" lang="en-US" sz="3200" spc="-1" strike="noStrike">
+              <a:latin typeface="Arial"/>
+            </a:endParaRPr>
+          </a:p>
+        </p:txBody>
+      </p:sp>
+      <p:sp>
+        <p:nvSpPr>
+          <p:cNvPr id="21" name="PlaceHolder 3"/>
           <p:cNvSpPr>
             <a:spLocks noGrp="1"/>
           </p:cNvSpPr>
@@ -1387,8 +1291,8 @@
         </p:nvSpPr>
         <p:spPr>
           <a:xfrm>
-            <a:off x="16809480" y="11315880"/>
-            <a:ext cx="13773600" cy="1212840"/>
+            <a:off x="16826400" y="5135040"/>
+            <a:ext cx="14457240" cy="6070680"/>
           </a:xfrm>
           <a:prstGeom prst="rect">
             <a:avLst/>
@@ -1399,18 +1303,15 @@
             <a:normAutofit/>
           </a:bodyPr>
           <a:p>
-            <a:endParaRPr b="0" lang="en-US" sz="8550" spc="-1" strike="noStrike">
-              <a:solidFill>
-                <a:srgbClr val="000000"/>
-              </a:solidFill>
-              <a:latin typeface="Gill Sans"/>
-            </a:endParaRPr>
-          </a:p>
-        </p:txBody>
-      </p:sp>
-      <p:sp>
-        <p:nvSpPr>
-          <p:cNvPr id="23" name="PlaceHolder 4"/>
+            <a:endParaRPr b="0" lang="en-US" sz="3200" spc="-1" strike="noStrike">
+              <a:latin typeface="Arial"/>
+            </a:endParaRPr>
+          </a:p>
+        </p:txBody>
+      </p:sp>
+      <p:sp>
+        <p:nvSpPr>
+          <p:cNvPr id="22" name="PlaceHolder 4"/>
           <p:cNvSpPr>
             <a:spLocks noGrp="1"/>
           </p:cNvSpPr>
@@ -1420,8 +1321,8 @@
         </p:nvSpPr>
         <p:spPr>
           <a:xfrm>
-            <a:off x="2346840" y="12644280"/>
-            <a:ext cx="28224720" cy="1212840"/>
+            <a:off x="1645920" y="11782800"/>
+            <a:ext cx="29625840" cy="6070680"/>
           </a:xfrm>
           <a:prstGeom prst="rect">
             <a:avLst/>
@@ -1432,11 +1333,8 @@
             <a:normAutofit/>
           </a:bodyPr>
           <a:p>
-            <a:endParaRPr b="0" lang="en-US" sz="8550" spc="-1" strike="noStrike">
-              <a:solidFill>
-                <a:srgbClr val="000000"/>
-              </a:solidFill>
-              <a:latin typeface="Gill Sans"/>
+            <a:endParaRPr b="0" lang="en-US" sz="3200" spc="-1" strike="noStrike">
+              <a:latin typeface="Arial"/>
             </a:endParaRPr>
           </a:p>
         </p:txBody>
@@ -1483,216 +1381,202 @@
         <p:spPr>
           <a:xfrm>
             <a:off x="2346840" y="3686040"/>
-            <a:ext cx="28224720" cy="7400520"/>
-          </a:xfrm>
-          <a:prstGeom prst="rect">
-            <a:avLst/>
-          </a:prstGeom>
-        </p:spPr>
-        <p:txBody>
-          <a:bodyPr lIns="50760" rIns="50760" tIns="50760" bIns="50760" anchor="b"/>
-          <a:p>
-            <a:pPr algn="ctr">
-              <a:lnSpc>
-                <a:spcPct val="100000"/>
-              </a:lnSpc>
+            <a:ext cx="28224000" cy="7399800"/>
+          </a:xfrm>
+          <a:prstGeom prst="rect">
+            <a:avLst/>
+          </a:prstGeom>
+        </p:spPr>
+        <p:txBody>
+          <a:bodyPr lIns="0" rIns="0" tIns="0" bIns="0" anchor="ctr"/>
+          <a:p>
+            <a:r>
+              <a:rPr b="0" lang="en-US" sz="1800" spc="-1" strike="noStrike">
+                <a:latin typeface="Arial"/>
+              </a:rPr>
+              <a:t>Click to edit the title text format</a:t>
+            </a:r>
+            <a:endParaRPr b="0" lang="en-US" sz="1800" spc="-1" strike="noStrike">
+              <a:latin typeface="Arial"/>
+            </a:endParaRPr>
+          </a:p>
+        </p:txBody>
+      </p:sp>
+      <p:sp>
+        <p:nvSpPr>
+          <p:cNvPr id="1" name="PlaceHolder 2"/>
+          <p:cNvSpPr>
+            <a:spLocks noGrp="1"/>
+          </p:cNvSpPr>
+          <p:nvPr>
+            <p:ph type="body"/>
+          </p:nvPr>
+        </p:nvSpPr>
+        <p:spPr>
+          <a:xfrm>
+            <a:off x="1645920" y="5135040"/>
+            <a:ext cx="29625840" cy="12727440"/>
+          </a:xfrm>
+          <a:prstGeom prst="rect">
+            <a:avLst/>
+          </a:prstGeom>
+        </p:spPr>
+        <p:txBody>
+          <a:bodyPr lIns="0" rIns="0" tIns="0" bIns="0">
+            <a:normAutofit/>
+          </a:bodyPr>
+          <a:p>
+            <a:pPr marL="432000" indent="-324000">
+              <a:spcBef>
+                <a:spcPts val="1417"/>
+              </a:spcBef>
+              <a:buClr>
+                <a:srgbClr val="000000"/>
+              </a:buClr>
+              <a:buSzPct val="45000"/>
+              <a:buFont typeface="Wingdings" charset="2"/>
+              <a:buChar char=""/>
             </a:pPr>
             <a:r>
-              <a:rPr b="0" lang="en-US" sz="18000" spc="-1" strike="noStrike">
-                <a:solidFill>
-                  <a:srgbClr val="000000"/>
-                </a:solidFill>
-                <a:latin typeface="Gill Sans"/>
-                <a:ea typeface="Gill Sans"/>
-              </a:rPr>
-              <a:t>Title Text</a:t>
-            </a:r>
-            <a:endParaRPr b="0" lang="en-US" sz="18000" spc="-1" strike="noStrike">
-              <a:solidFill>
+              <a:rPr b="0" lang="en-US" sz="1800" spc="-1" strike="noStrike">
+                <a:latin typeface="Arial"/>
+              </a:rPr>
+              <a:t>Click to edit the outline text format</a:t>
+            </a:r>
+            <a:endParaRPr b="0" lang="en-US" sz="1800" spc="-1" strike="noStrike">
+              <a:latin typeface="Arial"/>
+            </a:endParaRPr>
+          </a:p>
+          <a:p>
+            <a:pPr lvl="1" marL="864000" indent="-324000">
+              <a:spcBef>
+                <a:spcPts val="1134"/>
+              </a:spcBef>
+              <a:buClr>
                 <a:srgbClr val="000000"/>
-              </a:solidFill>
-              <a:latin typeface="Gill Sans"/>
-            </a:endParaRPr>
-          </a:p>
-        </p:txBody>
-      </p:sp>
-      <p:sp>
-        <p:nvSpPr>
-          <p:cNvPr id="1" name="PlaceHolder 2"/>
-          <p:cNvSpPr>
-            <a:spLocks noGrp="1"/>
-          </p:cNvSpPr>
-          <p:nvPr>
-            <p:ph type="body"/>
-          </p:nvPr>
-        </p:nvSpPr>
-        <p:spPr>
-          <a:xfrm>
-            <a:off x="2346840" y="11315880"/>
-            <a:ext cx="28224720" cy="2542680"/>
-          </a:xfrm>
-          <a:prstGeom prst="rect">
-            <a:avLst/>
-          </a:prstGeom>
-        </p:spPr>
-        <p:txBody>
-          <a:bodyPr lIns="50760" rIns="50760" tIns="50760" bIns="50760"/>
-          <a:p>
-            <a:pPr algn="ctr">
-              <a:lnSpc>
-                <a:spcPct val="100000"/>
-              </a:lnSpc>
+              </a:buClr>
+              <a:buSzPct val="75000"/>
+              <a:buFont typeface="Symbol" charset="2"/>
+              <a:buChar char=""/>
             </a:pPr>
             <a:r>
-              <a:rPr b="0" lang="en-US" sz="7650" spc="-1" strike="noStrike">
-                <a:solidFill>
-                  <a:srgbClr val="000000"/>
-                </a:solidFill>
-                <a:latin typeface="Gill Sans"/>
-                <a:ea typeface="Gill Sans"/>
-              </a:rPr>
-              <a:t>Body Level One</a:t>
-            </a:r>
-            <a:endParaRPr b="0" lang="en-US" sz="7650" spc="-1" strike="noStrike">
-              <a:solidFill>
+              <a:rPr b="0" lang="en-US" sz="1800" spc="-1" strike="noStrike">
+                <a:latin typeface="Arial"/>
+              </a:rPr>
+              <a:t>Second Outline Level</a:t>
+            </a:r>
+            <a:endParaRPr b="0" lang="en-US" sz="1800" spc="-1" strike="noStrike">
+              <a:latin typeface="Arial"/>
+            </a:endParaRPr>
+          </a:p>
+          <a:p>
+            <a:pPr lvl="2" marL="1296000" indent="-288000">
+              <a:spcBef>
+                <a:spcPts val="850"/>
+              </a:spcBef>
+              <a:buClr>
                 <a:srgbClr val="000000"/>
-              </a:solidFill>
-              <a:latin typeface="Gill Sans"/>
-            </a:endParaRPr>
-          </a:p>
-          <a:p>
-            <a:pPr algn="ctr">
-              <a:lnSpc>
-                <a:spcPct val="100000"/>
-              </a:lnSpc>
+              </a:buClr>
+              <a:buSzPct val="45000"/>
+              <a:buFont typeface="Wingdings" charset="2"/>
+              <a:buChar char=""/>
             </a:pPr>
             <a:r>
-              <a:rPr b="0" lang="en-US" sz="7650" spc="-1" strike="noStrike">
-                <a:solidFill>
-                  <a:srgbClr val="000000"/>
-                </a:solidFill>
-                <a:latin typeface="Gill Sans"/>
-                <a:ea typeface="Gill Sans"/>
-              </a:rPr>
-              <a:t>Body Level Two</a:t>
-            </a:r>
-            <a:endParaRPr b="0" lang="en-US" sz="7650" spc="-1" strike="noStrike">
-              <a:solidFill>
+              <a:rPr b="0" lang="en-US" sz="1800" spc="-1" strike="noStrike">
+                <a:latin typeface="Arial"/>
+              </a:rPr>
+              <a:t>Third Outline Level</a:t>
+            </a:r>
+            <a:endParaRPr b="0" lang="en-US" sz="1800" spc="-1" strike="noStrike">
+              <a:latin typeface="Arial"/>
+            </a:endParaRPr>
+          </a:p>
+          <a:p>
+            <a:pPr lvl="3" marL="1728000" indent="-216000">
+              <a:spcBef>
+                <a:spcPts val="567"/>
+              </a:spcBef>
+              <a:buClr>
                 <a:srgbClr val="000000"/>
-              </a:solidFill>
-              <a:latin typeface="Gill Sans"/>
-            </a:endParaRPr>
-          </a:p>
-          <a:p>
-            <a:pPr algn="ctr">
-              <a:lnSpc>
-                <a:spcPct val="100000"/>
-              </a:lnSpc>
+              </a:buClr>
+              <a:buSzPct val="75000"/>
+              <a:buFont typeface="Symbol" charset="2"/>
+              <a:buChar char=""/>
             </a:pPr>
             <a:r>
-              <a:rPr b="0" lang="en-US" sz="7650" spc="-1" strike="noStrike">
-                <a:solidFill>
-                  <a:srgbClr val="000000"/>
-                </a:solidFill>
-                <a:latin typeface="Gill Sans"/>
-                <a:ea typeface="Gill Sans"/>
-              </a:rPr>
-              <a:t>Body Level Three</a:t>
-            </a:r>
-            <a:endParaRPr b="0" lang="en-US" sz="7650" spc="-1" strike="noStrike">
-              <a:solidFill>
+              <a:rPr b="0" lang="en-US" sz="1800" spc="-1" strike="noStrike">
+                <a:latin typeface="Arial"/>
+              </a:rPr>
+              <a:t>Fourth Outline Level</a:t>
+            </a:r>
+            <a:endParaRPr b="0" lang="en-US" sz="1800" spc="-1" strike="noStrike">
+              <a:latin typeface="Arial"/>
+            </a:endParaRPr>
+          </a:p>
+          <a:p>
+            <a:pPr lvl="4" marL="2160000" indent="-216000">
+              <a:spcBef>
+                <a:spcPts val="283"/>
+              </a:spcBef>
+              <a:buClr>
                 <a:srgbClr val="000000"/>
-              </a:solidFill>
-              <a:latin typeface="Gill Sans"/>
-            </a:endParaRPr>
-          </a:p>
-          <a:p>
-            <a:pPr algn="ctr">
-              <a:lnSpc>
-                <a:spcPct val="100000"/>
-              </a:lnSpc>
+              </a:buClr>
+              <a:buSzPct val="45000"/>
+              <a:buFont typeface="Wingdings" charset="2"/>
+              <a:buChar char=""/>
             </a:pPr>
             <a:r>
-              <a:rPr b="0" lang="en-US" sz="7650" spc="-1" strike="noStrike">
-                <a:solidFill>
-                  <a:srgbClr val="000000"/>
-                </a:solidFill>
-                <a:latin typeface="Gill Sans"/>
-                <a:ea typeface="Gill Sans"/>
-              </a:rPr>
-              <a:t>Body Level Four</a:t>
-            </a:r>
-            <a:endParaRPr b="0" lang="en-US" sz="7650" spc="-1" strike="noStrike">
-              <a:solidFill>
+              <a:rPr b="0" lang="en-US" sz="1800" spc="-1" strike="noStrike">
+                <a:latin typeface="Arial"/>
+              </a:rPr>
+              <a:t>Fifth Outline Level</a:t>
+            </a:r>
+            <a:endParaRPr b="0" lang="en-US" sz="1800" spc="-1" strike="noStrike">
+              <a:latin typeface="Arial"/>
+            </a:endParaRPr>
+          </a:p>
+          <a:p>
+            <a:pPr lvl="5" marL="2592000" indent="-216000">
+              <a:spcBef>
+                <a:spcPts val="283"/>
+              </a:spcBef>
+              <a:buClr>
                 <a:srgbClr val="000000"/>
-              </a:solidFill>
-              <a:latin typeface="Gill Sans"/>
-            </a:endParaRPr>
-          </a:p>
-          <a:p>
-            <a:pPr algn="ctr">
-              <a:lnSpc>
-                <a:spcPct val="100000"/>
-              </a:lnSpc>
+              </a:buClr>
+              <a:buSzPct val="45000"/>
+              <a:buFont typeface="Wingdings" charset="2"/>
+              <a:buChar char=""/>
             </a:pPr>
             <a:r>
-              <a:rPr b="0" lang="en-US" sz="7650" spc="-1" strike="noStrike">
-                <a:solidFill>
-                  <a:srgbClr val="000000"/>
-                </a:solidFill>
-                <a:latin typeface="Gill Sans"/>
-                <a:ea typeface="Gill Sans"/>
-              </a:rPr>
-              <a:t>Body Level Five</a:t>
-            </a:r>
-            <a:endParaRPr b="0" lang="en-US" sz="7650" spc="-1" strike="noStrike">
-              <a:solidFill>
+              <a:rPr b="0" lang="en-US" sz="1800" spc="-1" strike="noStrike">
+                <a:latin typeface="Arial"/>
+              </a:rPr>
+              <a:t>Sixth Outline Level</a:t>
+            </a:r>
+            <a:endParaRPr b="0" lang="en-US" sz="1800" spc="-1" strike="noStrike">
+              <a:latin typeface="Arial"/>
+            </a:endParaRPr>
+          </a:p>
+          <a:p>
+            <a:pPr lvl="6" marL="3024000" indent="-216000">
+              <a:spcBef>
+                <a:spcPts val="283"/>
+              </a:spcBef>
+              <a:buClr>
                 <a:srgbClr val="000000"/>
-              </a:solidFill>
-              <a:latin typeface="Gill Sans"/>
-            </a:endParaRPr>
-          </a:p>
-        </p:txBody>
-      </p:sp>
-      <p:sp>
-        <p:nvSpPr>
-          <p:cNvPr id="2" name="PlaceHolder 3"/>
-          <p:cNvSpPr>
-            <a:spLocks noGrp="1"/>
-          </p:cNvSpPr>
-          <p:nvPr>
-            <p:ph type="sldNum"/>
-          </p:nvPr>
-        </p:nvSpPr>
-        <p:spPr>
-          <a:xfrm>
-            <a:off x="16111800" y="20917080"/>
-            <a:ext cx="660240" cy="656280"/>
-          </a:xfrm>
-          <a:prstGeom prst="rect">
-            <a:avLst/>
-          </a:prstGeom>
-        </p:spPr>
-        <p:txBody>
-          <a:bodyPr lIns="50760" rIns="50760" tIns="50760" bIns="50760"/>
-          <a:p>
-            <a:pPr algn="ctr">
-              <a:lnSpc>
-                <a:spcPct val="100000"/>
-              </a:lnSpc>
+              </a:buClr>
+              <a:buSzPct val="45000"/>
+              <a:buFont typeface="Wingdings" charset="2"/>
+              <a:buChar char=""/>
             </a:pPr>
-            <a:fld id="{F025E60F-1664-4BDA-9F2A-924ED35982A6}" type="slidenum">
-              <a:rPr b="0" lang="en-US" sz="3600" spc="-1" strike="noStrike">
-                <a:solidFill>
-                  <a:srgbClr val="000000"/>
-                </a:solidFill>
-                <a:latin typeface="Gill Sans"/>
-                <a:ea typeface="Gill Sans"/>
-              </a:rPr>
-              <a:t>&lt;number&gt;</a:t>
-            </a:fld>
-            <a:endParaRPr b="0" lang="en-US" sz="3600" spc="-1" strike="noStrike">
-              <a:latin typeface="Times New Roman"/>
+            <a:r>
+              <a:rPr b="0" lang="en-US" sz="1800" spc="-1" strike="noStrike">
+                <a:latin typeface="Arial"/>
+              </a:rPr>
+              <a:t>Seventh Outline Level</a:t>
+            </a:r>
+            <a:endParaRPr b="0" lang="en-US" sz="1800" spc="-1" strike="noStrike">
+              <a:latin typeface="Arial"/>
             </a:endParaRPr>
           </a:p>
         </p:txBody>
@@ -1736,14 +1620,14 @@
       </p:grpSpPr>
       <p:sp>
         <p:nvSpPr>
-          <p:cNvPr id="39" name="CustomShape 1"/>
+          <p:cNvPr id="38" name="CustomShape 1"/>
           <p:cNvSpPr/>
           <p:nvPr/>
         </p:nvSpPr>
         <p:spPr>
           <a:xfrm>
             <a:off x="777960" y="425520"/>
-            <a:ext cx="19059120" cy="2377080"/>
+            <a:ext cx="19058400" cy="2376360"/>
           </a:xfrm>
           <a:prstGeom prst="rect">
             <a:avLst/>
@@ -1815,14 +1699,14 @@
       </p:sp>
       <p:sp>
         <p:nvSpPr>
-          <p:cNvPr id="40" name="CustomShape 2"/>
+          <p:cNvPr id="39" name="CustomShape 2"/>
           <p:cNvSpPr/>
           <p:nvPr/>
         </p:nvSpPr>
         <p:spPr>
           <a:xfrm>
             <a:off x="10093320" y="3225960"/>
-            <a:ext cx="21976920" cy="5028840"/>
+            <a:ext cx="21976200" cy="5028120"/>
           </a:xfrm>
           <a:prstGeom prst="rect">
             <a:avLst/>
@@ -1846,7 +1730,7 @@
       </p:sp>
       <p:pic>
         <p:nvPicPr>
-          <p:cNvPr id="41" name="droppedImage.png" descr=""/>
+          <p:cNvPr id="40" name="droppedImage.png" descr=""/>
           <p:cNvPicPr/>
           <p:nvPr/>
         </p:nvPicPr>
@@ -1857,7 +1741,7 @@
         <p:spPr>
           <a:xfrm>
             <a:off x="22869000" y="3994920"/>
-            <a:ext cx="8699040" cy="2125440"/>
+            <a:ext cx="8698320" cy="2124720"/>
           </a:xfrm>
           <a:prstGeom prst="rect">
             <a:avLst/>
@@ -1869,14 +1753,14 @@
       </p:pic>
       <p:sp>
         <p:nvSpPr>
-          <p:cNvPr id="42" name="CustomShape 3"/>
+          <p:cNvPr id="41" name="CustomShape 3"/>
           <p:cNvSpPr/>
           <p:nvPr/>
         </p:nvSpPr>
         <p:spPr>
           <a:xfrm>
             <a:off x="10093320" y="8454960"/>
-            <a:ext cx="21976920" cy="5028840"/>
+            <a:ext cx="21976200" cy="5028120"/>
           </a:xfrm>
           <a:prstGeom prst="rect">
             <a:avLst/>
@@ -1900,14 +1784,14 @@
       </p:sp>
       <p:sp>
         <p:nvSpPr>
-          <p:cNvPr id="43" name="CustomShape 4"/>
+          <p:cNvPr id="42" name="CustomShape 4"/>
           <p:cNvSpPr/>
           <p:nvPr/>
         </p:nvSpPr>
         <p:spPr>
           <a:xfrm>
             <a:off x="10093320" y="13684320"/>
-            <a:ext cx="21976920" cy="5028840"/>
+            <a:ext cx="21976200" cy="5028120"/>
           </a:xfrm>
           <a:prstGeom prst="rect">
             <a:avLst/>
@@ -1931,14 +1815,14 @@
       </p:sp>
       <p:sp>
         <p:nvSpPr>
-          <p:cNvPr id="44" name="CustomShape 5"/>
+          <p:cNvPr id="43" name="CustomShape 5"/>
           <p:cNvSpPr/>
           <p:nvPr/>
         </p:nvSpPr>
         <p:spPr>
           <a:xfrm>
             <a:off x="663480" y="18913320"/>
-            <a:ext cx="31406760" cy="2571480"/>
+            <a:ext cx="31406040" cy="2570760"/>
           </a:xfrm>
           <a:prstGeom prst="rect">
             <a:avLst/>
@@ -1962,14 +1846,14 @@
       </p:sp>
       <p:sp>
         <p:nvSpPr>
-          <p:cNvPr id="45" name="CustomShape 6"/>
+          <p:cNvPr id="44" name="CustomShape 6"/>
           <p:cNvSpPr/>
           <p:nvPr/>
         </p:nvSpPr>
         <p:spPr>
           <a:xfrm>
             <a:off x="10179000" y="3282840"/>
-            <a:ext cx="21813480" cy="771120"/>
+            <a:ext cx="21812760" cy="770400"/>
           </a:xfrm>
           <a:prstGeom prst="rect">
             <a:avLst/>
@@ -2031,14 +1915,14 @@
       </p:sp>
       <p:sp>
         <p:nvSpPr>
-          <p:cNvPr id="46" name="CustomShape 7"/>
+          <p:cNvPr id="45" name="CustomShape 7"/>
           <p:cNvSpPr/>
           <p:nvPr/>
         </p:nvSpPr>
         <p:spPr>
           <a:xfrm>
             <a:off x="10179000" y="8512200"/>
-            <a:ext cx="21813480" cy="771120"/>
+            <a:ext cx="21812760" cy="770400"/>
           </a:xfrm>
           <a:prstGeom prst="rect">
             <a:avLst/>
@@ -2100,14 +1984,14 @@
       </p:sp>
       <p:sp>
         <p:nvSpPr>
-          <p:cNvPr id="47" name="CustomShape 8"/>
+          <p:cNvPr id="46" name="CustomShape 8"/>
           <p:cNvSpPr/>
           <p:nvPr/>
         </p:nvSpPr>
         <p:spPr>
           <a:xfrm>
             <a:off x="10179000" y="13741560"/>
-            <a:ext cx="21813480" cy="771120"/>
+            <a:ext cx="21812760" cy="770400"/>
           </a:xfrm>
           <a:prstGeom prst="rect">
             <a:avLst/>
@@ -2169,14 +2053,14 @@
       </p:sp>
       <p:sp>
         <p:nvSpPr>
-          <p:cNvPr id="48" name="CustomShape 9"/>
+          <p:cNvPr id="47" name="CustomShape 9"/>
           <p:cNvSpPr/>
           <p:nvPr/>
         </p:nvSpPr>
         <p:spPr>
           <a:xfrm>
             <a:off x="777960" y="3282840"/>
-            <a:ext cx="8972280" cy="771120"/>
+            <a:ext cx="8971560" cy="770400"/>
           </a:xfrm>
           <a:prstGeom prst="rect">
             <a:avLst/>
@@ -2248,14 +2132,14 @@
       </p:sp>
       <p:sp>
         <p:nvSpPr>
-          <p:cNvPr id="49" name="CustomShape 10"/>
+          <p:cNvPr id="48" name="CustomShape 10"/>
           <p:cNvSpPr/>
           <p:nvPr/>
         </p:nvSpPr>
         <p:spPr>
           <a:xfrm>
             <a:off x="720720" y="18970560"/>
-            <a:ext cx="23688360" cy="771120"/>
+            <a:ext cx="23687640" cy="770400"/>
           </a:xfrm>
           <a:prstGeom prst="rect">
             <a:avLst/>
@@ -2317,14 +2201,14 @@
       </p:sp>
       <p:sp>
         <p:nvSpPr>
-          <p:cNvPr id="50" name="CustomShape 11"/>
+          <p:cNvPr id="49" name="CustomShape 11"/>
           <p:cNvSpPr/>
           <p:nvPr/>
         </p:nvSpPr>
         <p:spPr>
           <a:xfrm>
             <a:off x="863640" y="19770840"/>
-            <a:ext cx="19859400" cy="308520"/>
+            <a:ext cx="19858680" cy="307800"/>
           </a:xfrm>
           <a:prstGeom prst="rect">
             <a:avLst/>
@@ -2389,14 +2273,14 @@
       </p:sp>
       <p:sp>
         <p:nvSpPr>
-          <p:cNvPr id="51" name="CustomShape 12"/>
+          <p:cNvPr id="50" name="CustomShape 12"/>
           <p:cNvSpPr/>
           <p:nvPr/>
         </p:nvSpPr>
         <p:spPr>
           <a:xfrm>
             <a:off x="10436400" y="4197240"/>
-            <a:ext cx="12459960" cy="3808800"/>
+            <a:ext cx="12459240" cy="3808080"/>
           </a:xfrm>
           <a:prstGeom prst="rect">
             <a:avLst/>
@@ -2431,53 +2315,7 @@
                 <a:latin typeface="Cambria"/>
                 <a:ea typeface="American Typewriter"/>
               </a:rPr>
-              <a:t>Lorem ipsum dolor sit amet, consectetur adipiscing elit. Nunc eu libero a mauris mollis luctus. Vivamus lectus dui, suscipit vestibulum massa in, lacinia luctus turpis. Nulla fringilla ante et orci commodo scelerisque.</a:t>
-            </a:r>
-            <a:endParaRPr b="0" lang="en-US" sz="2250" spc="-1" strike="noStrike">
-              <a:latin typeface="Arial"/>
-            </a:endParaRPr>
-          </a:p>
-          <a:p>
-            <a:pPr algn="just">
-              <a:lnSpc>
-                <a:spcPct val="100000"/>
-              </a:lnSpc>
-              <a:spcBef>
-                <a:spcPts val="1001"/>
-              </a:spcBef>
-            </a:pPr>
-            <a:r>
-              <a:rPr b="0" lang="en-US" sz="2250" spc="-1" strike="noStrike">
-                <a:solidFill>
-                  <a:srgbClr val="000000"/>
-                </a:solidFill>
-                <a:latin typeface="Cambria"/>
-                <a:ea typeface="American Typewriter"/>
-              </a:rPr>
-              <a:t>Morbi nec tincidunt arcu. Integer vel nisl viverra leo luctus dignissim vel nec diam. Fusce venenatis pulvinar euismod. Integer interdum nec elit vitae facilisis. Proin nisi erat, vulputate aliquet dui non, finibus scelerisque risus.</a:t>
-            </a:r>
-            <a:endParaRPr b="0" lang="en-US" sz="2250" spc="-1" strike="noStrike">
-              <a:latin typeface="Arial"/>
-            </a:endParaRPr>
-          </a:p>
-          <a:p>
-            <a:pPr algn="just">
-              <a:lnSpc>
-                <a:spcPct val="100000"/>
-              </a:lnSpc>
-              <a:spcBef>
-                <a:spcPts val="1001"/>
-              </a:spcBef>
-            </a:pPr>
-            <a:r>
-              <a:rPr b="0" lang="en-US" sz="2250" spc="-1" strike="noStrike">
-                <a:solidFill>
-                  <a:srgbClr val="000000"/>
-                </a:solidFill>
-                <a:latin typeface="Cambria"/>
-                <a:ea typeface="American Typewriter"/>
-              </a:rPr>
-              <a:t>Lorem ipsum dolor sit amet, consectetur adipiscing elit. Nunc eu libero a mauris mollis luctus. Vivamus lectus dui, suscipit vestibulum massa in, lacinia luctus turpis. Nulla fringilla ante et orci commodo scelerisque. </a:t>
+              <a:t>We began our analysis by building off of three already existent code bases. In order to properly compare these three methods, we manipulated them so that they all had the same input and output format. We then created a script which randomly creates the mass, coordinates, and velocity vectors for each body.</a:t>
             </a:r>
             <a:endParaRPr b="0" lang="en-US" sz="2250" spc="-1" strike="noStrike">
               <a:latin typeface="Arial"/>
@@ -2496,18 +2334,41 @@
               <a:latin typeface="Arial"/>
             </a:endParaRPr>
           </a:p>
-        </p:txBody>
-      </p:sp>
-      <p:sp>
-        <p:nvSpPr>
-          <p:cNvPr id="52" name="CustomShape 13"/>
+          <a:p>
+            <a:pPr algn="just">
+              <a:lnSpc>
+                <a:spcPct val="100000"/>
+              </a:lnSpc>
+              <a:spcBef>
+                <a:spcPts val="1001"/>
+              </a:spcBef>
+            </a:pPr>
+            <a:r>
+              <a:rPr b="0" lang="en-US" sz="2250" spc="-1" strike="noStrike">
+                <a:solidFill>
+                  <a:srgbClr val="000000"/>
+                </a:solidFill>
+                <a:latin typeface="Cambria"/>
+                <a:ea typeface="American Typewriter"/>
+              </a:rPr>
+              <a:t>We are now currently analyzing the code for dependencies so that we can know what regions of code are feasibly parallelizable.  </a:t>
+            </a:r>
+            <a:endParaRPr b="0" lang="en-US" sz="2250" spc="-1" strike="noStrike">
+              <a:latin typeface="Arial"/>
+            </a:endParaRPr>
+          </a:p>
+        </p:txBody>
+      </p:sp>
+      <p:sp>
+        <p:nvSpPr>
+          <p:cNvPr id="51" name="CustomShape 13"/>
           <p:cNvSpPr/>
           <p:nvPr/>
         </p:nvSpPr>
         <p:spPr>
           <a:xfrm>
             <a:off x="23321880" y="6608520"/>
-            <a:ext cx="7793640" cy="1540440"/>
+            <a:ext cx="7792920" cy="1539720"/>
           </a:xfrm>
           <a:prstGeom prst="rect">
             <a:avLst/>
@@ -2552,7 +2413,7 @@
       </p:sp>
       <p:pic>
         <p:nvPicPr>
-          <p:cNvPr id="53" name="droppedImage.png" descr=""/>
+          <p:cNvPr id="52" name="droppedImage.png" descr=""/>
           <p:cNvPicPr/>
           <p:nvPr/>
         </p:nvPicPr>
@@ -2563,7 +2424,30 @@
         <p:spPr>
           <a:xfrm>
             <a:off x="27261360" y="14217480"/>
-            <a:ext cx="4185720" cy="2150640"/>
+            <a:ext cx="4185000" cy="2149920"/>
+          </a:xfrm>
+          <a:prstGeom prst="rect">
+            <a:avLst/>
+          </a:prstGeom>
+          <a:ln w="12600">
+            <a:noFill/>
+          </a:ln>
+        </p:spPr>
+      </p:pic>
+      <p:pic>
+        <p:nvPicPr>
+          <p:cNvPr id="53" name="droppedImage.png" descr=""/>
+          <p:cNvPicPr/>
+          <p:nvPr/>
+        </p:nvPicPr>
+        <p:blipFill>
+          <a:blip r:embed="rId3"/>
+          <a:stretch/>
+        </p:blipFill>
+        <p:spPr>
+          <a:xfrm>
+            <a:off x="23103720" y="15292800"/>
+            <a:ext cx="3793320" cy="3027960"/>
           </a:xfrm>
           <a:prstGeom prst="rect">
             <a:avLst/>
@@ -2580,13 +2464,13 @@
           <p:nvPr/>
         </p:nvPicPr>
         <p:blipFill>
-          <a:blip r:embed="rId3"/>
+          <a:blip r:embed="rId4"/>
           <a:stretch/>
         </p:blipFill>
         <p:spPr>
           <a:xfrm>
-            <a:off x="23103720" y="15292800"/>
-            <a:ext cx="3794040" cy="3028680"/>
+            <a:off x="27577440" y="16694640"/>
+            <a:ext cx="3552480" cy="1570680"/>
           </a:xfrm>
           <a:prstGeom prst="rect">
             <a:avLst/>
@@ -2596,39 +2480,16 @@
           </a:ln>
         </p:spPr>
       </p:pic>
-      <p:pic>
-        <p:nvPicPr>
-          <p:cNvPr id="55" name="droppedImage.png" descr=""/>
-          <p:cNvPicPr/>
-          <p:nvPr/>
-        </p:nvPicPr>
-        <p:blipFill>
-          <a:blip r:embed="rId4"/>
-          <a:stretch/>
-        </p:blipFill>
-        <p:spPr>
-          <a:xfrm>
-            <a:off x="27577440" y="16694640"/>
-            <a:ext cx="3553200" cy="1571400"/>
-          </a:xfrm>
-          <a:prstGeom prst="rect">
-            <a:avLst/>
-          </a:prstGeom>
-          <a:ln w="12600">
-            <a:noFill/>
-          </a:ln>
-        </p:spPr>
-      </p:pic>
-      <p:sp>
-        <p:nvSpPr>
-          <p:cNvPr id="56" name="CustomShape 14"/>
+      <p:sp>
+        <p:nvSpPr>
+          <p:cNvPr id="55" name="CustomShape 14"/>
           <p:cNvSpPr/>
           <p:nvPr/>
         </p:nvSpPr>
         <p:spPr>
           <a:xfrm>
             <a:off x="10436400" y="14998680"/>
-            <a:ext cx="11773080" cy="3313800"/>
+            <a:ext cx="11772360" cy="3313080"/>
           </a:xfrm>
           <a:prstGeom prst="rect">
             <a:avLst/>
@@ -2779,14 +2640,14 @@
       </p:sp>
       <p:sp>
         <p:nvSpPr>
-          <p:cNvPr id="57" name="CustomShape 15"/>
+          <p:cNvPr id="56" name="CustomShape 15"/>
           <p:cNvSpPr/>
           <p:nvPr/>
         </p:nvSpPr>
         <p:spPr>
           <a:xfrm>
             <a:off x="1115280" y="4282920"/>
-            <a:ext cx="8400600" cy="2056680"/>
+            <a:ext cx="8399880" cy="2055960"/>
           </a:xfrm>
           <a:prstGeom prst="rect">
             <a:avLst/>
@@ -2821,17 +2682,7 @@
                 <a:latin typeface="Cambria"/>
                 <a:ea typeface="American Typewriter"/>
               </a:rPr>
-              <a:t>The N-Body Problem seeks to simulate forces between bodies. The problem of simulation when n &lt; 3 is trivial, however, when n &gt;= 3, simulation becomes computationally intensive. The three approaches we examined to the N-Body problem seek to speed up simulation by parallelizing the </a:t>
-            </a:r>
-            <a:r>
-              <a:rPr b="0" lang="en-US" sz="2250" spc="-1" strike="noStrike">
-                <a:solidFill>
-                  <a:srgbClr val="000000"/>
-                </a:solidFill>
-                <a:latin typeface="Cambria"/>
-                <a:ea typeface="American Typewriter"/>
-              </a:rPr>
-              <a:t>computation of forces.</a:t>
+              <a:t>The N-Body Problem seeks to simulate forces between bodies. The problem of simulation when n &lt; 3 is trivial, however, when n &gt;= 3, simulation becomes computationally intensive. The three approaches we examined to the N-Body problem seek to speed up simulation by parallelizing the computation of forces.</a:t>
             </a:r>
             <a:endParaRPr b="0" lang="en-US" sz="2250" spc="-1" strike="noStrike">
               <a:latin typeface="Arial"/>
@@ -2841,14 +2692,14 @@
       </p:sp>
       <p:sp>
         <p:nvSpPr>
-          <p:cNvPr id="58" name="CustomShape 16"/>
+          <p:cNvPr id="57" name="CustomShape 16"/>
           <p:cNvSpPr/>
           <p:nvPr/>
         </p:nvSpPr>
         <p:spPr>
           <a:xfrm>
             <a:off x="1206360" y="8854920"/>
-            <a:ext cx="3657240" cy="616680"/>
+            <a:ext cx="3656520" cy="615960"/>
           </a:xfrm>
           <a:prstGeom prst="rect">
             <a:avLst/>
@@ -2893,7 +2744,7 @@
       </p:sp>
       <p:pic>
         <p:nvPicPr>
-          <p:cNvPr id="59" name="droppedImage.png" descr=""/>
+          <p:cNvPr id="58" name="droppedImage.png" descr=""/>
           <p:cNvPicPr/>
           <p:nvPr/>
         </p:nvPicPr>
@@ -2904,7 +2755,7 @@
         <p:spPr>
           <a:xfrm>
             <a:off x="1521000" y="6796440"/>
-            <a:ext cx="2914200" cy="1945080"/>
+            <a:ext cx="2913480" cy="1944360"/>
           </a:xfrm>
           <a:prstGeom prst="rect">
             <a:avLst/>
@@ -2916,7 +2767,7 @@
       </p:pic>
       <p:pic>
         <p:nvPicPr>
-          <p:cNvPr id="60" name="droppedImage.png" descr=""/>
+          <p:cNvPr id="59" name="droppedImage.png" descr=""/>
           <p:cNvPicPr/>
           <p:nvPr/>
         </p:nvPicPr>
@@ -2927,7 +2778,7 @@
         <p:spPr>
           <a:xfrm>
             <a:off x="5692680" y="6833880"/>
-            <a:ext cx="2914200" cy="1870200"/>
+            <a:ext cx="2913480" cy="1869480"/>
           </a:xfrm>
           <a:prstGeom prst="rect">
             <a:avLst/>
@@ -2939,14 +2790,14 @@
       </p:pic>
       <p:sp>
         <p:nvSpPr>
-          <p:cNvPr id="61" name="CustomShape 17"/>
+          <p:cNvPr id="60" name="CustomShape 17"/>
           <p:cNvSpPr/>
           <p:nvPr/>
         </p:nvSpPr>
         <p:spPr>
           <a:xfrm>
             <a:off x="5321160" y="8854920"/>
-            <a:ext cx="3657240" cy="308520"/>
+            <a:ext cx="3656520" cy="307800"/>
           </a:xfrm>
           <a:prstGeom prst="rect">
             <a:avLst/>
@@ -2991,14 +2842,14 @@
       </p:sp>
       <p:sp>
         <p:nvSpPr>
-          <p:cNvPr id="62" name="CustomShape 18"/>
+          <p:cNvPr id="61" name="CustomShape 18"/>
           <p:cNvSpPr/>
           <p:nvPr/>
         </p:nvSpPr>
         <p:spPr>
           <a:xfrm>
             <a:off x="1143720" y="10083960"/>
-            <a:ext cx="8400600" cy="7616520"/>
+            <a:ext cx="8399880" cy="7615800"/>
           </a:xfrm>
           <a:prstGeom prst="rect">
             <a:avLst/>
@@ -3151,14 +3002,14 @@
       </p:sp>
       <p:sp>
         <p:nvSpPr>
-          <p:cNvPr id="63" name="CustomShape 19"/>
+          <p:cNvPr id="62" name="CustomShape 19"/>
           <p:cNvSpPr/>
           <p:nvPr/>
         </p:nvSpPr>
         <p:spPr>
           <a:xfrm>
             <a:off x="1115280" y="13798440"/>
-            <a:ext cx="8400600" cy="4740840"/>
+            <a:ext cx="8399880" cy="4740120"/>
           </a:xfrm>
           <a:prstGeom prst="rect">
             <a:avLst/>
@@ -3177,14 +3028,14 @@
       </p:sp>
       <p:sp>
         <p:nvSpPr>
-          <p:cNvPr id="64" name="CustomShape 20"/>
+          <p:cNvPr id="63" name="CustomShape 20"/>
           <p:cNvSpPr/>
           <p:nvPr/>
         </p:nvSpPr>
         <p:spPr>
           <a:xfrm>
             <a:off x="17241840" y="9378720"/>
-            <a:ext cx="14334840" cy="3027240"/>
+            <a:ext cx="14334120" cy="3026520"/>
           </a:xfrm>
           <a:prstGeom prst="rect">
             <a:avLst/>
@@ -3292,7 +3143,7 @@
       </p:sp>
       <p:pic>
         <p:nvPicPr>
-          <p:cNvPr id="65" name="droppedImage.png" descr=""/>
+          <p:cNvPr id="64" name="droppedImage.png" descr=""/>
           <p:cNvPicPr/>
           <p:nvPr/>
         </p:nvPicPr>
@@ -3303,7 +3154,7 @@
         <p:spPr>
           <a:xfrm>
             <a:off x="10951200" y="9980280"/>
-            <a:ext cx="5427000" cy="2400120"/>
+            <a:ext cx="5426280" cy="2399400"/>
           </a:xfrm>
           <a:prstGeom prst="rect">
             <a:avLst/>
@@ -3315,7 +3166,7 @@
       </p:pic>
       <p:pic>
         <p:nvPicPr>
-          <p:cNvPr id="66" name="Picture 2" descr=""/>
+          <p:cNvPr id="65" name="Picture 2" descr=""/>
           <p:cNvPicPr/>
           <p:nvPr/>
         </p:nvPicPr>
@@ -3326,7 +3177,7 @@
         <p:spPr>
           <a:xfrm>
             <a:off x="25001280" y="345600"/>
-            <a:ext cx="7069320" cy="2394000"/>
+            <a:ext cx="7068600" cy="2393280"/>
           </a:xfrm>
           <a:prstGeom prst="rect">
             <a:avLst/>

</xml_diff>

<commit_message>
Images added, progress made on methods
</commit_message>
<xml_diff>
--- a/nBodyPoster.pptx
+++ b/nBodyPoster.pptx
@@ -1394,7 +1394,13 @@
               <a:rPr b="0" lang="en-US" sz="1800" spc="-1" strike="noStrike">
                 <a:latin typeface="Arial"/>
               </a:rPr>
-              <a:t>Click to edit the title text format</a:t>
+              <a:t>Click to edit the title text </a:t>
+            </a:r>
+            <a:r>
+              <a:rPr b="0" lang="en-US" sz="1800" spc="-1" strike="noStrike">
+                <a:latin typeface="Arial"/>
+              </a:rPr>
+              <a:t>format</a:t>
             </a:r>
             <a:endParaRPr b="0" lang="en-US" sz="1800" spc="-1" strike="noStrike">
               <a:latin typeface="Arial"/>
@@ -1689,7 +1695,17 @@
                 <a:latin typeface="Candara"/>
                 <a:ea typeface="Helvetica Neue Light"/>
               </a:rPr>
-              <a:t>Ben Bole, John Latino, Richard Bimmer, Kevin Kelly</a:t>
+              <a:t>Ben Bole, John Latino, </a:t>
+            </a:r>
+            <a:r>
+              <a:rPr b="0" lang="en-US" sz="4950" spc="-1" strike="noStrike">
+                <a:solidFill>
+                  <a:srgbClr val="000000"/>
+                </a:solidFill>
+                <a:latin typeface="Candara"/>
+                <a:ea typeface="Helvetica Neue Light"/>
+              </a:rPr>
+              <a:t>Kevin Kelly, Richard Bimmer</a:t>
             </a:r>
             <a:endParaRPr b="0" lang="en-US" sz="4950" spc="-1" strike="noStrike">
               <a:latin typeface="Arial"/>
@@ -2208,7 +2224,7 @@
         <p:spPr>
           <a:xfrm>
             <a:off x="863640" y="19770840"/>
-            <a:ext cx="19858680" cy="307800"/>
+            <a:ext cx="31048920" cy="1534680"/>
           </a:xfrm>
           <a:prstGeom prst="rect">
             <a:avLst/>
@@ -2243,7 +2259,7 @@
                 <a:latin typeface="Cambria"/>
                 <a:ea typeface="American Typewriter Condensed"/>
               </a:rPr>
-              <a:t>Claus, Santa. </a:t>
+              <a:t>Jaswinder Pal Singh, Chris Holt, Takashi Totsuka, Anoop Gupta and John L. Hennessy. </a:t>
             </a:r>
             <a:r>
               <a:rPr b="1" lang="en-US" sz="2029" spc="-1" strike="noStrike">
@@ -2253,7 +2269,7 @@
                 <a:latin typeface="Cambria"/>
                 <a:ea typeface="American Typewriter Condensed"/>
               </a:rPr>
-              <a:t>Nine ways to cook reindeer. </a:t>
+              <a:t>Load Balancing and Data Locality in Adaptive Hierarchical N-body Methods: Barnes-Hut, Fast Multipole, and Radiosity</a:t>
             </a:r>
             <a:r>
               <a:rPr b="0" lang="en-US" sz="2029" spc="-1" strike="noStrike">
@@ -2263,7 +2279,27 @@
                 <a:latin typeface="Cambria"/>
                 <a:ea typeface="American Typewriter Condensed"/>
               </a:rPr>
-              <a:t>Classical cookery, Vol 1. 1978</a:t>
+              <a:t>.</a:t>
+            </a:r>
+            <a:r>
+              <a:rPr b="1" lang="en-US" sz="2029" spc="-1" strike="noStrike">
+                <a:solidFill>
+                  <a:srgbClr val="000000"/>
+                </a:solidFill>
+                <a:latin typeface="Cambria"/>
+                <a:ea typeface="American Typewriter Condensed"/>
+              </a:rPr>
+              <a:t> </a:t>
+            </a:r>
+            <a:r>
+              <a:rPr b="0" lang="en-US" sz="2029" spc="-1" strike="noStrike">
+                <a:solidFill>
+                  <a:srgbClr val="000000"/>
+                </a:solidFill>
+                <a:latin typeface="Cambria"/>
+                <a:ea typeface="American Typewriter Condensed"/>
+              </a:rPr>
+              <a:t>Journal of Parallel and Distributed Computing Volume 27, Issue 2, June 1995.</a:t>
             </a:r>
             <a:endParaRPr b="0" lang="en-US" sz="2029" spc="-1" strike="noStrike">
               <a:latin typeface="Arial"/>
@@ -2330,6 +2366,16 @@
                 <a:spcPts val="1001"/>
               </a:spcBef>
             </a:pPr>
+            <a:r>
+              <a:rPr b="0" lang="en-US" sz="2250" spc="-1" strike="noStrike">
+                <a:solidFill>
+                  <a:srgbClr val="000000"/>
+                </a:solidFill>
+                <a:latin typeface="Cambria"/>
+                <a:ea typeface="American Typewriter"/>
+              </a:rPr>
+              <a:t>We then began to perform analysis on the serial versions of these three approaches to the N-Bodies problem.</a:t>
+            </a:r>
             <a:endParaRPr b="0" lang="en-US" sz="2250" spc="-1" strike="noStrike">
               <a:latin typeface="Arial"/>
             </a:endParaRPr>
@@ -2524,113 +2570,7 @@
                 <a:latin typeface="Cambria"/>
                 <a:ea typeface="American Typewriter"/>
               </a:rPr>
-              <a:t>Lorem ipsum dolor sit amet, consectetur adipiscing elit. Nunc eu libero a mauris mollis </a:t>
-            </a:r>
-            <a:r>
-              <a:rPr b="1" lang="en-US" sz="2250" spc="-1" strike="noStrike">
-                <a:solidFill>
-                  <a:srgbClr val="000000"/>
-                </a:solidFill>
-                <a:latin typeface="Cambria"/>
-                <a:ea typeface="American Typewriter"/>
-              </a:rPr>
-              <a:t>luctus</a:t>
-            </a:r>
-            <a:r>
-              <a:rPr b="0" lang="en-US" sz="2250" spc="-1" strike="noStrike">
-                <a:solidFill>
-                  <a:srgbClr val="000000"/>
-                </a:solidFill>
-                <a:latin typeface="Cambria"/>
-                <a:ea typeface="American Typewriter"/>
-              </a:rPr>
-              <a:t>. Vivamus lectus dui, suscipit vestibulum massa in, lacinia luctus turpis. Nulla fringilla ante et orci commodo scelerisque. </a:t>
-            </a:r>
-            <a:endParaRPr b="0" lang="en-US" sz="2250" spc="-1" strike="noStrike">
-              <a:latin typeface="Arial"/>
-            </a:endParaRPr>
-          </a:p>
-          <a:p>
-            <a:pPr algn="just">
-              <a:lnSpc>
-                <a:spcPct val="100000"/>
-              </a:lnSpc>
-              <a:spcBef>
-                <a:spcPts val="901"/>
-              </a:spcBef>
-            </a:pPr>
-            <a:r>
-              <a:rPr b="0" lang="en-US" sz="2250" spc="-1" strike="noStrike">
-                <a:solidFill>
-                  <a:srgbClr val="000000"/>
-                </a:solidFill>
-                <a:latin typeface="Cambria"/>
-                <a:ea typeface="American Typewriter"/>
-              </a:rPr>
-              <a:t>Lorem ipsum dolor sit </a:t>
-            </a:r>
-            <a:r>
-              <a:rPr b="1" lang="en-US" sz="2250" spc="-1" strike="noStrike">
-                <a:solidFill>
-                  <a:srgbClr val="000000"/>
-                </a:solidFill>
-                <a:latin typeface="Cambria"/>
-                <a:ea typeface="American Typewriter"/>
-              </a:rPr>
-              <a:t>amet</a:t>
-            </a:r>
-            <a:r>
-              <a:rPr b="0" lang="en-US" sz="2250" spc="-1" strike="noStrike">
-                <a:solidFill>
-                  <a:srgbClr val="000000"/>
-                </a:solidFill>
-                <a:latin typeface="Cambria"/>
-                <a:ea typeface="American Typewriter"/>
-              </a:rPr>
-              <a:t>, consectetur adipiscing elit. Nunc eu libero a mauris mollis luctus. Vivamus lectus dui, suscipit vestibulum massa in, lacinia luctus turpis. Nulla fringilla </a:t>
-            </a:r>
-            <a:r>
-              <a:rPr b="1" lang="en-US" sz="2250" spc="-1" strike="noStrike">
-                <a:solidFill>
-                  <a:srgbClr val="000000"/>
-                </a:solidFill>
-                <a:latin typeface="Cambria"/>
-                <a:ea typeface="American Typewriter"/>
-              </a:rPr>
-              <a:t>ante</a:t>
-            </a:r>
-            <a:r>
-              <a:rPr b="0" lang="en-US" sz="2250" spc="-1" strike="noStrike">
-                <a:solidFill>
-                  <a:srgbClr val="000000"/>
-                </a:solidFill>
-                <a:latin typeface="Cambria"/>
-                <a:ea typeface="American Typewriter"/>
-              </a:rPr>
-              <a:t> et orci commodo scelerisque.</a:t>
-            </a:r>
-            <a:endParaRPr b="0" lang="en-US" sz="2250" spc="-1" strike="noStrike">
-              <a:latin typeface="Arial"/>
-            </a:endParaRPr>
-          </a:p>
-          <a:p>
-            <a:pPr algn="just">
-              <a:lnSpc>
-                <a:spcPct val="100000"/>
-              </a:lnSpc>
-              <a:spcBef>
-                <a:spcPts val="901"/>
-              </a:spcBef>
-            </a:pPr>
-            <a:r>
-              <a:rPr b="0" lang="en-US" sz="2250" spc="-1" strike="noStrike">
-                <a:solidFill>
-                  <a:srgbClr val="000000"/>
-                </a:solidFill>
-                <a:latin typeface="Cambria"/>
-                <a:ea typeface="American Typewriter"/>
-              </a:rPr>
-              <a:t>Lorem ipsum dolor sit amet, consectetur adipiscing elit. Nunc eu libero a mauris mollis luctus. Vivamus lectus dui, suscipit vestibulum massa in, lacinia luctus turpis. Nulla fringilla ante et orci commodo scelerisque. </a:t>
+              <a:t>Since most of the computation each approach is uses arrays/matrices, we could perform those operations on GPUs in order to speed up performance.</a:t>
             </a:r>
             <a:endParaRPr b="0" lang="en-US" sz="2250" spc="-1" strike="noStrike">
               <a:latin typeface="Arial"/>
@@ -2697,9 +2637,9 @@
           <p:nvPr/>
         </p:nvSpPr>
         <p:spPr>
-          <a:xfrm>
-            <a:off x="1206360" y="8854920"/>
-            <a:ext cx="3656520" cy="615960"/>
+          <a:xfrm rot="21595800">
+            <a:off x="2469240" y="11999520"/>
+            <a:ext cx="5029200" cy="615960"/>
           </a:xfrm>
           <a:prstGeom prst="rect">
             <a:avLst/>
@@ -2734,9 +2674,414 @@
                 <a:latin typeface="Cambria"/>
                 <a:ea typeface="American Typewriter"/>
               </a:rPr>
-              <a:t>Here is a caption for some images</a:t>
+              <a:t>A representation of the Barnes Hut Simulation in two dimensions</a:t>
             </a:r>
             <a:endParaRPr b="0" lang="en-US" sz="2029" spc="-1" strike="noStrike">
+              <a:latin typeface="Arial"/>
+            </a:endParaRPr>
+          </a:p>
+        </p:txBody>
+      </p:sp>
+      <p:sp>
+        <p:nvSpPr>
+          <p:cNvPr id="58" name="CustomShape 17"/>
+          <p:cNvSpPr/>
+          <p:nvPr/>
+        </p:nvSpPr>
+        <p:spPr>
+          <a:xfrm>
+            <a:off x="1115280" y="6740280"/>
+            <a:ext cx="8399880" cy="7615800"/>
+          </a:xfrm>
+          <a:prstGeom prst="rect">
+            <a:avLst/>
+          </a:prstGeom>
+          <a:noFill/>
+          <a:ln w="12600">
+            <a:noFill/>
+          </a:ln>
+        </p:spPr>
+        <p:style>
+          <a:lnRef idx="0"/>
+          <a:fillRef idx="0"/>
+          <a:effectRef idx="0"/>
+          <a:fontRef idx="minor"/>
+        </p:style>
+        <p:txBody>
+          <a:bodyPr lIns="0" rIns="0" tIns="0" bIns="0"/>
+          <a:p>
+            <a:pPr algn="just">
+              <a:lnSpc>
+                <a:spcPct val="100000"/>
+              </a:lnSpc>
+              <a:spcBef>
+                <a:spcPts val="1001"/>
+              </a:spcBef>
+            </a:pPr>
+            <a:r>
+              <a:rPr b="0" lang="en-US" sz="2250" spc="-1" strike="noStrike">
+                <a:solidFill>
+                  <a:srgbClr val="000000"/>
+                </a:solidFill>
+                <a:latin typeface="Cambria"/>
+                <a:ea typeface="American Typewriter"/>
+              </a:rPr>
+              <a:t>We seek to compare the Parker-Sochacki Method (PSM), the Barnes-Hut Simulation (BSM), and the Particle-Particle-Particle Method (P3M) approaches to simulating the N-Body problem, and determine which is the superior approach.</a:t>
+            </a:r>
+            <a:endParaRPr b="0" lang="en-US" sz="2250" spc="-1" strike="noStrike">
+              <a:latin typeface="Arial"/>
+            </a:endParaRPr>
+          </a:p>
+          <a:p>
+            <a:pPr algn="just">
+              <a:lnSpc>
+                <a:spcPct val="100000"/>
+              </a:lnSpc>
+              <a:spcBef>
+                <a:spcPts val="1001"/>
+              </a:spcBef>
+            </a:pPr>
+            <a:endParaRPr b="0" lang="en-US" sz="2250" spc="-1" strike="noStrike">
+              <a:latin typeface="Arial"/>
+            </a:endParaRPr>
+          </a:p>
+          <a:p>
+            <a:pPr algn="just">
+              <a:lnSpc>
+                <a:spcPct val="100000"/>
+              </a:lnSpc>
+              <a:spcBef>
+                <a:spcPts val="1001"/>
+              </a:spcBef>
+            </a:pPr>
+            <a:endParaRPr b="0" lang="en-US" sz="2250" spc="-1" strike="noStrike">
+              <a:latin typeface="Arial"/>
+            </a:endParaRPr>
+          </a:p>
+          <a:p>
+            <a:pPr algn="just">
+              <a:lnSpc>
+                <a:spcPct val="100000"/>
+              </a:lnSpc>
+              <a:spcBef>
+                <a:spcPts val="1001"/>
+              </a:spcBef>
+            </a:pPr>
+            <a:endParaRPr b="0" lang="en-US" sz="2250" spc="-1" strike="noStrike">
+              <a:latin typeface="Arial"/>
+            </a:endParaRPr>
+          </a:p>
+          <a:p>
+            <a:pPr algn="just">
+              <a:lnSpc>
+                <a:spcPct val="100000"/>
+              </a:lnSpc>
+              <a:spcBef>
+                <a:spcPts val="1001"/>
+              </a:spcBef>
+            </a:pPr>
+            <a:endParaRPr b="0" lang="en-US" sz="2250" spc="-1" strike="noStrike">
+              <a:latin typeface="Arial"/>
+            </a:endParaRPr>
+          </a:p>
+          <a:p>
+            <a:pPr algn="just">
+              <a:lnSpc>
+                <a:spcPct val="100000"/>
+              </a:lnSpc>
+              <a:spcBef>
+                <a:spcPts val="1001"/>
+              </a:spcBef>
+            </a:pPr>
+            <a:endParaRPr b="0" lang="en-US" sz="2250" spc="-1" strike="noStrike">
+              <a:latin typeface="Arial"/>
+            </a:endParaRPr>
+          </a:p>
+          <a:p>
+            <a:pPr algn="just">
+              <a:lnSpc>
+                <a:spcPct val="100000"/>
+              </a:lnSpc>
+              <a:spcBef>
+                <a:spcPts val="1001"/>
+              </a:spcBef>
+            </a:pPr>
+            <a:endParaRPr b="0" lang="en-US" sz="2250" spc="-1" strike="noStrike">
+              <a:latin typeface="Arial"/>
+            </a:endParaRPr>
+          </a:p>
+          <a:p>
+            <a:pPr algn="just">
+              <a:lnSpc>
+                <a:spcPct val="100000"/>
+              </a:lnSpc>
+              <a:spcBef>
+                <a:spcPts val="1001"/>
+              </a:spcBef>
+            </a:pPr>
+            <a:endParaRPr b="0" lang="en-US" sz="2250" spc="-1" strike="noStrike">
+              <a:latin typeface="Arial"/>
+            </a:endParaRPr>
+          </a:p>
+          <a:p>
+            <a:pPr algn="just">
+              <a:lnSpc>
+                <a:spcPct val="100000"/>
+              </a:lnSpc>
+              <a:spcBef>
+                <a:spcPts val="1001"/>
+              </a:spcBef>
+            </a:pPr>
+            <a:endParaRPr b="0" lang="en-US" sz="2250" spc="-1" strike="noStrike">
+              <a:latin typeface="Arial"/>
+            </a:endParaRPr>
+          </a:p>
+          <a:p>
+            <a:pPr algn="just">
+              <a:lnSpc>
+                <a:spcPct val="100000"/>
+              </a:lnSpc>
+              <a:spcBef>
+                <a:spcPts val="1001"/>
+              </a:spcBef>
+            </a:pPr>
+            <a:endParaRPr b="0" lang="en-US" sz="2250" spc="-1" strike="noStrike">
+              <a:latin typeface="Arial"/>
+            </a:endParaRPr>
+          </a:p>
+          <a:p>
+            <a:pPr algn="just">
+              <a:lnSpc>
+                <a:spcPct val="100000"/>
+              </a:lnSpc>
+              <a:spcBef>
+                <a:spcPts val="1001"/>
+              </a:spcBef>
+            </a:pPr>
+            <a:r>
+              <a:rPr b="0" lang="en-US" sz="2250" spc="-1" strike="noStrike">
+                <a:solidFill>
+                  <a:srgbClr val="000000"/>
+                </a:solidFill>
+                <a:latin typeface="Cambria"/>
+                <a:ea typeface="American Typewriter"/>
+              </a:rPr>
+              <a:t>The Barnes-Hut Simulation seeks to treat the space as a tree, recursively divided until each leaf node contains either one or zero bodies. Because of the tree structure BHS uses, it has a runtime of O(nlogn).</a:t>
+            </a:r>
+            <a:endParaRPr b="0" lang="en-US" sz="2250" spc="-1" strike="noStrike">
+              <a:latin typeface="Arial"/>
+            </a:endParaRPr>
+          </a:p>
+          <a:p>
+            <a:pPr algn="just">
+              <a:lnSpc>
+                <a:spcPct val="100000"/>
+              </a:lnSpc>
+              <a:spcBef>
+                <a:spcPts val="1001"/>
+              </a:spcBef>
+            </a:pPr>
+            <a:endParaRPr b="0" lang="en-US" sz="2250" spc="-1" strike="noStrike">
+              <a:latin typeface="Arial"/>
+            </a:endParaRPr>
+          </a:p>
+          <a:p>
+            <a:pPr algn="just">
+              <a:lnSpc>
+                <a:spcPct val="100000"/>
+              </a:lnSpc>
+              <a:spcBef>
+                <a:spcPts val="1001"/>
+              </a:spcBef>
+            </a:pPr>
+            <a:r>
+              <a:rPr b="0" lang="en-US" sz="2250" spc="-1" strike="noStrike">
+                <a:solidFill>
+                  <a:srgbClr val="000000"/>
+                </a:solidFill>
+                <a:latin typeface="Cambria"/>
+                <a:ea typeface="American Typewriter"/>
+              </a:rPr>
+              <a:t>The Parker-Sochacki Method seeks to treat the simulation of forces between bodies as a metric space. This allows the simulation to take advantage of many computations which can only be performed on metric spaces.</a:t>
+            </a:r>
+            <a:endParaRPr b="0" lang="en-US" sz="2250" spc="-1" strike="noStrike">
+              <a:latin typeface="Arial"/>
+            </a:endParaRPr>
+          </a:p>
+          <a:p>
+            <a:pPr algn="just">
+              <a:lnSpc>
+                <a:spcPct val="100000"/>
+              </a:lnSpc>
+              <a:spcBef>
+                <a:spcPts val="1001"/>
+              </a:spcBef>
+            </a:pPr>
+            <a:endParaRPr b="0" lang="en-US" sz="2250" spc="-1" strike="noStrike">
+              <a:latin typeface="Arial"/>
+            </a:endParaRPr>
+          </a:p>
+          <a:p>
+            <a:pPr algn="just">
+              <a:lnSpc>
+                <a:spcPct val="100000"/>
+              </a:lnSpc>
+              <a:spcBef>
+                <a:spcPts val="1001"/>
+              </a:spcBef>
+            </a:pPr>
+            <a:r>
+              <a:rPr b="0" lang="en-US" sz="2250" spc="-1" strike="noStrike">
+                <a:solidFill>
+                  <a:srgbClr val="000000"/>
+                </a:solidFill>
+                <a:latin typeface="Cambria"/>
+                <a:ea typeface="American Typewriter"/>
+              </a:rPr>
+              <a:t>The P3M Approach interpolates all bodies to points on a grid. Forces are calculated on points of the grid instead of on individual bodies.</a:t>
+            </a:r>
+            <a:endParaRPr b="0" lang="en-US" sz="2250" spc="-1" strike="noStrike">
+              <a:latin typeface="Arial"/>
+            </a:endParaRPr>
+          </a:p>
+        </p:txBody>
+      </p:sp>
+      <p:sp>
+        <p:nvSpPr>
+          <p:cNvPr id="59" name="CustomShape 18"/>
+          <p:cNvSpPr/>
+          <p:nvPr/>
+        </p:nvSpPr>
+        <p:spPr>
+          <a:xfrm>
+            <a:off x="1115280" y="13798440"/>
+            <a:ext cx="8399880" cy="4740120"/>
+          </a:xfrm>
+          <a:prstGeom prst="rect">
+            <a:avLst/>
+          </a:prstGeom>
+          <a:noFill/>
+          <a:ln w="12600">
+            <a:noFill/>
+          </a:ln>
+        </p:spPr>
+        <p:style>
+          <a:lnRef idx="0"/>
+          <a:fillRef idx="0"/>
+          <a:effectRef idx="0"/>
+          <a:fontRef idx="minor"/>
+        </p:style>
+      </p:sp>
+      <p:sp>
+        <p:nvSpPr>
+          <p:cNvPr id="60" name="CustomShape 19"/>
+          <p:cNvSpPr/>
+          <p:nvPr/>
+        </p:nvSpPr>
+        <p:spPr>
+          <a:xfrm>
+            <a:off x="17241840" y="9378720"/>
+            <a:ext cx="14334120" cy="3026520"/>
+          </a:xfrm>
+          <a:prstGeom prst="rect">
+            <a:avLst/>
+          </a:prstGeom>
+          <a:noFill/>
+          <a:ln w="12600">
+            <a:noFill/>
+          </a:ln>
+        </p:spPr>
+        <p:style>
+          <a:lnRef idx="0"/>
+          <a:fillRef idx="0"/>
+          <a:effectRef idx="0"/>
+          <a:fontRef idx="minor"/>
+        </p:style>
+        <p:txBody>
+          <a:bodyPr lIns="0" rIns="0" tIns="0" bIns="0"/>
+          <a:p>
+            <a:pPr algn="just">
+              <a:lnSpc>
+                <a:spcPct val="100000"/>
+              </a:lnSpc>
+              <a:spcBef>
+                <a:spcPts val="2251"/>
+              </a:spcBef>
+            </a:pPr>
+            <a:r>
+              <a:rPr b="0" lang="en-US" sz="2250" spc="-1" strike="noStrike">
+                <a:solidFill>
+                  <a:srgbClr val="000000"/>
+                </a:solidFill>
+                <a:latin typeface="Cambria"/>
+                <a:ea typeface="American Typewriter"/>
+              </a:rPr>
+              <a:t>Lorem ipsum dolor sit amet, consectetur adipiscing elit. Nunc eu libero a mauris mollis luctus. Vivamus lectus dui, suscipit vestibulum massa in, lacinia luctus turpis. Nulla fringilla ante et orci commodo scelerisque. Morbi nec tincidunt arcu. Integer vel nisl viverra leo luctus dignissim vel nec diam. </a:t>
+            </a:r>
+            <a:endParaRPr b="0" lang="en-US" sz="2250" spc="-1" strike="noStrike">
+              <a:latin typeface="Arial"/>
+            </a:endParaRPr>
+          </a:p>
+          <a:p>
+            <a:pPr algn="just">
+              <a:lnSpc>
+                <a:spcPct val="100000"/>
+              </a:lnSpc>
+              <a:spcBef>
+                <a:spcPts val="2251"/>
+              </a:spcBef>
+            </a:pPr>
+            <a:r>
+              <a:rPr b="0" lang="en-US" sz="2250" spc="-1" strike="noStrike">
+                <a:solidFill>
+                  <a:srgbClr val="000000"/>
+                </a:solidFill>
+                <a:latin typeface="Cambria"/>
+                <a:ea typeface="American Typewriter"/>
+              </a:rPr>
+              <a:t>Fusce venenatis pulvinar euismod. </a:t>
+            </a:r>
+            <a:r>
+              <a:rPr b="1" lang="en-US" sz="2250" spc="-1" strike="noStrike">
+                <a:solidFill>
+                  <a:srgbClr val="000000"/>
+                </a:solidFill>
+                <a:latin typeface="Cambria"/>
+                <a:ea typeface="American Typewriter"/>
+              </a:rPr>
+              <a:t>Integer</a:t>
+            </a:r>
+            <a:r>
+              <a:rPr b="0" lang="en-US" sz="2250" spc="-1" strike="noStrike">
+                <a:solidFill>
+                  <a:srgbClr val="000000"/>
+                </a:solidFill>
+                <a:latin typeface="Cambria"/>
+                <a:ea typeface="American Typewriter"/>
+              </a:rPr>
+              <a:t> </a:t>
+            </a:r>
+            <a:r>
+              <a:rPr b="1" lang="en-US" sz="2250" spc="-1" strike="noStrike">
+                <a:solidFill>
+                  <a:srgbClr val="000000"/>
+                </a:solidFill>
+                <a:latin typeface="Cambria"/>
+                <a:ea typeface="American Typewriter"/>
+              </a:rPr>
+              <a:t>interdum</a:t>
+            </a:r>
+            <a:r>
+              <a:rPr b="0" lang="en-US" sz="2250" spc="-1" strike="noStrike">
+                <a:solidFill>
+                  <a:srgbClr val="000000"/>
+                </a:solidFill>
+                <a:latin typeface="Cambria"/>
+                <a:ea typeface="American Typewriter"/>
+              </a:rPr>
+              <a:t> nec elit vitae facilisis. Proin nisi erat, vulputate aliquet dui non, finibus scelerisque risus. Proin nisi erat, vulputate aliquet dui non, finibus scelerisque risus. Proin nisi erat, vulputate aliquet dui non, finibus scelerisque risus. Proin nisi erat, vulputate aliquet dui non, finibus scelerisque risus.</a:t>
+            </a:r>
+            <a:endParaRPr b="0" lang="en-US" sz="2250" spc="-1" strike="noStrike">
               <a:latin typeface="Arial"/>
             </a:endParaRPr>
           </a:p>
@@ -2744,7 +3089,7 @@
       </p:sp>
       <p:pic>
         <p:nvPicPr>
-          <p:cNvPr id="58" name="droppedImage.png" descr=""/>
+          <p:cNvPr id="61" name="droppedImage.png" descr=""/>
           <p:cNvPicPr/>
           <p:nvPr/>
         </p:nvPicPr>
@@ -2754,8 +3099,8 @@
         </p:blipFill>
         <p:spPr>
           <a:xfrm>
-            <a:off x="1521000" y="6796440"/>
-            <a:ext cx="2913480" cy="1944360"/>
+            <a:off x="10951200" y="9980280"/>
+            <a:ext cx="5426280" cy="2399400"/>
           </a:xfrm>
           <a:prstGeom prst="rect">
             <a:avLst/>
@@ -2767,7 +3112,7 @@
       </p:pic>
       <p:pic>
         <p:nvPicPr>
-          <p:cNvPr id="59" name="droppedImage.png" descr=""/>
+          <p:cNvPr id="62" name="Picture 2" descr=""/>
           <p:cNvPicPr/>
           <p:nvPr/>
         </p:nvPicPr>
@@ -2777,373 +3122,20 @@
         </p:blipFill>
         <p:spPr>
           <a:xfrm>
-            <a:off x="5692680" y="6833880"/>
-            <a:ext cx="2913480" cy="1869480"/>
-          </a:xfrm>
-          <a:prstGeom prst="rect">
-            <a:avLst/>
-          </a:prstGeom>
-          <a:ln w="12600">
+            <a:off x="25001280" y="345600"/>
+            <a:ext cx="7068600" cy="2393280"/>
+          </a:xfrm>
+          <a:prstGeom prst="rect">
+            <a:avLst/>
+          </a:prstGeom>
+          <a:ln>
             <a:noFill/>
           </a:ln>
         </p:spPr>
       </p:pic>
-      <p:sp>
-        <p:nvSpPr>
-          <p:cNvPr id="60" name="CustomShape 17"/>
-          <p:cNvSpPr/>
-          <p:nvPr/>
-        </p:nvSpPr>
-        <p:spPr>
-          <a:xfrm>
-            <a:off x="5321160" y="8854920"/>
-            <a:ext cx="3656520" cy="307800"/>
-          </a:xfrm>
-          <a:prstGeom prst="rect">
-            <a:avLst/>
-          </a:prstGeom>
-          <a:noFill/>
-          <a:ln w="12600">
-            <a:noFill/>
-          </a:ln>
-        </p:spPr>
-        <p:style>
-          <a:lnRef idx="0"/>
-          <a:fillRef idx="0"/>
-          <a:effectRef idx="0"/>
-          <a:fontRef idx="minor"/>
-        </p:style>
-        <p:txBody>
-          <a:bodyPr lIns="0" rIns="0" tIns="0" bIns="0"/>
-          <a:p>
-            <a:pPr algn="ctr">
-              <a:lnSpc>
-                <a:spcPct val="100000"/>
-              </a:lnSpc>
-              <a:spcBef>
-                <a:spcPts val="1001"/>
-              </a:spcBef>
-            </a:pPr>
-            <a:r>
-              <a:rPr b="0" lang="en-US" sz="2029" spc="-1" strike="noStrike">
-                <a:solidFill>
-                  <a:srgbClr val="000000"/>
-                </a:solidFill>
-                <a:latin typeface="Cambria"/>
-                <a:ea typeface="American Typewriter"/>
-              </a:rPr>
-              <a:t>Fig 2. Blah blah blah blah</a:t>
-            </a:r>
-            <a:endParaRPr b="0" lang="en-US" sz="2029" spc="-1" strike="noStrike">
-              <a:latin typeface="Arial"/>
-            </a:endParaRPr>
-          </a:p>
-        </p:txBody>
-      </p:sp>
-      <p:sp>
-        <p:nvSpPr>
-          <p:cNvPr id="61" name="CustomShape 18"/>
-          <p:cNvSpPr/>
-          <p:nvPr/>
-        </p:nvSpPr>
-        <p:spPr>
-          <a:xfrm>
-            <a:off x="1143720" y="10083960"/>
-            <a:ext cx="8399880" cy="7615800"/>
-          </a:xfrm>
-          <a:prstGeom prst="rect">
-            <a:avLst/>
-          </a:prstGeom>
-          <a:noFill/>
-          <a:ln w="12600">
-            <a:noFill/>
-          </a:ln>
-        </p:spPr>
-        <p:style>
-          <a:lnRef idx="0"/>
-          <a:fillRef idx="0"/>
-          <a:effectRef idx="0"/>
-          <a:fontRef idx="minor"/>
-        </p:style>
-        <p:txBody>
-          <a:bodyPr lIns="0" rIns="0" tIns="0" bIns="0"/>
-          <a:p>
-            <a:pPr algn="just">
-              <a:lnSpc>
-                <a:spcPct val="100000"/>
-              </a:lnSpc>
-              <a:spcBef>
-                <a:spcPts val="1001"/>
-              </a:spcBef>
-            </a:pPr>
-            <a:r>
-              <a:rPr b="0" lang="en-US" sz="2250" spc="-1" strike="noStrike">
-                <a:solidFill>
-                  <a:srgbClr val="000000"/>
-                </a:solidFill>
-                <a:latin typeface="Cambria"/>
-                <a:ea typeface="American Typewriter"/>
-              </a:rPr>
-              <a:t>We seek to compare the Parker-Sochacki Method (PSM), the Barnes-Hut Simulation (BSM), and the Particle-Particle-Particle Method (P3M) approaches to simulating the N-Body problem, and determine which is the superior approach.</a:t>
-            </a:r>
-            <a:endParaRPr b="0" lang="en-US" sz="2250" spc="-1" strike="noStrike">
-              <a:latin typeface="Arial"/>
-            </a:endParaRPr>
-          </a:p>
-          <a:p>
-            <a:pPr algn="just">
-              <a:lnSpc>
-                <a:spcPct val="100000"/>
-              </a:lnSpc>
-              <a:spcBef>
-                <a:spcPts val="1001"/>
-              </a:spcBef>
-            </a:pPr>
-            <a:endParaRPr b="0" lang="en-US" sz="2250" spc="-1" strike="noStrike">
-              <a:latin typeface="Arial"/>
-            </a:endParaRPr>
-          </a:p>
-          <a:p>
-            <a:pPr algn="just">
-              <a:lnSpc>
-                <a:spcPct val="100000"/>
-              </a:lnSpc>
-              <a:spcBef>
-                <a:spcPts val="1001"/>
-              </a:spcBef>
-            </a:pPr>
-            <a:r>
-              <a:rPr b="0" lang="en-US" sz="2250" spc="-1" strike="noStrike">
-                <a:solidFill>
-                  <a:srgbClr val="000000"/>
-                </a:solidFill>
-                <a:latin typeface="Cambria"/>
-                <a:ea typeface="American Typewriter"/>
-              </a:rPr>
-              <a:t>The Barnes-Hut Simulation seeks to treat the space as a tree, recursively divided until each leaf node contains either one or zero bodies. Because of the tree structure BHS uses, it has a runtime of O(nlogn).</a:t>
-            </a:r>
-            <a:endParaRPr b="0" lang="en-US" sz="2250" spc="-1" strike="noStrike">
-              <a:latin typeface="Arial"/>
-            </a:endParaRPr>
-          </a:p>
-          <a:p>
-            <a:pPr algn="just">
-              <a:lnSpc>
-                <a:spcPct val="100000"/>
-              </a:lnSpc>
-              <a:spcBef>
-                <a:spcPts val="1001"/>
-              </a:spcBef>
-            </a:pPr>
-            <a:endParaRPr b="0" lang="en-US" sz="2250" spc="-1" strike="noStrike">
-              <a:latin typeface="Arial"/>
-            </a:endParaRPr>
-          </a:p>
-          <a:p>
-            <a:pPr algn="just">
-              <a:lnSpc>
-                <a:spcPct val="100000"/>
-              </a:lnSpc>
-              <a:spcBef>
-                <a:spcPts val="1001"/>
-              </a:spcBef>
-            </a:pPr>
-            <a:r>
-              <a:rPr b="0" lang="en-US" sz="2250" spc="-1" strike="noStrike">
-                <a:solidFill>
-                  <a:srgbClr val="000000"/>
-                </a:solidFill>
-                <a:latin typeface="Cambria"/>
-                <a:ea typeface="American Typewriter"/>
-              </a:rPr>
-              <a:t>The Parker-Sochacki Method seeks to treat the simulation of forces between bodies as a metric space. This allows the simulation to take advantage of many computations which can only be performed on metric spaces.</a:t>
-            </a:r>
-            <a:endParaRPr b="0" lang="en-US" sz="2250" spc="-1" strike="noStrike">
-              <a:latin typeface="Arial"/>
-            </a:endParaRPr>
-          </a:p>
-          <a:p>
-            <a:pPr algn="just">
-              <a:lnSpc>
-                <a:spcPct val="100000"/>
-              </a:lnSpc>
-              <a:spcBef>
-                <a:spcPts val="1001"/>
-              </a:spcBef>
-            </a:pPr>
-            <a:endParaRPr b="0" lang="en-US" sz="2250" spc="-1" strike="noStrike">
-              <a:latin typeface="Arial"/>
-            </a:endParaRPr>
-          </a:p>
-          <a:p>
-            <a:pPr algn="just">
-              <a:lnSpc>
-                <a:spcPct val="100000"/>
-              </a:lnSpc>
-              <a:spcBef>
-                <a:spcPts val="1001"/>
-              </a:spcBef>
-            </a:pPr>
-            <a:r>
-              <a:rPr b="0" lang="en-US" sz="2250" spc="-1" strike="noStrike">
-                <a:solidFill>
-                  <a:srgbClr val="000000"/>
-                </a:solidFill>
-                <a:latin typeface="Cambria"/>
-                <a:ea typeface="American Typewriter"/>
-              </a:rPr>
-              <a:t>The P3M Approach interpolates all bodies to points on a grid. Forces are calculated on points of the grid instead of on individual bodies.</a:t>
-            </a:r>
-            <a:endParaRPr b="0" lang="en-US" sz="2250" spc="-1" strike="noStrike">
-              <a:latin typeface="Arial"/>
-            </a:endParaRPr>
-          </a:p>
-        </p:txBody>
-      </p:sp>
-      <p:sp>
-        <p:nvSpPr>
-          <p:cNvPr id="62" name="CustomShape 19"/>
-          <p:cNvSpPr/>
-          <p:nvPr/>
-        </p:nvSpPr>
-        <p:spPr>
-          <a:xfrm>
-            <a:off x="1115280" y="13798440"/>
-            <a:ext cx="8399880" cy="4740120"/>
-          </a:xfrm>
-          <a:prstGeom prst="rect">
-            <a:avLst/>
-          </a:prstGeom>
-          <a:noFill/>
-          <a:ln w="12600">
-            <a:noFill/>
-          </a:ln>
-        </p:spPr>
-        <p:style>
-          <a:lnRef idx="0"/>
-          <a:fillRef idx="0"/>
-          <a:effectRef idx="0"/>
-          <a:fontRef idx="minor"/>
-        </p:style>
-      </p:sp>
-      <p:sp>
-        <p:nvSpPr>
-          <p:cNvPr id="63" name="CustomShape 20"/>
-          <p:cNvSpPr/>
-          <p:nvPr/>
-        </p:nvSpPr>
-        <p:spPr>
-          <a:xfrm>
-            <a:off x="17241840" y="9378720"/>
-            <a:ext cx="14334120" cy="3026520"/>
-          </a:xfrm>
-          <a:prstGeom prst="rect">
-            <a:avLst/>
-          </a:prstGeom>
-          <a:noFill/>
-          <a:ln w="12600">
-            <a:noFill/>
-          </a:ln>
-        </p:spPr>
-        <p:style>
-          <a:lnRef idx="0"/>
-          <a:fillRef idx="0"/>
-          <a:effectRef idx="0"/>
-          <a:fontRef idx="minor"/>
-        </p:style>
-        <p:txBody>
-          <a:bodyPr lIns="0" rIns="0" tIns="0" bIns="0"/>
-          <a:p>
-            <a:pPr algn="just">
-              <a:lnSpc>
-                <a:spcPct val="100000"/>
-              </a:lnSpc>
-              <a:spcBef>
-                <a:spcPts val="2251"/>
-              </a:spcBef>
-            </a:pPr>
-            <a:r>
-              <a:rPr b="0" lang="en-US" sz="2250" spc="-1" strike="noStrike">
-                <a:solidFill>
-                  <a:srgbClr val="000000"/>
-                </a:solidFill>
-                <a:latin typeface="Cambria"/>
-                <a:ea typeface="American Typewriter"/>
-              </a:rPr>
-              <a:t>Lorem ipsum dolor sit amet, consectetur adipiscing elit. Nunc eu libero a mauris mollis luctus. Vivamus lectus dui, suscipit vestibulum massa in, lacinia luctus turpis. Nulla fringilla ante et orci commodo scelerisque. Morbi nec tincidunt arcu. Integer vel nisl viverra leo luctus dignissim vel nec diam. </a:t>
-            </a:r>
-            <a:endParaRPr b="0" lang="en-US" sz="2250" spc="-1" strike="noStrike">
-              <a:latin typeface="Arial"/>
-            </a:endParaRPr>
-          </a:p>
-          <a:p>
-            <a:pPr algn="just">
-              <a:lnSpc>
-                <a:spcPct val="100000"/>
-              </a:lnSpc>
-              <a:spcBef>
-                <a:spcPts val="2251"/>
-              </a:spcBef>
-            </a:pPr>
-            <a:r>
-              <a:rPr b="0" lang="en-US" sz="2250" spc="-1" strike="noStrike">
-                <a:solidFill>
-                  <a:srgbClr val="000000"/>
-                </a:solidFill>
-                <a:latin typeface="Cambria"/>
-                <a:ea typeface="American Typewriter"/>
-              </a:rPr>
-              <a:t>Fusce venenatis pulvinar euismod. </a:t>
-            </a:r>
-            <a:r>
-              <a:rPr b="1" lang="en-US" sz="2250" spc="-1" strike="noStrike">
-                <a:solidFill>
-                  <a:srgbClr val="000000"/>
-                </a:solidFill>
-                <a:latin typeface="Cambria"/>
-                <a:ea typeface="American Typewriter"/>
-              </a:rPr>
-              <a:t>Integer</a:t>
-            </a:r>
-            <a:r>
-              <a:rPr b="0" lang="en-US" sz="2250" spc="-1" strike="noStrike">
-                <a:solidFill>
-                  <a:srgbClr val="000000"/>
-                </a:solidFill>
-                <a:latin typeface="Cambria"/>
-                <a:ea typeface="American Typewriter"/>
-              </a:rPr>
-              <a:t> </a:t>
-            </a:r>
-            <a:r>
-              <a:rPr b="1" lang="en-US" sz="2250" spc="-1" strike="noStrike">
-                <a:solidFill>
-                  <a:srgbClr val="000000"/>
-                </a:solidFill>
-                <a:latin typeface="Cambria"/>
-                <a:ea typeface="American Typewriter"/>
-              </a:rPr>
-              <a:t>interdum</a:t>
-            </a:r>
-            <a:r>
-              <a:rPr b="0" lang="en-US" sz="2250" spc="-1" strike="noStrike">
-                <a:solidFill>
-                  <a:srgbClr val="000000"/>
-                </a:solidFill>
-                <a:latin typeface="Cambria"/>
-                <a:ea typeface="American Typewriter"/>
-              </a:rPr>
-              <a:t> nec elit vitae facilisis. Proin nisi erat, vulputate aliquet dui non, finibus scelerisque risus. Proin nisi erat, vulputate aliquet dui non, finibus scelerisque risus. Proin nisi erat, vulputate aliquet dui non, finibus scelerisque risus. Proin nisi erat, vulputate aliquet dui non, finibus scelerisque risus.</a:t>
-            </a:r>
-            <a:endParaRPr b="0" lang="en-US" sz="2250" spc="-1" strike="noStrike">
-              <a:latin typeface="Arial"/>
-            </a:endParaRPr>
-          </a:p>
-        </p:txBody>
-      </p:sp>
       <p:pic>
         <p:nvPicPr>
-          <p:cNvPr id="64" name="droppedImage.png" descr=""/>
+          <p:cNvPr id="63" name="" descr=""/>
           <p:cNvPicPr/>
           <p:nvPr/>
         </p:nvPicPr>
@@ -3153,31 +3145,8 @@
         </p:blipFill>
         <p:spPr>
           <a:xfrm>
-            <a:off x="10951200" y="9980280"/>
-            <a:ext cx="5426280" cy="2399400"/>
-          </a:xfrm>
-          <a:prstGeom prst="rect">
-            <a:avLst/>
-          </a:prstGeom>
-          <a:ln w="12600">
-            <a:noFill/>
-          </a:ln>
-        </p:spPr>
-      </p:pic>
-      <p:pic>
-        <p:nvPicPr>
-          <p:cNvPr id="65" name="Picture 2" descr=""/>
-          <p:cNvPicPr/>
-          <p:nvPr/>
-        </p:nvPicPr>
-        <p:blipFill>
-          <a:blip r:embed="rId8"/>
-          <a:stretch/>
-        </p:blipFill>
-        <p:spPr>
-          <a:xfrm>
-            <a:off x="25001280" y="345600"/>
-            <a:ext cx="7068600" cy="2393280"/>
+            <a:off x="2103120" y="8439120"/>
+            <a:ext cx="6008760" cy="3448080"/>
           </a:xfrm>
           <a:prstGeom prst="rect">
             <a:avLst/>

</xml_diff>

<commit_message>
add minifmm and remove nbfmm
</commit_message>
<xml_diff>
--- a/nBodyPoster.pptx
+++ b/nBodyPoster.pptx
@@ -1,19 +1,114 @@
 
 <file path=ppt/presentation.xml><?xml version="1.0" encoding="utf-8"?>
-<p:presentation xmlns:a="http://schemas.openxmlformats.org/drawingml/2006/main" xmlns:p="http://schemas.openxmlformats.org/presentationml/2006/main" xmlns:r="http://schemas.openxmlformats.org/officeDocument/2006/relationships" xmlns:p14="http://schemas.microsoft.com/office/powerpoint/2010/main" xmlns:p15="http://schemas.microsoft.com/office/powerpoint/2012/main" xmlns:mc="http://schemas.openxmlformats.org/markup-compatibility/2006">
+<p:presentation xmlns:a="http://schemas.openxmlformats.org/drawingml/2006/main" xmlns:r="http://schemas.openxmlformats.org/officeDocument/2006/relationships" xmlns:p="http://schemas.openxmlformats.org/presentationml/2006/main">
   <p:sldMasterIdLst>
-    <p:sldMasterId id="2147483648" r:id="rId2"/>
+    <p:sldMasterId id="2147483648" r:id="rId1"/>
   </p:sldMasterIdLst>
   <p:sldIdLst>
-    <p:sldId id="256" r:id="rId3"/>
+    <p:sldId id="256" r:id="rId2"/>
   </p:sldIdLst>
   <p:sldSz cx="32918400" cy="21945600"/>
   <p:notesSz cx="7772400" cy="10058400"/>
+  <p:defaultTextStyle>
+    <a:defPPr>
+      <a:defRPr lang="en-US"/>
+    </a:defPPr>
+    <a:lvl1pPr marL="0" algn="l" defTabSz="914400" rtl="0" eaLnBrk="1" latinLnBrk="0" hangingPunct="1">
+      <a:defRPr sz="1800" kern="1200">
+        <a:solidFill>
+          <a:schemeClr val="tx1"/>
+        </a:solidFill>
+        <a:latin typeface="+mn-lt"/>
+        <a:ea typeface="+mn-ea"/>
+        <a:cs typeface="+mn-cs"/>
+      </a:defRPr>
+    </a:lvl1pPr>
+    <a:lvl2pPr marL="457200" algn="l" defTabSz="914400" rtl="0" eaLnBrk="1" latinLnBrk="0" hangingPunct="1">
+      <a:defRPr sz="1800" kern="1200">
+        <a:solidFill>
+          <a:schemeClr val="tx1"/>
+        </a:solidFill>
+        <a:latin typeface="+mn-lt"/>
+        <a:ea typeface="+mn-ea"/>
+        <a:cs typeface="+mn-cs"/>
+      </a:defRPr>
+    </a:lvl2pPr>
+    <a:lvl3pPr marL="914400" algn="l" defTabSz="914400" rtl="0" eaLnBrk="1" latinLnBrk="0" hangingPunct="1">
+      <a:defRPr sz="1800" kern="1200">
+        <a:solidFill>
+          <a:schemeClr val="tx1"/>
+        </a:solidFill>
+        <a:latin typeface="+mn-lt"/>
+        <a:ea typeface="+mn-ea"/>
+        <a:cs typeface="+mn-cs"/>
+      </a:defRPr>
+    </a:lvl3pPr>
+    <a:lvl4pPr marL="1371600" algn="l" defTabSz="914400" rtl="0" eaLnBrk="1" latinLnBrk="0" hangingPunct="1">
+      <a:defRPr sz="1800" kern="1200">
+        <a:solidFill>
+          <a:schemeClr val="tx1"/>
+        </a:solidFill>
+        <a:latin typeface="+mn-lt"/>
+        <a:ea typeface="+mn-ea"/>
+        <a:cs typeface="+mn-cs"/>
+      </a:defRPr>
+    </a:lvl4pPr>
+    <a:lvl5pPr marL="1828800" algn="l" defTabSz="914400" rtl="0" eaLnBrk="1" latinLnBrk="0" hangingPunct="1">
+      <a:defRPr sz="1800" kern="1200">
+        <a:solidFill>
+          <a:schemeClr val="tx1"/>
+        </a:solidFill>
+        <a:latin typeface="+mn-lt"/>
+        <a:ea typeface="+mn-ea"/>
+        <a:cs typeface="+mn-cs"/>
+      </a:defRPr>
+    </a:lvl5pPr>
+    <a:lvl6pPr marL="2286000" algn="l" defTabSz="914400" rtl="0" eaLnBrk="1" latinLnBrk="0" hangingPunct="1">
+      <a:defRPr sz="1800" kern="1200">
+        <a:solidFill>
+          <a:schemeClr val="tx1"/>
+        </a:solidFill>
+        <a:latin typeface="+mn-lt"/>
+        <a:ea typeface="+mn-ea"/>
+        <a:cs typeface="+mn-cs"/>
+      </a:defRPr>
+    </a:lvl6pPr>
+    <a:lvl7pPr marL="2743200" algn="l" defTabSz="914400" rtl="0" eaLnBrk="1" latinLnBrk="0" hangingPunct="1">
+      <a:defRPr sz="1800" kern="1200">
+        <a:solidFill>
+          <a:schemeClr val="tx1"/>
+        </a:solidFill>
+        <a:latin typeface="+mn-lt"/>
+        <a:ea typeface="+mn-ea"/>
+        <a:cs typeface="+mn-cs"/>
+      </a:defRPr>
+    </a:lvl7pPr>
+    <a:lvl8pPr marL="3200400" algn="l" defTabSz="914400" rtl="0" eaLnBrk="1" latinLnBrk="0" hangingPunct="1">
+      <a:defRPr sz="1800" kern="1200">
+        <a:solidFill>
+          <a:schemeClr val="tx1"/>
+        </a:solidFill>
+        <a:latin typeface="+mn-lt"/>
+        <a:ea typeface="+mn-ea"/>
+        <a:cs typeface="+mn-cs"/>
+      </a:defRPr>
+    </a:lvl8pPr>
+    <a:lvl9pPr marL="3657600" algn="l" defTabSz="914400" rtl="0" eaLnBrk="1" latinLnBrk="0" hangingPunct="1">
+      <a:defRPr sz="1800" kern="1200">
+        <a:solidFill>
+          <a:schemeClr val="tx1"/>
+        </a:solidFill>
+        <a:latin typeface="+mn-lt"/>
+        <a:ea typeface="+mn-ea"/>
+        <a:cs typeface="+mn-cs"/>
+      </a:defRPr>
+    </a:lvl9pPr>
+  </p:defaultTextStyle>
 </p:presentation>
 </file>
 
 <file path=ppt/slideLayouts/slideLayout1.xml><?xml version="1.0" encoding="utf-8"?>
-<p:sldLayout xmlns:a="http://schemas.openxmlformats.org/drawingml/2006/main" xmlns:p="http://schemas.openxmlformats.org/presentationml/2006/main" xmlns:r="http://schemas.openxmlformats.org/officeDocument/2006/relationships" xmlns:p14="http://schemas.microsoft.com/office/powerpoint/2010/main" xmlns:p15="http://schemas.microsoft.com/office/powerpoint/2012/main" xmlns:mc="http://schemas.openxmlformats.org/markup-compatibility/2006" type="blank" preserve="1">
+<p:sldLayout xmlns:a="http://schemas.openxmlformats.org/drawingml/2006/main" xmlns:r="http://schemas.openxmlformats.org/officeDocument/2006/relationships" xmlns:p="http://schemas.openxmlformats.org/presentationml/2006/main" type="blank" preserve="1">
   <p:cSld name="Blank Slide">
     <p:spTree>
       <p:nvGrpSpPr>
@@ -31,11 +126,14 @@
       </p:grpSpPr>
     </p:spTree>
   </p:cSld>
+  <p:clrMapOvr>
+    <a:masterClrMapping/>
+  </p:clrMapOvr>
 </p:sldLayout>
 </file>
 
 <file path=ppt/slideLayouts/slideLayout10.xml><?xml version="1.0" encoding="utf-8"?>
-<p:sldLayout xmlns:a="http://schemas.openxmlformats.org/drawingml/2006/main" xmlns:p="http://schemas.openxmlformats.org/presentationml/2006/main" xmlns:r="http://schemas.openxmlformats.org/officeDocument/2006/relationships" xmlns:p14="http://schemas.microsoft.com/office/powerpoint/2010/main" xmlns:p15="http://schemas.microsoft.com/office/powerpoint/2012/main" xmlns:mc="http://schemas.openxmlformats.org/markup-compatibility/2006" type="objOverTx" preserve="1">
+<p:sldLayout xmlns:a="http://schemas.openxmlformats.org/drawingml/2006/main" xmlns:r="http://schemas.openxmlformats.org/officeDocument/2006/relationships" xmlns:p="http://schemas.openxmlformats.org/presentationml/2006/main" type="objOverTx" preserve="1">
   <p:cSld name="Title, Content over Content">
     <p:spTree>
       <p:nvGrpSpPr>
@@ -71,10 +169,11 @@
           </a:prstGeom>
         </p:spPr>
         <p:txBody>
-          <a:bodyPr lIns="0" rIns="0" tIns="0" bIns="0" anchor="ctr"/>
+          <a:bodyPr lIns="0" tIns="0" rIns="0" bIns="0" anchor="ctr"/>
+          <a:lstStyle/>
           <a:p>
             <a:pPr algn="ctr"/>
-            <a:endParaRPr b="0" lang="en-US" sz="4400" spc="-1" strike="noStrike">
+            <a:endParaRPr lang="en-US" sz="4400" b="0" strike="noStrike" spc="-1">
               <a:latin typeface="Arial"/>
             </a:endParaRPr>
           </a:p>
@@ -100,11 +199,12 @@
           </a:prstGeom>
         </p:spPr>
         <p:txBody>
-          <a:bodyPr lIns="0" rIns="0" tIns="0" bIns="0">
+          <a:bodyPr lIns="0" tIns="0" rIns="0" bIns="0">
             <a:normAutofit/>
           </a:bodyPr>
-          <a:p>
-            <a:endParaRPr b="0" lang="en-US" sz="3200" spc="-1" strike="noStrike">
+          <a:lstStyle/>
+          <a:p>
+            <a:endParaRPr lang="en-US" sz="3200" b="0" strike="noStrike" spc="-1">
               <a:latin typeface="Arial"/>
             </a:endParaRPr>
           </a:p>
@@ -130,11 +230,12 @@
           </a:prstGeom>
         </p:spPr>
         <p:txBody>
-          <a:bodyPr lIns="0" rIns="0" tIns="0" bIns="0">
+          <a:bodyPr lIns="0" tIns="0" rIns="0" bIns="0">
             <a:normAutofit/>
           </a:bodyPr>
-          <a:p>
-            <a:endParaRPr b="0" lang="en-US" sz="3200" spc="-1" strike="noStrike">
+          <a:lstStyle/>
+          <a:p>
+            <a:endParaRPr lang="en-US" sz="3200" b="0" strike="noStrike" spc="-1">
               <a:latin typeface="Arial"/>
             </a:endParaRPr>
           </a:p>
@@ -142,11 +243,14 @@
       </p:sp>
     </p:spTree>
   </p:cSld>
+  <p:clrMapOvr>
+    <a:masterClrMapping/>
+  </p:clrMapOvr>
 </p:sldLayout>
 </file>
 
 <file path=ppt/slideLayouts/slideLayout11.xml><?xml version="1.0" encoding="utf-8"?>
-<p:sldLayout xmlns:a="http://schemas.openxmlformats.org/drawingml/2006/main" xmlns:p="http://schemas.openxmlformats.org/presentationml/2006/main" xmlns:r="http://schemas.openxmlformats.org/officeDocument/2006/relationships" xmlns:p14="http://schemas.microsoft.com/office/powerpoint/2010/main" xmlns:p15="http://schemas.microsoft.com/office/powerpoint/2012/main" xmlns:mc="http://schemas.openxmlformats.org/markup-compatibility/2006" type="fourObj" preserve="1">
+<p:sldLayout xmlns:a="http://schemas.openxmlformats.org/drawingml/2006/main" xmlns:r="http://schemas.openxmlformats.org/officeDocument/2006/relationships" xmlns:p="http://schemas.openxmlformats.org/presentationml/2006/main" type="fourObj" preserve="1">
   <p:cSld name="Title, 4 Content">
     <p:spTree>
       <p:nvGrpSpPr>
@@ -182,10 +286,11 @@
           </a:prstGeom>
         </p:spPr>
         <p:txBody>
-          <a:bodyPr lIns="0" rIns="0" tIns="0" bIns="0" anchor="ctr"/>
+          <a:bodyPr lIns="0" tIns="0" rIns="0" bIns="0" anchor="ctr"/>
+          <a:lstStyle/>
           <a:p>
             <a:pPr algn="ctr"/>
-            <a:endParaRPr b="0" lang="en-US" sz="4400" spc="-1" strike="noStrike">
+            <a:endParaRPr lang="en-US" sz="4400" b="0" strike="noStrike" spc="-1">
               <a:latin typeface="Arial"/>
             </a:endParaRPr>
           </a:p>
@@ -211,11 +316,12 @@
           </a:prstGeom>
         </p:spPr>
         <p:txBody>
-          <a:bodyPr lIns="0" rIns="0" tIns="0" bIns="0">
+          <a:bodyPr lIns="0" tIns="0" rIns="0" bIns="0">
             <a:normAutofit/>
           </a:bodyPr>
-          <a:p>
-            <a:endParaRPr b="0" lang="en-US" sz="3200" spc="-1" strike="noStrike">
+          <a:lstStyle/>
+          <a:p>
+            <a:endParaRPr lang="en-US" sz="3200" b="0" strike="noStrike" spc="-1">
               <a:latin typeface="Arial"/>
             </a:endParaRPr>
           </a:p>
@@ -241,11 +347,12 @@
           </a:prstGeom>
         </p:spPr>
         <p:txBody>
-          <a:bodyPr lIns="0" rIns="0" tIns="0" bIns="0">
+          <a:bodyPr lIns="0" tIns="0" rIns="0" bIns="0">
             <a:normAutofit/>
           </a:bodyPr>
-          <a:p>
-            <a:endParaRPr b="0" lang="en-US" sz="3200" spc="-1" strike="noStrike">
+          <a:lstStyle/>
+          <a:p>
+            <a:endParaRPr lang="en-US" sz="3200" b="0" strike="noStrike" spc="-1">
               <a:latin typeface="Arial"/>
             </a:endParaRPr>
           </a:p>
@@ -271,11 +378,12 @@
           </a:prstGeom>
         </p:spPr>
         <p:txBody>
-          <a:bodyPr lIns="0" rIns="0" tIns="0" bIns="0">
+          <a:bodyPr lIns="0" tIns="0" rIns="0" bIns="0">
             <a:normAutofit/>
           </a:bodyPr>
-          <a:p>
-            <a:endParaRPr b="0" lang="en-US" sz="3200" spc="-1" strike="noStrike">
+          <a:lstStyle/>
+          <a:p>
+            <a:endParaRPr lang="en-US" sz="3200" b="0" strike="noStrike" spc="-1">
               <a:latin typeface="Arial"/>
             </a:endParaRPr>
           </a:p>
@@ -301,11 +409,12 @@
           </a:prstGeom>
         </p:spPr>
         <p:txBody>
-          <a:bodyPr lIns="0" rIns="0" tIns="0" bIns="0">
+          <a:bodyPr lIns="0" tIns="0" rIns="0" bIns="0">
             <a:normAutofit/>
           </a:bodyPr>
-          <a:p>
-            <a:endParaRPr b="0" lang="en-US" sz="3200" spc="-1" strike="noStrike">
+          <a:lstStyle/>
+          <a:p>
+            <a:endParaRPr lang="en-US" sz="3200" b="0" strike="noStrike" spc="-1">
               <a:latin typeface="Arial"/>
             </a:endParaRPr>
           </a:p>
@@ -313,11 +422,14 @@
       </p:sp>
     </p:spTree>
   </p:cSld>
+  <p:clrMapOvr>
+    <a:masterClrMapping/>
+  </p:clrMapOvr>
 </p:sldLayout>
 </file>
 
 <file path=ppt/slideLayouts/slideLayout12.xml><?xml version="1.0" encoding="utf-8"?>
-<p:sldLayout xmlns:a="http://schemas.openxmlformats.org/drawingml/2006/main" xmlns:p="http://schemas.openxmlformats.org/presentationml/2006/main" xmlns:r="http://schemas.openxmlformats.org/officeDocument/2006/relationships" xmlns:p14="http://schemas.microsoft.com/office/powerpoint/2010/main" xmlns:p15="http://schemas.microsoft.com/office/powerpoint/2012/main" xmlns:mc="http://schemas.openxmlformats.org/markup-compatibility/2006" type="blank" preserve="1">
+<p:sldLayout xmlns:a="http://schemas.openxmlformats.org/drawingml/2006/main" xmlns:r="http://schemas.openxmlformats.org/officeDocument/2006/relationships" xmlns:p="http://schemas.openxmlformats.org/presentationml/2006/main" type="blank" preserve="1">
   <p:cSld name="Title, 6 Content">
     <p:spTree>
       <p:nvGrpSpPr>
@@ -353,10 +465,11 @@
           </a:prstGeom>
         </p:spPr>
         <p:txBody>
-          <a:bodyPr lIns="0" rIns="0" tIns="0" bIns="0" anchor="ctr"/>
+          <a:bodyPr lIns="0" tIns="0" rIns="0" bIns="0" anchor="ctr"/>
+          <a:lstStyle/>
           <a:p>
             <a:pPr algn="ctr"/>
-            <a:endParaRPr b="0" lang="en-US" sz="4400" spc="-1" strike="noStrike">
+            <a:endParaRPr lang="en-US" sz="4400" b="0" strike="noStrike" spc="-1">
               <a:latin typeface="Arial"/>
             </a:endParaRPr>
           </a:p>
@@ -382,11 +495,12 @@
           </a:prstGeom>
         </p:spPr>
         <p:txBody>
-          <a:bodyPr lIns="0" rIns="0" tIns="0" bIns="0">
+          <a:bodyPr lIns="0" tIns="0" rIns="0" bIns="0">
             <a:normAutofit/>
           </a:bodyPr>
-          <a:p>
-            <a:endParaRPr b="0" lang="en-US" sz="3200" spc="-1" strike="noStrike">
+          <a:lstStyle/>
+          <a:p>
+            <a:endParaRPr lang="en-US" sz="3200" b="0" strike="noStrike" spc="-1">
               <a:latin typeface="Arial"/>
             </a:endParaRPr>
           </a:p>
@@ -412,11 +526,12 @@
           </a:prstGeom>
         </p:spPr>
         <p:txBody>
-          <a:bodyPr lIns="0" rIns="0" tIns="0" bIns="0">
+          <a:bodyPr lIns="0" tIns="0" rIns="0" bIns="0">
             <a:normAutofit/>
           </a:bodyPr>
-          <a:p>
-            <a:endParaRPr b="0" lang="en-US" sz="3200" spc="-1" strike="noStrike">
+          <a:lstStyle/>
+          <a:p>
+            <a:endParaRPr lang="en-US" sz="3200" b="0" strike="noStrike" spc="-1">
               <a:latin typeface="Arial"/>
             </a:endParaRPr>
           </a:p>
@@ -442,11 +557,12 @@
           </a:prstGeom>
         </p:spPr>
         <p:txBody>
-          <a:bodyPr lIns="0" rIns="0" tIns="0" bIns="0">
+          <a:bodyPr lIns="0" tIns="0" rIns="0" bIns="0">
             <a:normAutofit/>
           </a:bodyPr>
-          <a:p>
-            <a:endParaRPr b="0" lang="en-US" sz="3200" spc="-1" strike="noStrike">
+          <a:lstStyle/>
+          <a:p>
+            <a:endParaRPr lang="en-US" sz="3200" b="0" strike="noStrike" spc="-1">
               <a:latin typeface="Arial"/>
             </a:endParaRPr>
           </a:p>
@@ -472,11 +588,12 @@
           </a:prstGeom>
         </p:spPr>
         <p:txBody>
-          <a:bodyPr lIns="0" rIns="0" tIns="0" bIns="0">
+          <a:bodyPr lIns="0" tIns="0" rIns="0" bIns="0">
             <a:normAutofit/>
           </a:bodyPr>
-          <a:p>
-            <a:endParaRPr b="0" lang="en-US" sz="3200" spc="-1" strike="noStrike">
+          <a:lstStyle/>
+          <a:p>
+            <a:endParaRPr lang="en-US" sz="3200" b="0" strike="noStrike" spc="-1">
               <a:latin typeface="Arial"/>
             </a:endParaRPr>
           </a:p>
@@ -502,11 +619,12 @@
           </a:prstGeom>
         </p:spPr>
         <p:txBody>
-          <a:bodyPr lIns="0" rIns="0" tIns="0" bIns="0">
+          <a:bodyPr lIns="0" tIns="0" rIns="0" bIns="0">
             <a:normAutofit/>
           </a:bodyPr>
-          <a:p>
-            <a:endParaRPr b="0" lang="en-US" sz="3200" spc="-1" strike="noStrike">
+          <a:lstStyle/>
+          <a:p>
+            <a:endParaRPr lang="en-US" sz="3200" b="0" strike="noStrike" spc="-1">
               <a:latin typeface="Arial"/>
             </a:endParaRPr>
           </a:p>
@@ -532,11 +650,12 @@
           </a:prstGeom>
         </p:spPr>
         <p:txBody>
-          <a:bodyPr lIns="0" rIns="0" tIns="0" bIns="0">
+          <a:bodyPr lIns="0" tIns="0" rIns="0" bIns="0">
             <a:normAutofit/>
           </a:bodyPr>
-          <a:p>
-            <a:endParaRPr b="0" lang="en-US" sz="3200" spc="-1" strike="noStrike">
+          <a:lstStyle/>
+          <a:p>
+            <a:endParaRPr lang="en-US" sz="3200" b="0" strike="noStrike" spc="-1">
               <a:latin typeface="Arial"/>
             </a:endParaRPr>
           </a:p>
@@ -544,11 +663,14 @@
       </p:sp>
     </p:spTree>
   </p:cSld>
+  <p:clrMapOvr>
+    <a:masterClrMapping/>
+  </p:clrMapOvr>
 </p:sldLayout>
 </file>
 
 <file path=ppt/slideLayouts/slideLayout2.xml><?xml version="1.0" encoding="utf-8"?>
-<p:sldLayout xmlns:a="http://schemas.openxmlformats.org/drawingml/2006/main" xmlns:p="http://schemas.openxmlformats.org/presentationml/2006/main" xmlns:r="http://schemas.openxmlformats.org/officeDocument/2006/relationships" xmlns:p14="http://schemas.microsoft.com/office/powerpoint/2010/main" xmlns:p15="http://schemas.microsoft.com/office/powerpoint/2012/main" xmlns:mc="http://schemas.openxmlformats.org/markup-compatibility/2006" type="tx" preserve="1">
+<p:sldLayout xmlns:a="http://schemas.openxmlformats.org/drawingml/2006/main" xmlns:r="http://schemas.openxmlformats.org/officeDocument/2006/relationships" xmlns:p="http://schemas.openxmlformats.org/presentationml/2006/main" type="tx" preserve="1">
   <p:cSld name="Title Slide">
     <p:spTree>
       <p:nvGrpSpPr>
@@ -584,10 +706,11 @@
           </a:prstGeom>
         </p:spPr>
         <p:txBody>
-          <a:bodyPr lIns="0" rIns="0" tIns="0" bIns="0" anchor="ctr"/>
+          <a:bodyPr lIns="0" tIns="0" rIns="0" bIns="0" anchor="ctr"/>
+          <a:lstStyle/>
           <a:p>
             <a:pPr algn="ctr"/>
-            <a:endParaRPr b="0" lang="en-US" sz="4400" spc="-1" strike="noStrike">
+            <a:endParaRPr lang="en-US" sz="4400" b="0" strike="noStrike" spc="-1">
               <a:latin typeface="Arial"/>
             </a:endParaRPr>
           </a:p>
@@ -613,10 +736,11 @@
           </a:prstGeom>
         </p:spPr>
         <p:txBody>
-          <a:bodyPr lIns="0" rIns="0" tIns="0" bIns="0" anchor="ctr"/>
+          <a:bodyPr lIns="0" tIns="0" rIns="0" bIns="0" anchor="ctr"/>
+          <a:lstStyle/>
           <a:p>
             <a:pPr algn="ctr"/>
-            <a:endParaRPr b="0" lang="en-US" sz="3200" spc="-1" strike="noStrike">
+            <a:endParaRPr lang="en-US" sz="3200" b="0" strike="noStrike" spc="-1">
               <a:latin typeface="Arial"/>
             </a:endParaRPr>
           </a:p>
@@ -624,11 +748,14 @@
       </p:sp>
     </p:spTree>
   </p:cSld>
+  <p:clrMapOvr>
+    <a:masterClrMapping/>
+  </p:clrMapOvr>
 </p:sldLayout>
 </file>
 
 <file path=ppt/slideLayouts/slideLayout3.xml><?xml version="1.0" encoding="utf-8"?>
-<p:sldLayout xmlns:a="http://schemas.openxmlformats.org/drawingml/2006/main" xmlns:p="http://schemas.openxmlformats.org/presentationml/2006/main" xmlns:r="http://schemas.openxmlformats.org/officeDocument/2006/relationships" xmlns:p14="http://schemas.microsoft.com/office/powerpoint/2010/main" xmlns:p15="http://schemas.microsoft.com/office/powerpoint/2012/main" xmlns:mc="http://schemas.openxmlformats.org/markup-compatibility/2006" type="obj" preserve="1">
+<p:sldLayout xmlns:a="http://schemas.openxmlformats.org/drawingml/2006/main" xmlns:r="http://schemas.openxmlformats.org/officeDocument/2006/relationships" xmlns:p="http://schemas.openxmlformats.org/presentationml/2006/main" type="obj" preserve="1">
   <p:cSld name="Title, Content">
     <p:spTree>
       <p:nvGrpSpPr>
@@ -664,10 +791,11 @@
           </a:prstGeom>
         </p:spPr>
         <p:txBody>
-          <a:bodyPr lIns="0" rIns="0" tIns="0" bIns="0" anchor="ctr"/>
+          <a:bodyPr lIns="0" tIns="0" rIns="0" bIns="0" anchor="ctr"/>
+          <a:lstStyle/>
           <a:p>
             <a:pPr algn="ctr"/>
-            <a:endParaRPr b="0" lang="en-US" sz="4400" spc="-1" strike="noStrike">
+            <a:endParaRPr lang="en-US" sz="4400" b="0" strike="noStrike" spc="-1">
               <a:latin typeface="Arial"/>
             </a:endParaRPr>
           </a:p>
@@ -693,11 +821,12 @@
           </a:prstGeom>
         </p:spPr>
         <p:txBody>
-          <a:bodyPr lIns="0" rIns="0" tIns="0" bIns="0">
+          <a:bodyPr lIns="0" tIns="0" rIns="0" bIns="0">
             <a:normAutofit/>
           </a:bodyPr>
-          <a:p>
-            <a:endParaRPr b="0" lang="en-US" sz="3200" spc="-1" strike="noStrike">
+          <a:lstStyle/>
+          <a:p>
+            <a:endParaRPr lang="en-US" sz="3200" b="0" strike="noStrike" spc="-1">
               <a:latin typeface="Arial"/>
             </a:endParaRPr>
           </a:p>
@@ -705,11 +834,14 @@
       </p:sp>
     </p:spTree>
   </p:cSld>
+  <p:clrMapOvr>
+    <a:masterClrMapping/>
+  </p:clrMapOvr>
 </p:sldLayout>
 </file>
 
 <file path=ppt/slideLayouts/slideLayout4.xml><?xml version="1.0" encoding="utf-8"?>
-<p:sldLayout xmlns:a="http://schemas.openxmlformats.org/drawingml/2006/main" xmlns:p="http://schemas.openxmlformats.org/presentationml/2006/main" xmlns:r="http://schemas.openxmlformats.org/officeDocument/2006/relationships" xmlns:p14="http://schemas.microsoft.com/office/powerpoint/2010/main" xmlns:p15="http://schemas.microsoft.com/office/powerpoint/2012/main" xmlns:mc="http://schemas.openxmlformats.org/markup-compatibility/2006" type="twoObj" preserve="1">
+<p:sldLayout xmlns:a="http://schemas.openxmlformats.org/drawingml/2006/main" xmlns:r="http://schemas.openxmlformats.org/officeDocument/2006/relationships" xmlns:p="http://schemas.openxmlformats.org/presentationml/2006/main" type="twoObj" preserve="1">
   <p:cSld name="Title, 2 Content">
     <p:spTree>
       <p:nvGrpSpPr>
@@ -745,10 +877,11 @@
           </a:prstGeom>
         </p:spPr>
         <p:txBody>
-          <a:bodyPr lIns="0" rIns="0" tIns="0" bIns="0" anchor="ctr"/>
+          <a:bodyPr lIns="0" tIns="0" rIns="0" bIns="0" anchor="ctr"/>
+          <a:lstStyle/>
           <a:p>
             <a:pPr algn="ctr"/>
-            <a:endParaRPr b="0" lang="en-US" sz="4400" spc="-1" strike="noStrike">
+            <a:endParaRPr lang="en-US" sz="4400" b="0" strike="noStrike" spc="-1">
               <a:latin typeface="Arial"/>
             </a:endParaRPr>
           </a:p>
@@ -774,11 +907,12 @@
           </a:prstGeom>
         </p:spPr>
         <p:txBody>
-          <a:bodyPr lIns="0" rIns="0" tIns="0" bIns="0">
+          <a:bodyPr lIns="0" tIns="0" rIns="0" bIns="0">
             <a:normAutofit/>
           </a:bodyPr>
-          <a:p>
-            <a:endParaRPr b="0" lang="en-US" sz="3200" spc="-1" strike="noStrike">
+          <a:lstStyle/>
+          <a:p>
+            <a:endParaRPr lang="en-US" sz="3200" b="0" strike="noStrike" spc="-1">
               <a:latin typeface="Arial"/>
             </a:endParaRPr>
           </a:p>
@@ -804,11 +938,12 @@
           </a:prstGeom>
         </p:spPr>
         <p:txBody>
-          <a:bodyPr lIns="0" rIns="0" tIns="0" bIns="0">
+          <a:bodyPr lIns="0" tIns="0" rIns="0" bIns="0">
             <a:normAutofit/>
           </a:bodyPr>
-          <a:p>
-            <a:endParaRPr b="0" lang="en-US" sz="3200" spc="-1" strike="noStrike">
+          <a:lstStyle/>
+          <a:p>
+            <a:endParaRPr lang="en-US" sz="3200" b="0" strike="noStrike" spc="-1">
               <a:latin typeface="Arial"/>
             </a:endParaRPr>
           </a:p>
@@ -816,11 +951,14 @@
       </p:sp>
     </p:spTree>
   </p:cSld>
+  <p:clrMapOvr>
+    <a:masterClrMapping/>
+  </p:clrMapOvr>
 </p:sldLayout>
 </file>
 
 <file path=ppt/slideLayouts/slideLayout5.xml><?xml version="1.0" encoding="utf-8"?>
-<p:sldLayout xmlns:a="http://schemas.openxmlformats.org/drawingml/2006/main" xmlns:p="http://schemas.openxmlformats.org/presentationml/2006/main" xmlns:r="http://schemas.openxmlformats.org/officeDocument/2006/relationships" xmlns:p14="http://schemas.microsoft.com/office/powerpoint/2010/main" xmlns:p15="http://schemas.microsoft.com/office/powerpoint/2012/main" xmlns:mc="http://schemas.openxmlformats.org/markup-compatibility/2006" type="titleOnly" preserve="1">
+<p:sldLayout xmlns:a="http://schemas.openxmlformats.org/drawingml/2006/main" xmlns:r="http://schemas.openxmlformats.org/officeDocument/2006/relationships" xmlns:p="http://schemas.openxmlformats.org/presentationml/2006/main" type="titleOnly" preserve="1">
   <p:cSld name="Title Only">
     <p:spTree>
       <p:nvGrpSpPr>
@@ -856,10 +994,11 @@
           </a:prstGeom>
         </p:spPr>
         <p:txBody>
-          <a:bodyPr lIns="0" rIns="0" tIns="0" bIns="0" anchor="ctr"/>
+          <a:bodyPr lIns="0" tIns="0" rIns="0" bIns="0" anchor="ctr"/>
+          <a:lstStyle/>
           <a:p>
             <a:pPr algn="ctr"/>
-            <a:endParaRPr b="0" lang="en-US" sz="4400" spc="-1" strike="noStrike">
+            <a:endParaRPr lang="en-US" sz="4400" b="0" strike="noStrike" spc="-1">
               <a:latin typeface="Arial"/>
             </a:endParaRPr>
           </a:p>
@@ -867,11 +1006,14 @@
       </p:sp>
     </p:spTree>
   </p:cSld>
+  <p:clrMapOvr>
+    <a:masterClrMapping/>
+  </p:clrMapOvr>
 </p:sldLayout>
 </file>
 
 <file path=ppt/slideLayouts/slideLayout6.xml><?xml version="1.0" encoding="utf-8"?>
-<p:sldLayout xmlns:a="http://schemas.openxmlformats.org/drawingml/2006/main" xmlns:p="http://schemas.openxmlformats.org/presentationml/2006/main" xmlns:r="http://schemas.openxmlformats.org/officeDocument/2006/relationships" xmlns:p14="http://schemas.microsoft.com/office/powerpoint/2010/main" xmlns:p15="http://schemas.microsoft.com/office/powerpoint/2012/main" xmlns:mc="http://schemas.openxmlformats.org/markup-compatibility/2006" type="objOnly" preserve="1">
+<p:sldLayout xmlns:a="http://schemas.openxmlformats.org/drawingml/2006/main" xmlns:r="http://schemas.openxmlformats.org/officeDocument/2006/relationships" xmlns:p="http://schemas.openxmlformats.org/presentationml/2006/main" type="objOnly" preserve="1">
   <p:cSld name="Centered Text">
     <p:spTree>
       <p:nvGrpSpPr>
@@ -907,10 +1049,11 @@
           </a:prstGeom>
         </p:spPr>
         <p:txBody>
-          <a:bodyPr lIns="0" rIns="0" tIns="0" bIns="0" anchor="ctr"/>
+          <a:bodyPr lIns="0" tIns="0" rIns="0" bIns="0" anchor="ctr"/>
+          <a:lstStyle/>
           <a:p>
             <a:pPr algn="ctr"/>
-            <a:endParaRPr b="0" lang="en-US" sz="3200" spc="-1" strike="noStrike">
+            <a:endParaRPr lang="en-US" sz="3200" b="0" strike="noStrike" spc="-1">
               <a:latin typeface="Arial"/>
             </a:endParaRPr>
           </a:p>
@@ -918,11 +1061,14 @@
       </p:sp>
     </p:spTree>
   </p:cSld>
+  <p:clrMapOvr>
+    <a:masterClrMapping/>
+  </p:clrMapOvr>
 </p:sldLayout>
 </file>
 
 <file path=ppt/slideLayouts/slideLayout7.xml><?xml version="1.0" encoding="utf-8"?>
-<p:sldLayout xmlns:a="http://schemas.openxmlformats.org/drawingml/2006/main" xmlns:p="http://schemas.openxmlformats.org/presentationml/2006/main" xmlns:r="http://schemas.openxmlformats.org/officeDocument/2006/relationships" xmlns:p14="http://schemas.microsoft.com/office/powerpoint/2010/main" xmlns:p15="http://schemas.microsoft.com/office/powerpoint/2012/main" xmlns:mc="http://schemas.openxmlformats.org/markup-compatibility/2006" type="twoObjAndObj" preserve="1">
+<p:sldLayout xmlns:a="http://schemas.openxmlformats.org/drawingml/2006/main" xmlns:r="http://schemas.openxmlformats.org/officeDocument/2006/relationships" xmlns:p="http://schemas.openxmlformats.org/presentationml/2006/main" type="twoObjAndObj" preserve="1">
   <p:cSld name="Title, 2 Content and Content">
     <p:spTree>
       <p:nvGrpSpPr>
@@ -958,10 +1104,11 @@
           </a:prstGeom>
         </p:spPr>
         <p:txBody>
-          <a:bodyPr lIns="0" rIns="0" tIns="0" bIns="0" anchor="ctr"/>
+          <a:bodyPr lIns="0" tIns="0" rIns="0" bIns="0" anchor="ctr"/>
+          <a:lstStyle/>
           <a:p>
             <a:pPr algn="ctr"/>
-            <a:endParaRPr b="0" lang="en-US" sz="4400" spc="-1" strike="noStrike">
+            <a:endParaRPr lang="en-US" sz="4400" b="0" strike="noStrike" spc="-1">
               <a:latin typeface="Arial"/>
             </a:endParaRPr>
           </a:p>
@@ -987,11 +1134,12 @@
           </a:prstGeom>
         </p:spPr>
         <p:txBody>
-          <a:bodyPr lIns="0" rIns="0" tIns="0" bIns="0">
+          <a:bodyPr lIns="0" tIns="0" rIns="0" bIns="0">
             <a:normAutofit/>
           </a:bodyPr>
-          <a:p>
-            <a:endParaRPr b="0" lang="en-US" sz="3200" spc="-1" strike="noStrike">
+          <a:lstStyle/>
+          <a:p>
+            <a:endParaRPr lang="en-US" sz="3200" b="0" strike="noStrike" spc="-1">
               <a:latin typeface="Arial"/>
             </a:endParaRPr>
           </a:p>
@@ -1017,11 +1165,12 @@
           </a:prstGeom>
         </p:spPr>
         <p:txBody>
-          <a:bodyPr lIns="0" rIns="0" tIns="0" bIns="0">
+          <a:bodyPr lIns="0" tIns="0" rIns="0" bIns="0">
             <a:normAutofit/>
           </a:bodyPr>
-          <a:p>
-            <a:endParaRPr b="0" lang="en-US" sz="3200" spc="-1" strike="noStrike">
+          <a:lstStyle/>
+          <a:p>
+            <a:endParaRPr lang="en-US" sz="3200" b="0" strike="noStrike" spc="-1">
               <a:latin typeface="Arial"/>
             </a:endParaRPr>
           </a:p>
@@ -1047,11 +1196,12 @@
           </a:prstGeom>
         </p:spPr>
         <p:txBody>
-          <a:bodyPr lIns="0" rIns="0" tIns="0" bIns="0">
+          <a:bodyPr lIns="0" tIns="0" rIns="0" bIns="0">
             <a:normAutofit/>
           </a:bodyPr>
-          <a:p>
-            <a:endParaRPr b="0" lang="en-US" sz="3200" spc="-1" strike="noStrike">
+          <a:lstStyle/>
+          <a:p>
+            <a:endParaRPr lang="en-US" sz="3200" b="0" strike="noStrike" spc="-1">
               <a:latin typeface="Arial"/>
             </a:endParaRPr>
           </a:p>
@@ -1059,11 +1209,14 @@
       </p:sp>
     </p:spTree>
   </p:cSld>
+  <p:clrMapOvr>
+    <a:masterClrMapping/>
+  </p:clrMapOvr>
 </p:sldLayout>
 </file>
 
 <file path=ppt/slideLayouts/slideLayout8.xml><?xml version="1.0" encoding="utf-8"?>
-<p:sldLayout xmlns:a="http://schemas.openxmlformats.org/drawingml/2006/main" xmlns:p="http://schemas.openxmlformats.org/presentationml/2006/main" xmlns:r="http://schemas.openxmlformats.org/officeDocument/2006/relationships" xmlns:p14="http://schemas.microsoft.com/office/powerpoint/2010/main" xmlns:p15="http://schemas.microsoft.com/office/powerpoint/2012/main" xmlns:mc="http://schemas.openxmlformats.org/markup-compatibility/2006" type="objAndTwoObj" preserve="1">
+<p:sldLayout xmlns:a="http://schemas.openxmlformats.org/drawingml/2006/main" xmlns:r="http://schemas.openxmlformats.org/officeDocument/2006/relationships" xmlns:p="http://schemas.openxmlformats.org/presentationml/2006/main" type="objAndTwoObj" preserve="1">
   <p:cSld name="Title Content and 2 Content">
     <p:spTree>
       <p:nvGrpSpPr>
@@ -1099,10 +1252,11 @@
           </a:prstGeom>
         </p:spPr>
         <p:txBody>
-          <a:bodyPr lIns="0" rIns="0" tIns="0" bIns="0" anchor="ctr"/>
+          <a:bodyPr lIns="0" tIns="0" rIns="0" bIns="0" anchor="ctr"/>
+          <a:lstStyle/>
           <a:p>
             <a:pPr algn="ctr"/>
-            <a:endParaRPr b="0" lang="en-US" sz="4400" spc="-1" strike="noStrike">
+            <a:endParaRPr lang="en-US" sz="4400" b="0" strike="noStrike" spc="-1">
               <a:latin typeface="Arial"/>
             </a:endParaRPr>
           </a:p>
@@ -1128,11 +1282,12 @@
           </a:prstGeom>
         </p:spPr>
         <p:txBody>
-          <a:bodyPr lIns="0" rIns="0" tIns="0" bIns="0">
+          <a:bodyPr lIns="0" tIns="0" rIns="0" bIns="0">
             <a:normAutofit/>
           </a:bodyPr>
-          <a:p>
-            <a:endParaRPr b="0" lang="en-US" sz="3200" spc="-1" strike="noStrike">
+          <a:lstStyle/>
+          <a:p>
+            <a:endParaRPr lang="en-US" sz="3200" b="0" strike="noStrike" spc="-1">
               <a:latin typeface="Arial"/>
             </a:endParaRPr>
           </a:p>
@@ -1158,11 +1313,12 @@
           </a:prstGeom>
         </p:spPr>
         <p:txBody>
-          <a:bodyPr lIns="0" rIns="0" tIns="0" bIns="0">
+          <a:bodyPr lIns="0" tIns="0" rIns="0" bIns="0">
             <a:normAutofit/>
           </a:bodyPr>
-          <a:p>
-            <a:endParaRPr b="0" lang="en-US" sz="3200" spc="-1" strike="noStrike">
+          <a:lstStyle/>
+          <a:p>
+            <a:endParaRPr lang="en-US" sz="3200" b="0" strike="noStrike" spc="-1">
               <a:latin typeface="Arial"/>
             </a:endParaRPr>
           </a:p>
@@ -1188,11 +1344,12 @@
           </a:prstGeom>
         </p:spPr>
         <p:txBody>
-          <a:bodyPr lIns="0" rIns="0" tIns="0" bIns="0">
+          <a:bodyPr lIns="0" tIns="0" rIns="0" bIns="0">
             <a:normAutofit/>
           </a:bodyPr>
-          <a:p>
-            <a:endParaRPr b="0" lang="en-US" sz="3200" spc="-1" strike="noStrike">
+          <a:lstStyle/>
+          <a:p>
+            <a:endParaRPr lang="en-US" sz="3200" b="0" strike="noStrike" spc="-1">
               <a:latin typeface="Arial"/>
             </a:endParaRPr>
           </a:p>
@@ -1200,11 +1357,14 @@
       </p:sp>
     </p:spTree>
   </p:cSld>
+  <p:clrMapOvr>
+    <a:masterClrMapping/>
+  </p:clrMapOvr>
 </p:sldLayout>
 </file>
 
 <file path=ppt/slideLayouts/slideLayout9.xml><?xml version="1.0" encoding="utf-8"?>
-<p:sldLayout xmlns:a="http://schemas.openxmlformats.org/drawingml/2006/main" xmlns:p="http://schemas.openxmlformats.org/presentationml/2006/main" xmlns:r="http://schemas.openxmlformats.org/officeDocument/2006/relationships" xmlns:p14="http://schemas.microsoft.com/office/powerpoint/2010/main" xmlns:p15="http://schemas.microsoft.com/office/powerpoint/2012/main" xmlns:mc="http://schemas.openxmlformats.org/markup-compatibility/2006" type="twoObjOverTx" preserve="1">
+<p:sldLayout xmlns:a="http://schemas.openxmlformats.org/drawingml/2006/main" xmlns:r="http://schemas.openxmlformats.org/officeDocument/2006/relationships" xmlns:p="http://schemas.openxmlformats.org/presentationml/2006/main" type="twoObjOverTx" preserve="1">
   <p:cSld name="Title, 2 Content over Content">
     <p:spTree>
       <p:nvGrpSpPr>
@@ -1240,10 +1400,11 @@
           </a:prstGeom>
         </p:spPr>
         <p:txBody>
-          <a:bodyPr lIns="0" rIns="0" tIns="0" bIns="0" anchor="ctr"/>
+          <a:bodyPr lIns="0" tIns="0" rIns="0" bIns="0" anchor="ctr"/>
+          <a:lstStyle/>
           <a:p>
             <a:pPr algn="ctr"/>
-            <a:endParaRPr b="0" lang="en-US" sz="4400" spc="-1" strike="noStrike">
+            <a:endParaRPr lang="en-US" sz="4400" b="0" strike="noStrike" spc="-1">
               <a:latin typeface="Arial"/>
             </a:endParaRPr>
           </a:p>
@@ -1269,11 +1430,12 @@
           </a:prstGeom>
         </p:spPr>
         <p:txBody>
-          <a:bodyPr lIns="0" rIns="0" tIns="0" bIns="0">
+          <a:bodyPr lIns="0" tIns="0" rIns="0" bIns="0">
             <a:normAutofit/>
           </a:bodyPr>
-          <a:p>
-            <a:endParaRPr b="0" lang="en-US" sz="3200" spc="-1" strike="noStrike">
+          <a:lstStyle/>
+          <a:p>
+            <a:endParaRPr lang="en-US" sz="3200" b="0" strike="noStrike" spc="-1">
               <a:latin typeface="Arial"/>
             </a:endParaRPr>
           </a:p>
@@ -1299,11 +1461,12 @@
           </a:prstGeom>
         </p:spPr>
         <p:txBody>
-          <a:bodyPr lIns="0" rIns="0" tIns="0" bIns="0">
+          <a:bodyPr lIns="0" tIns="0" rIns="0" bIns="0">
             <a:normAutofit/>
           </a:bodyPr>
-          <a:p>
-            <a:endParaRPr b="0" lang="en-US" sz="3200" spc="-1" strike="noStrike">
+          <a:lstStyle/>
+          <a:p>
+            <a:endParaRPr lang="en-US" sz="3200" b="0" strike="noStrike" spc="-1">
               <a:latin typeface="Arial"/>
             </a:endParaRPr>
           </a:p>
@@ -1329,11 +1492,12 @@
           </a:prstGeom>
         </p:spPr>
         <p:txBody>
-          <a:bodyPr lIns="0" rIns="0" tIns="0" bIns="0">
+          <a:bodyPr lIns="0" tIns="0" rIns="0" bIns="0">
             <a:normAutofit/>
           </a:bodyPr>
-          <a:p>
-            <a:endParaRPr b="0" lang="en-US" sz="3200" spc="-1" strike="noStrike">
+          <a:lstStyle/>
+          <a:p>
+            <a:endParaRPr lang="en-US" sz="3200" b="0" strike="noStrike" spc="-1">
               <a:latin typeface="Arial"/>
             </a:endParaRPr>
           </a:p>
@@ -1341,17 +1505,21 @@
       </p:sp>
     </p:spTree>
   </p:cSld>
+  <p:clrMapOvr>
+    <a:masterClrMapping/>
+  </p:clrMapOvr>
 </p:sldLayout>
 </file>
 
 <file path=ppt/slideMasters/slideMaster1.xml><?xml version="1.0" encoding="utf-8"?>
-<p:sldMaster xmlns:a="http://schemas.openxmlformats.org/drawingml/2006/main" xmlns:p="http://schemas.openxmlformats.org/presentationml/2006/main" xmlns:r="http://schemas.openxmlformats.org/officeDocument/2006/relationships" xmlns:p14="http://schemas.microsoft.com/office/powerpoint/2010/main" xmlns:p15="http://schemas.microsoft.com/office/powerpoint/2012/main" xmlns:mc="http://schemas.openxmlformats.org/markup-compatibility/2006">
+<p:sldMaster xmlns:a="http://schemas.openxmlformats.org/drawingml/2006/main" xmlns:r="http://schemas.openxmlformats.org/officeDocument/2006/relationships" xmlns:p="http://schemas.openxmlformats.org/presentationml/2006/main">
   <p:cSld>
     <p:bg>
       <p:bgPr>
         <a:solidFill>
-          <a:srgbClr val="ffffff"/>
+          <a:srgbClr val="FFFFFF"/>
         </a:solidFill>
+        <a:effectLst/>
       </p:bgPr>
     </p:bg>
     <p:spTree>
@@ -1370,7 +1538,7 @@
       </p:grpSpPr>
       <p:sp>
         <p:nvSpPr>
-          <p:cNvPr id="0" name="PlaceHolder 1"/>
+          <p:cNvPr id="2" name="PlaceHolder 1"/>
           <p:cNvSpPr>
             <a:spLocks noGrp="1"/>
           </p:cNvSpPr>
@@ -1388,29 +1556,21 @@
           </a:prstGeom>
         </p:spPr>
         <p:txBody>
-          <a:bodyPr lIns="0" rIns="0" tIns="0" bIns="0" anchor="ctr"/>
+          <a:bodyPr lIns="0" tIns="0" rIns="0" bIns="0" anchor="ctr"/>
+          <a:lstStyle/>
           <a:p>
             <a:r>
-              <a:rPr b="0" lang="en-US" sz="1800" spc="-1" strike="noStrike">
+              <a:rPr lang="en-US" sz="1800" b="0" strike="noStrike" spc="-1">
                 <a:latin typeface="Arial"/>
               </a:rPr>
-              <a:t>Click to edit the title text </a:t>
+              <a:t>Click to edit the title text format</a:t>
             </a:r>
-            <a:r>
-              <a:rPr b="0" lang="en-US" sz="1800" spc="-1" strike="noStrike">
-                <a:latin typeface="Arial"/>
-              </a:rPr>
-              <a:t>format</a:t>
-            </a:r>
-            <a:endParaRPr b="0" lang="en-US" sz="1800" spc="-1" strike="noStrike">
-              <a:latin typeface="Arial"/>
-            </a:endParaRPr>
-          </a:p>
-        </p:txBody>
-      </p:sp>
-      <p:sp>
-        <p:nvSpPr>
-          <p:cNvPr id="1" name="PlaceHolder 2"/>
+          </a:p>
+        </p:txBody>
+      </p:sp>
+      <p:sp>
+        <p:nvSpPr>
+          <p:cNvPr id="3" name="PlaceHolder 2"/>
           <p:cNvSpPr>
             <a:spLocks noGrp="1"/>
           </p:cNvSpPr>
@@ -1428,9 +1588,10 @@
           </a:prstGeom>
         </p:spPr>
         <p:txBody>
-          <a:bodyPr lIns="0" rIns="0" tIns="0" bIns="0">
+          <a:bodyPr lIns="0" tIns="0" rIns="0" bIns="0">
             <a:normAutofit/>
           </a:bodyPr>
+          <a:lstStyle/>
           <a:p>
             <a:pPr marL="432000" indent="-324000">
               <a:spcBef>
@@ -1444,17 +1605,14 @@
               <a:buChar char=""/>
             </a:pPr>
             <a:r>
-              <a:rPr b="0" lang="en-US" sz="1800" spc="-1" strike="noStrike">
+              <a:rPr lang="en-US" sz="1800" b="0" strike="noStrike" spc="-1">
                 <a:latin typeface="Arial"/>
               </a:rPr>
               <a:t>Click to edit the outline text format</a:t>
             </a:r>
-            <a:endParaRPr b="0" lang="en-US" sz="1800" spc="-1" strike="noStrike">
-              <a:latin typeface="Arial"/>
-            </a:endParaRPr>
-          </a:p>
-          <a:p>
-            <a:pPr lvl="1" marL="864000" indent="-324000">
+          </a:p>
+          <a:p>
+            <a:pPr marL="864000" lvl="1" indent="-324000">
               <a:spcBef>
                 <a:spcPts val="1134"/>
               </a:spcBef>
@@ -1466,17 +1624,14 @@
               <a:buChar char=""/>
             </a:pPr>
             <a:r>
-              <a:rPr b="0" lang="en-US" sz="1800" spc="-1" strike="noStrike">
+              <a:rPr lang="en-US" sz="1800" b="0" strike="noStrike" spc="-1">
                 <a:latin typeface="Arial"/>
               </a:rPr>
               <a:t>Second Outline Level</a:t>
             </a:r>
-            <a:endParaRPr b="0" lang="en-US" sz="1800" spc="-1" strike="noStrike">
-              <a:latin typeface="Arial"/>
-            </a:endParaRPr>
-          </a:p>
-          <a:p>
-            <a:pPr lvl="2" marL="1296000" indent="-288000">
+          </a:p>
+          <a:p>
+            <a:pPr marL="1296000" lvl="2" indent="-288000">
               <a:spcBef>
                 <a:spcPts val="850"/>
               </a:spcBef>
@@ -1488,17 +1643,14 @@
               <a:buChar char=""/>
             </a:pPr>
             <a:r>
-              <a:rPr b="0" lang="en-US" sz="1800" spc="-1" strike="noStrike">
+              <a:rPr lang="en-US" sz="1800" b="0" strike="noStrike" spc="-1">
                 <a:latin typeface="Arial"/>
               </a:rPr>
               <a:t>Third Outline Level</a:t>
             </a:r>
-            <a:endParaRPr b="0" lang="en-US" sz="1800" spc="-1" strike="noStrike">
-              <a:latin typeface="Arial"/>
-            </a:endParaRPr>
-          </a:p>
-          <a:p>
-            <a:pPr lvl="3" marL="1728000" indent="-216000">
+          </a:p>
+          <a:p>
+            <a:pPr marL="1728000" lvl="3" indent="-216000">
               <a:spcBef>
                 <a:spcPts val="567"/>
               </a:spcBef>
@@ -1510,17 +1662,14 @@
               <a:buChar char=""/>
             </a:pPr>
             <a:r>
-              <a:rPr b="0" lang="en-US" sz="1800" spc="-1" strike="noStrike">
+              <a:rPr lang="en-US" sz="1800" b="0" strike="noStrike" spc="-1">
                 <a:latin typeface="Arial"/>
               </a:rPr>
               <a:t>Fourth Outline Level</a:t>
             </a:r>
-            <a:endParaRPr b="0" lang="en-US" sz="1800" spc="-1" strike="noStrike">
-              <a:latin typeface="Arial"/>
-            </a:endParaRPr>
-          </a:p>
-          <a:p>
-            <a:pPr lvl="4" marL="2160000" indent="-216000">
+          </a:p>
+          <a:p>
+            <a:pPr marL="2160000" lvl="4" indent="-216000">
               <a:spcBef>
                 <a:spcPts val="283"/>
               </a:spcBef>
@@ -1532,17 +1681,14 @@
               <a:buChar char=""/>
             </a:pPr>
             <a:r>
-              <a:rPr b="0" lang="en-US" sz="1800" spc="-1" strike="noStrike">
+              <a:rPr lang="en-US" sz="1800" b="0" strike="noStrike" spc="-1">
                 <a:latin typeface="Arial"/>
               </a:rPr>
               <a:t>Fifth Outline Level</a:t>
             </a:r>
-            <a:endParaRPr b="0" lang="en-US" sz="1800" spc="-1" strike="noStrike">
-              <a:latin typeface="Arial"/>
-            </a:endParaRPr>
-          </a:p>
-          <a:p>
-            <a:pPr lvl="5" marL="2592000" indent="-216000">
+          </a:p>
+          <a:p>
+            <a:pPr marL="2592000" lvl="5" indent="-216000">
               <a:spcBef>
                 <a:spcPts val="283"/>
               </a:spcBef>
@@ -1554,17 +1700,14 @@
               <a:buChar char=""/>
             </a:pPr>
             <a:r>
-              <a:rPr b="0" lang="en-US" sz="1800" spc="-1" strike="noStrike">
+              <a:rPr lang="en-US" sz="1800" b="0" strike="noStrike" spc="-1">
                 <a:latin typeface="Arial"/>
               </a:rPr>
               <a:t>Sixth Outline Level</a:t>
             </a:r>
-            <a:endParaRPr b="0" lang="en-US" sz="1800" spc="-1" strike="noStrike">
-              <a:latin typeface="Arial"/>
-            </a:endParaRPr>
-          </a:p>
-          <a:p>
-            <a:pPr lvl="6" marL="3024000" indent="-216000">
+          </a:p>
+          <a:p>
+            <a:pPr marL="3024000" lvl="6" indent="-216000">
               <a:spcBef>
                 <a:spcPts val="283"/>
               </a:spcBef>
@@ -1576,39 +1719,316 @@
               <a:buChar char=""/>
             </a:pPr>
             <a:r>
-              <a:rPr b="0" lang="en-US" sz="1800" spc="-1" strike="noStrike">
+              <a:rPr lang="en-US" sz="1800" b="0" strike="noStrike" spc="-1">
                 <a:latin typeface="Arial"/>
               </a:rPr>
               <a:t>Seventh Outline Level</a:t>
             </a:r>
-            <a:endParaRPr b="0" lang="en-US" sz="1800" spc="-1" strike="noStrike">
-              <a:latin typeface="Arial"/>
-            </a:endParaRPr>
           </a:p>
         </p:txBody>
       </p:sp>
     </p:spTree>
   </p:cSld>
-  <p:clrMap bg1="lt1" bg2="lt2" tx1="dk1" tx2="dk2" accent1="accent1" accent2="accent2" accent3="accent3" accent4="accent4" accent5="accent5" accent6="accent6" hlink="hlink" folHlink="folHlink"/>
+  <p:clrMap bg1="lt1" tx1="dk1" bg2="lt2" tx2="dk2" accent1="accent1" accent2="accent2" accent3="accent3" accent4="accent4" accent5="accent5" accent6="accent6" hlink="hlink" folHlink="folHlink"/>
   <p:sldLayoutIdLst>
-    <p:sldLayoutId id="2147483649" r:id="rId2"/>
-    <p:sldLayoutId id="2147483650" r:id="rId3"/>
-    <p:sldLayoutId id="2147483651" r:id="rId4"/>
-    <p:sldLayoutId id="2147483652" r:id="rId5"/>
-    <p:sldLayoutId id="2147483653" r:id="rId6"/>
-    <p:sldLayoutId id="2147483654" r:id="rId7"/>
-    <p:sldLayoutId id="2147483655" r:id="rId8"/>
-    <p:sldLayoutId id="2147483656" r:id="rId9"/>
-    <p:sldLayoutId id="2147483657" r:id="rId10"/>
-    <p:sldLayoutId id="2147483658" r:id="rId11"/>
-    <p:sldLayoutId id="2147483659" r:id="rId12"/>
-    <p:sldLayoutId id="2147483660" r:id="rId13"/>
+    <p:sldLayoutId id="2147483649" r:id="rId1"/>
+    <p:sldLayoutId id="2147483650" r:id="rId2"/>
+    <p:sldLayoutId id="2147483651" r:id="rId3"/>
+    <p:sldLayoutId id="2147483652" r:id="rId4"/>
+    <p:sldLayoutId id="2147483653" r:id="rId5"/>
+    <p:sldLayoutId id="2147483654" r:id="rId6"/>
+    <p:sldLayoutId id="2147483655" r:id="rId7"/>
+    <p:sldLayoutId id="2147483656" r:id="rId8"/>
+    <p:sldLayoutId id="2147483657" r:id="rId9"/>
+    <p:sldLayoutId id="2147483658" r:id="rId10"/>
+    <p:sldLayoutId id="2147483659" r:id="rId11"/>
+    <p:sldLayoutId id="2147483660" r:id="rId12"/>
   </p:sldLayoutIdLst>
+  <p:txStyles>
+    <p:titleStyle>
+      <a:lvl1pPr algn="l" defTabSz="914400" rtl="0" eaLnBrk="1" latinLnBrk="0" hangingPunct="1">
+        <a:lnSpc>
+          <a:spcPct val="90000"/>
+        </a:lnSpc>
+        <a:spcBef>
+          <a:spcPct val="0"/>
+        </a:spcBef>
+        <a:buNone/>
+        <a:defRPr sz="4400" kern="1200">
+          <a:solidFill>
+            <a:schemeClr val="tx1"/>
+          </a:solidFill>
+          <a:latin typeface="+mj-lt"/>
+          <a:ea typeface="+mj-ea"/>
+          <a:cs typeface="+mj-cs"/>
+        </a:defRPr>
+      </a:lvl1pPr>
+    </p:titleStyle>
+    <p:bodyStyle>
+      <a:lvl1pPr marL="228600" indent="-228600" algn="l" defTabSz="914400" rtl="0" eaLnBrk="1" latinLnBrk="0" hangingPunct="1">
+        <a:lnSpc>
+          <a:spcPct val="90000"/>
+        </a:lnSpc>
+        <a:spcBef>
+          <a:spcPts val="1000"/>
+        </a:spcBef>
+        <a:buFont typeface="Arial" panose="020B0604020202020204" pitchFamily="34" charset="0"/>
+        <a:buChar char="•"/>
+        <a:defRPr sz="2800" kern="1200">
+          <a:solidFill>
+            <a:schemeClr val="tx1"/>
+          </a:solidFill>
+          <a:latin typeface="+mn-lt"/>
+          <a:ea typeface="+mn-ea"/>
+          <a:cs typeface="+mn-cs"/>
+        </a:defRPr>
+      </a:lvl1pPr>
+      <a:lvl2pPr marL="685800" indent="-228600" algn="l" defTabSz="914400" rtl="0" eaLnBrk="1" latinLnBrk="0" hangingPunct="1">
+        <a:lnSpc>
+          <a:spcPct val="90000"/>
+        </a:lnSpc>
+        <a:spcBef>
+          <a:spcPts val="500"/>
+        </a:spcBef>
+        <a:buFont typeface="Arial" panose="020B0604020202020204" pitchFamily="34" charset="0"/>
+        <a:buChar char="•"/>
+        <a:defRPr sz="2400" kern="1200">
+          <a:solidFill>
+            <a:schemeClr val="tx1"/>
+          </a:solidFill>
+          <a:latin typeface="+mn-lt"/>
+          <a:ea typeface="+mn-ea"/>
+          <a:cs typeface="+mn-cs"/>
+        </a:defRPr>
+      </a:lvl2pPr>
+      <a:lvl3pPr marL="1143000" indent="-228600" algn="l" defTabSz="914400" rtl="0" eaLnBrk="1" latinLnBrk="0" hangingPunct="1">
+        <a:lnSpc>
+          <a:spcPct val="90000"/>
+        </a:lnSpc>
+        <a:spcBef>
+          <a:spcPts val="500"/>
+        </a:spcBef>
+        <a:buFont typeface="Arial" panose="020B0604020202020204" pitchFamily="34" charset="0"/>
+        <a:buChar char="•"/>
+        <a:defRPr sz="2000" kern="1200">
+          <a:solidFill>
+            <a:schemeClr val="tx1"/>
+          </a:solidFill>
+          <a:latin typeface="+mn-lt"/>
+          <a:ea typeface="+mn-ea"/>
+          <a:cs typeface="+mn-cs"/>
+        </a:defRPr>
+      </a:lvl3pPr>
+      <a:lvl4pPr marL="1600200" indent="-228600" algn="l" defTabSz="914400" rtl="0" eaLnBrk="1" latinLnBrk="0" hangingPunct="1">
+        <a:lnSpc>
+          <a:spcPct val="90000"/>
+        </a:lnSpc>
+        <a:spcBef>
+          <a:spcPts val="500"/>
+        </a:spcBef>
+        <a:buFont typeface="Arial" panose="020B0604020202020204" pitchFamily="34" charset="0"/>
+        <a:buChar char="•"/>
+        <a:defRPr sz="1800" kern="1200">
+          <a:solidFill>
+            <a:schemeClr val="tx1"/>
+          </a:solidFill>
+          <a:latin typeface="+mn-lt"/>
+          <a:ea typeface="+mn-ea"/>
+          <a:cs typeface="+mn-cs"/>
+        </a:defRPr>
+      </a:lvl4pPr>
+      <a:lvl5pPr marL="2057400" indent="-228600" algn="l" defTabSz="914400" rtl="0" eaLnBrk="1" latinLnBrk="0" hangingPunct="1">
+        <a:lnSpc>
+          <a:spcPct val="90000"/>
+        </a:lnSpc>
+        <a:spcBef>
+          <a:spcPts val="500"/>
+        </a:spcBef>
+        <a:buFont typeface="Arial" panose="020B0604020202020204" pitchFamily="34" charset="0"/>
+        <a:buChar char="•"/>
+        <a:defRPr sz="1800" kern="1200">
+          <a:solidFill>
+            <a:schemeClr val="tx1"/>
+          </a:solidFill>
+          <a:latin typeface="+mn-lt"/>
+          <a:ea typeface="+mn-ea"/>
+          <a:cs typeface="+mn-cs"/>
+        </a:defRPr>
+      </a:lvl5pPr>
+      <a:lvl6pPr marL="2514600" indent="-228600" algn="l" defTabSz="914400" rtl="0" eaLnBrk="1" latinLnBrk="0" hangingPunct="1">
+        <a:lnSpc>
+          <a:spcPct val="90000"/>
+        </a:lnSpc>
+        <a:spcBef>
+          <a:spcPts val="500"/>
+        </a:spcBef>
+        <a:buFont typeface="Arial" panose="020B0604020202020204" pitchFamily="34" charset="0"/>
+        <a:buChar char="•"/>
+        <a:defRPr sz="1800" kern="1200">
+          <a:solidFill>
+            <a:schemeClr val="tx1"/>
+          </a:solidFill>
+          <a:latin typeface="+mn-lt"/>
+          <a:ea typeface="+mn-ea"/>
+          <a:cs typeface="+mn-cs"/>
+        </a:defRPr>
+      </a:lvl6pPr>
+      <a:lvl7pPr marL="2971800" indent="-228600" algn="l" defTabSz="914400" rtl="0" eaLnBrk="1" latinLnBrk="0" hangingPunct="1">
+        <a:lnSpc>
+          <a:spcPct val="90000"/>
+        </a:lnSpc>
+        <a:spcBef>
+          <a:spcPts val="500"/>
+        </a:spcBef>
+        <a:buFont typeface="Arial" panose="020B0604020202020204" pitchFamily="34" charset="0"/>
+        <a:buChar char="•"/>
+        <a:defRPr sz="1800" kern="1200">
+          <a:solidFill>
+            <a:schemeClr val="tx1"/>
+          </a:solidFill>
+          <a:latin typeface="+mn-lt"/>
+          <a:ea typeface="+mn-ea"/>
+          <a:cs typeface="+mn-cs"/>
+        </a:defRPr>
+      </a:lvl7pPr>
+      <a:lvl8pPr marL="3429000" indent="-228600" algn="l" defTabSz="914400" rtl="0" eaLnBrk="1" latinLnBrk="0" hangingPunct="1">
+        <a:lnSpc>
+          <a:spcPct val="90000"/>
+        </a:lnSpc>
+        <a:spcBef>
+          <a:spcPts val="500"/>
+        </a:spcBef>
+        <a:buFont typeface="Arial" panose="020B0604020202020204" pitchFamily="34" charset="0"/>
+        <a:buChar char="•"/>
+        <a:defRPr sz="1800" kern="1200">
+          <a:solidFill>
+            <a:schemeClr val="tx1"/>
+          </a:solidFill>
+          <a:latin typeface="+mn-lt"/>
+          <a:ea typeface="+mn-ea"/>
+          <a:cs typeface="+mn-cs"/>
+        </a:defRPr>
+      </a:lvl8pPr>
+      <a:lvl9pPr marL="3886200" indent="-228600" algn="l" defTabSz="914400" rtl="0" eaLnBrk="1" latinLnBrk="0" hangingPunct="1">
+        <a:lnSpc>
+          <a:spcPct val="90000"/>
+        </a:lnSpc>
+        <a:spcBef>
+          <a:spcPts val="500"/>
+        </a:spcBef>
+        <a:buFont typeface="Arial" panose="020B0604020202020204" pitchFamily="34" charset="0"/>
+        <a:buChar char="•"/>
+        <a:defRPr sz="1800" kern="1200">
+          <a:solidFill>
+            <a:schemeClr val="tx1"/>
+          </a:solidFill>
+          <a:latin typeface="+mn-lt"/>
+          <a:ea typeface="+mn-ea"/>
+          <a:cs typeface="+mn-cs"/>
+        </a:defRPr>
+      </a:lvl9pPr>
+    </p:bodyStyle>
+    <p:otherStyle>
+      <a:defPPr>
+        <a:defRPr lang="en-US"/>
+      </a:defPPr>
+      <a:lvl1pPr marL="0" algn="l" defTabSz="914400" rtl="0" eaLnBrk="1" latinLnBrk="0" hangingPunct="1">
+        <a:defRPr sz="1800" kern="1200">
+          <a:solidFill>
+            <a:schemeClr val="tx1"/>
+          </a:solidFill>
+          <a:latin typeface="+mn-lt"/>
+          <a:ea typeface="+mn-ea"/>
+          <a:cs typeface="+mn-cs"/>
+        </a:defRPr>
+      </a:lvl1pPr>
+      <a:lvl2pPr marL="457200" algn="l" defTabSz="914400" rtl="0" eaLnBrk="1" latinLnBrk="0" hangingPunct="1">
+        <a:defRPr sz="1800" kern="1200">
+          <a:solidFill>
+            <a:schemeClr val="tx1"/>
+          </a:solidFill>
+          <a:latin typeface="+mn-lt"/>
+          <a:ea typeface="+mn-ea"/>
+          <a:cs typeface="+mn-cs"/>
+        </a:defRPr>
+      </a:lvl2pPr>
+      <a:lvl3pPr marL="914400" algn="l" defTabSz="914400" rtl="0" eaLnBrk="1" latinLnBrk="0" hangingPunct="1">
+        <a:defRPr sz="1800" kern="1200">
+          <a:solidFill>
+            <a:schemeClr val="tx1"/>
+          </a:solidFill>
+          <a:latin typeface="+mn-lt"/>
+          <a:ea typeface="+mn-ea"/>
+          <a:cs typeface="+mn-cs"/>
+        </a:defRPr>
+      </a:lvl3pPr>
+      <a:lvl4pPr marL="1371600" algn="l" defTabSz="914400" rtl="0" eaLnBrk="1" latinLnBrk="0" hangingPunct="1">
+        <a:defRPr sz="1800" kern="1200">
+          <a:solidFill>
+            <a:schemeClr val="tx1"/>
+          </a:solidFill>
+          <a:latin typeface="+mn-lt"/>
+          <a:ea typeface="+mn-ea"/>
+          <a:cs typeface="+mn-cs"/>
+        </a:defRPr>
+      </a:lvl4pPr>
+      <a:lvl5pPr marL="1828800" algn="l" defTabSz="914400" rtl="0" eaLnBrk="1" latinLnBrk="0" hangingPunct="1">
+        <a:defRPr sz="1800" kern="1200">
+          <a:solidFill>
+            <a:schemeClr val="tx1"/>
+          </a:solidFill>
+          <a:latin typeface="+mn-lt"/>
+          <a:ea typeface="+mn-ea"/>
+          <a:cs typeface="+mn-cs"/>
+        </a:defRPr>
+      </a:lvl5pPr>
+      <a:lvl6pPr marL="2286000" algn="l" defTabSz="914400" rtl="0" eaLnBrk="1" latinLnBrk="0" hangingPunct="1">
+        <a:defRPr sz="1800" kern="1200">
+          <a:solidFill>
+            <a:schemeClr val="tx1"/>
+          </a:solidFill>
+          <a:latin typeface="+mn-lt"/>
+          <a:ea typeface="+mn-ea"/>
+          <a:cs typeface="+mn-cs"/>
+        </a:defRPr>
+      </a:lvl6pPr>
+      <a:lvl7pPr marL="2743200" algn="l" defTabSz="914400" rtl="0" eaLnBrk="1" latinLnBrk="0" hangingPunct="1">
+        <a:defRPr sz="1800" kern="1200">
+          <a:solidFill>
+            <a:schemeClr val="tx1"/>
+          </a:solidFill>
+          <a:latin typeface="+mn-lt"/>
+          <a:ea typeface="+mn-ea"/>
+          <a:cs typeface="+mn-cs"/>
+        </a:defRPr>
+      </a:lvl7pPr>
+      <a:lvl8pPr marL="3200400" algn="l" defTabSz="914400" rtl="0" eaLnBrk="1" latinLnBrk="0" hangingPunct="1">
+        <a:defRPr sz="1800" kern="1200">
+          <a:solidFill>
+            <a:schemeClr val="tx1"/>
+          </a:solidFill>
+          <a:latin typeface="+mn-lt"/>
+          <a:ea typeface="+mn-ea"/>
+          <a:cs typeface="+mn-cs"/>
+        </a:defRPr>
+      </a:lvl8pPr>
+      <a:lvl9pPr marL="3657600" algn="l" defTabSz="914400" rtl="0" eaLnBrk="1" latinLnBrk="0" hangingPunct="1">
+        <a:defRPr sz="1800" kern="1200">
+          <a:solidFill>
+            <a:schemeClr val="tx1"/>
+          </a:solidFill>
+          <a:latin typeface="+mn-lt"/>
+          <a:ea typeface="+mn-ea"/>
+          <a:cs typeface="+mn-cs"/>
+        </a:defRPr>
+      </a:lvl9pPr>
+    </p:otherStyle>
+  </p:txStyles>
 </p:sldMaster>
 </file>
 
 <file path=ppt/slides/slide1.xml><?xml version="1.0" encoding="utf-8"?>
-<p:sld xmlns:a="http://schemas.openxmlformats.org/drawingml/2006/main" xmlns:p="http://schemas.openxmlformats.org/presentationml/2006/main" xmlns:r="http://schemas.openxmlformats.org/officeDocument/2006/relationships" xmlns:p14="http://schemas.microsoft.com/office/powerpoint/2010/main" xmlns:p15="http://schemas.microsoft.com/office/powerpoint/2012/main" xmlns:mc="http://schemas.openxmlformats.org/markup-compatibility/2006">
+<p:sld xmlns:a="http://schemas.openxmlformats.org/drawingml/2006/main" xmlns:r="http://schemas.openxmlformats.org/officeDocument/2006/relationships" xmlns:p="http://schemas.openxmlformats.org/presentationml/2006/main">
   <p:cSld>
     <p:spTree>
       <p:nvGrpSpPr>
@@ -1641,10 +2061,10 @@
           <a:gradFill rotWithShape="0">
             <a:gsLst>
               <a:gs pos="0">
-                <a:srgbClr val="ffffff"/>
+                <a:srgbClr val="FFFFFF"/>
               </a:gs>
               <a:gs pos="100000">
-                <a:srgbClr val="edebff"/>
+                <a:srgbClr val="EDEBFF"/>
               </a:gs>
             </a:gsLst>
             <a:lin ang="10800000"/>
@@ -1654,13 +2074,20 @@
           </a:ln>
         </p:spPr>
         <p:style>
-          <a:lnRef idx="0"/>
-          <a:fillRef idx="0"/>
-          <a:effectRef idx="0"/>
+          <a:lnRef idx="0">
+            <a:scrgbClr r="0" g="0" b="0"/>
+          </a:lnRef>
+          <a:fillRef idx="0">
+            <a:scrgbClr r="0" g="0" b="0"/>
+          </a:fillRef>
+          <a:effectRef idx="0">
+            <a:scrgbClr r="0" g="0" b="0"/>
+          </a:effectRef>
           <a:fontRef idx="minor"/>
         </p:style>
         <p:txBody>
-          <a:bodyPr lIns="0" rIns="0" tIns="0" bIns="0" anchor="ctr"/>
+          <a:bodyPr lIns="0" tIns="0" rIns="0" bIns="0" anchor="ctr"/>
+          <a:lstStyle/>
           <a:p>
             <a:pPr>
               <a:lnSpc>
@@ -1668,7 +2095,7 @@
               </a:lnSpc>
             </a:pPr>
             <a:r>
-              <a:rPr b="0" lang="en-US" sz="7650" spc="-1" strike="noStrike">
+              <a:rPr lang="en-US" sz="7650" b="0" strike="noStrike" spc="-1" dirty="0">
                 <a:solidFill>
                   <a:srgbClr val="000000"/>
                 </a:solidFill>
@@ -1677,7 +2104,7 @@
               </a:rPr>
               <a:t>Parallel Approaches to N-Body</a:t>
             </a:r>
-            <a:endParaRPr b="0" lang="en-US" sz="7650" spc="-1" strike="noStrike">
+            <a:endParaRPr lang="en-US" sz="7650" b="0" strike="noStrike" spc="-1" dirty="0">
               <a:latin typeface="Arial"/>
             </a:endParaRPr>
           </a:p>
@@ -1688,26 +2115,26 @@
               </a:lnSpc>
             </a:pPr>
             <a:r>
-              <a:rPr b="0" lang="en-US" sz="4950" spc="-1" strike="noStrike">
+              <a:rPr lang="en-US" sz="4950" b="0" strike="noStrike" spc="-1" dirty="0">
                 <a:solidFill>
                   <a:srgbClr val="000000"/>
                 </a:solidFill>
                 <a:latin typeface="Candara"/>
                 <a:ea typeface="Helvetica Neue Light"/>
               </a:rPr>
-              <a:t>Ben Bole, John Latino, </a:t>
+              <a:t>Ben Bole, John Latino, Kevin Kelly, Richard </a:t>
             </a:r>
             <a:r>
-              <a:rPr b="0" lang="en-US" sz="4950" spc="-1" strike="noStrike">
+              <a:rPr lang="en-US" sz="4950" b="0" strike="noStrike" spc="-1" dirty="0" err="1">
                 <a:solidFill>
                   <a:srgbClr val="000000"/>
                 </a:solidFill>
                 <a:latin typeface="Candara"/>
                 <a:ea typeface="Helvetica Neue Light"/>
               </a:rPr>
-              <a:t>Kevin Kelly, Richard Bimmer</a:t>
+              <a:t>Bimmer</a:t>
             </a:r>
-            <a:endParaRPr b="0" lang="en-US" sz="4950" spc="-1" strike="noStrike">
+            <a:endParaRPr lang="en-US" sz="4950" b="0" strike="noStrike" spc="-1" dirty="0">
               <a:latin typeface="Arial"/>
             </a:endParaRPr>
           </a:p>
@@ -1728,7 +2155,7 @@
             <a:avLst/>
           </a:prstGeom>
           <a:solidFill>
-            <a:srgbClr val="ffffff"/>
+            <a:srgbClr val="FFFFFF"/>
           </a:solidFill>
           <a:ln w="15840">
             <a:solidFill>
@@ -1738,20 +2165,26 @@
           </a:ln>
         </p:spPr>
         <p:style>
-          <a:lnRef idx="0"/>
-          <a:fillRef idx="0"/>
-          <a:effectRef idx="0"/>
+          <a:lnRef idx="0">
+            <a:scrgbClr r="0" g="0" b="0"/>
+          </a:lnRef>
+          <a:fillRef idx="0">
+            <a:scrgbClr r="0" g="0" b="0"/>
+          </a:fillRef>
+          <a:effectRef idx="0">
+            <a:scrgbClr r="0" g="0" b="0"/>
+          </a:effectRef>
           <a:fontRef idx="minor"/>
         </p:style>
       </p:sp>
       <p:pic>
         <p:nvPicPr>
-          <p:cNvPr id="40" name="droppedImage.png" descr=""/>
+          <p:cNvPr id="40" name="droppedImage.png"/>
           <p:cNvPicPr/>
           <p:nvPr/>
         </p:nvPicPr>
         <p:blipFill>
-          <a:blip r:embed="rId1"/>
+          <a:blip r:embed="rId2"/>
           <a:stretch/>
         </p:blipFill>
         <p:spPr>
@@ -1782,7 +2215,7 @@
             <a:avLst/>
           </a:prstGeom>
           <a:solidFill>
-            <a:srgbClr val="ffffff"/>
+            <a:srgbClr val="FFFFFF"/>
           </a:solidFill>
           <a:ln w="15840">
             <a:solidFill>
@@ -1792,9 +2225,15 @@
           </a:ln>
         </p:spPr>
         <p:style>
-          <a:lnRef idx="0"/>
-          <a:fillRef idx="0"/>
-          <a:effectRef idx="0"/>
+          <a:lnRef idx="0">
+            <a:scrgbClr r="0" g="0" b="0"/>
+          </a:lnRef>
+          <a:fillRef idx="0">
+            <a:scrgbClr r="0" g="0" b="0"/>
+          </a:fillRef>
+          <a:effectRef idx="0">
+            <a:scrgbClr r="0" g="0" b="0"/>
+          </a:effectRef>
           <a:fontRef idx="minor"/>
         </p:style>
       </p:sp>
@@ -1813,7 +2252,7 @@
             <a:avLst/>
           </a:prstGeom>
           <a:solidFill>
-            <a:srgbClr val="ffffff"/>
+            <a:srgbClr val="FFFFFF"/>
           </a:solidFill>
           <a:ln w="15840">
             <a:solidFill>
@@ -1823,9 +2262,15 @@
           </a:ln>
         </p:spPr>
         <p:style>
-          <a:lnRef idx="0"/>
-          <a:fillRef idx="0"/>
-          <a:effectRef idx="0"/>
+          <a:lnRef idx="0">
+            <a:scrgbClr r="0" g="0" b="0"/>
+          </a:lnRef>
+          <a:fillRef idx="0">
+            <a:scrgbClr r="0" g="0" b="0"/>
+          </a:fillRef>
+          <a:effectRef idx="0">
+            <a:scrgbClr r="0" g="0" b="0"/>
+          </a:effectRef>
           <a:fontRef idx="minor"/>
         </p:style>
       </p:sp>
@@ -1844,7 +2289,7 @@
             <a:avLst/>
           </a:prstGeom>
           <a:solidFill>
-            <a:srgbClr val="ffffff"/>
+            <a:srgbClr val="FFFFFF"/>
           </a:solidFill>
           <a:ln w="15840">
             <a:solidFill>
@@ -1854,9 +2299,15 @@
           </a:ln>
         </p:spPr>
         <p:style>
-          <a:lnRef idx="0"/>
-          <a:fillRef idx="0"/>
-          <a:effectRef idx="0"/>
+          <a:lnRef idx="0">
+            <a:scrgbClr r="0" g="0" b="0"/>
+          </a:lnRef>
+          <a:fillRef idx="0">
+            <a:scrgbClr r="0" g="0" b="0"/>
+          </a:fillRef>
+          <a:effectRef idx="0">
+            <a:scrgbClr r="0" g="0" b="0"/>
+          </a:effectRef>
           <a:fontRef idx="minor"/>
         </p:style>
       </p:sp>
@@ -1877,10 +2328,10 @@
           <a:gradFill rotWithShape="0">
             <a:gsLst>
               <a:gs pos="0">
-                <a:srgbClr val="ffffff"/>
+                <a:srgbClr val="FFFFFF"/>
               </a:gs>
               <a:gs pos="100000">
-                <a:srgbClr val="edebff"/>
+                <a:srgbClr val="EDEBFF"/>
               </a:gs>
             </a:gsLst>
             <a:lin ang="10800000"/>
@@ -1890,13 +2341,20 @@
           </a:ln>
         </p:spPr>
         <p:style>
-          <a:lnRef idx="0"/>
-          <a:fillRef idx="0"/>
-          <a:effectRef idx="0"/>
+          <a:lnRef idx="0">
+            <a:scrgbClr r="0" g="0" b="0"/>
+          </a:lnRef>
+          <a:fillRef idx="0">
+            <a:scrgbClr r="0" g="0" b="0"/>
+          </a:fillRef>
+          <a:effectRef idx="0">
+            <a:scrgbClr r="0" g="0" b="0"/>
+          </a:effectRef>
           <a:fontRef idx="minor"/>
         </p:style>
         <p:txBody>
-          <a:bodyPr lIns="0" rIns="0" tIns="0" bIns="0" anchor="ctr"/>
+          <a:bodyPr lIns="0" tIns="0" rIns="0" bIns="0" anchor="ctr"/>
+          <a:lstStyle/>
           <a:p>
             <a:pPr>
               <a:lnSpc>
@@ -1904,7 +2362,7 @@
               </a:lnSpc>
             </a:pPr>
             <a:r>
-              <a:rPr b="0" lang="en-US" sz="4050" spc="-1" strike="noStrike">
+              <a:rPr lang="en-US" sz="4050" b="0" strike="noStrike" spc="-1">
                 <a:solidFill>
                   <a:srgbClr val="000000"/>
                 </a:solidFill>
@@ -1914,7 +2372,7 @@
               <a:t> </a:t>
             </a:r>
             <a:r>
-              <a:rPr b="0" lang="en-US" sz="4050" spc="-1" strike="noStrike">
+              <a:rPr lang="en-US" sz="4050" b="0" strike="noStrike" spc="-1">
                 <a:solidFill>
                   <a:srgbClr val="000000"/>
                 </a:solidFill>
@@ -1923,7 +2381,7 @@
               </a:rPr>
               <a:t>Methods</a:t>
             </a:r>
-            <a:endParaRPr b="0" lang="en-US" sz="4050" spc="-1" strike="noStrike">
+            <a:endParaRPr lang="en-US" sz="4050" b="0" strike="noStrike" spc="-1">
               <a:latin typeface="Arial"/>
             </a:endParaRPr>
           </a:p>
@@ -1946,10 +2404,10 @@
           <a:gradFill rotWithShape="0">
             <a:gsLst>
               <a:gs pos="0">
-                <a:srgbClr val="ffffff"/>
+                <a:srgbClr val="FFFFFF"/>
               </a:gs>
               <a:gs pos="100000">
-                <a:srgbClr val="edebff"/>
+                <a:srgbClr val="EDEBFF"/>
               </a:gs>
             </a:gsLst>
             <a:lin ang="10800000"/>
@@ -1959,13 +2417,20 @@
           </a:ln>
         </p:spPr>
         <p:style>
-          <a:lnRef idx="0"/>
-          <a:fillRef idx="0"/>
-          <a:effectRef idx="0"/>
+          <a:lnRef idx="0">
+            <a:scrgbClr r="0" g="0" b="0"/>
+          </a:lnRef>
+          <a:fillRef idx="0">
+            <a:scrgbClr r="0" g="0" b="0"/>
+          </a:fillRef>
+          <a:effectRef idx="0">
+            <a:scrgbClr r="0" g="0" b="0"/>
+          </a:effectRef>
           <a:fontRef idx="minor"/>
         </p:style>
         <p:txBody>
-          <a:bodyPr lIns="0" rIns="0" tIns="0" bIns="0" anchor="ctr"/>
+          <a:bodyPr lIns="0" tIns="0" rIns="0" bIns="0" anchor="ctr"/>
+          <a:lstStyle/>
           <a:p>
             <a:pPr>
               <a:lnSpc>
@@ -1973,7 +2438,7 @@
               </a:lnSpc>
             </a:pPr>
             <a:r>
-              <a:rPr b="0" lang="en-US" sz="4050" spc="-1" strike="noStrike">
+              <a:rPr lang="en-US" sz="4050" b="0" strike="noStrike" spc="-1">
                 <a:solidFill>
                   <a:srgbClr val="000000"/>
                 </a:solidFill>
@@ -1983,7 +2448,7 @@
               <a:t> </a:t>
             </a:r>
             <a:r>
-              <a:rPr b="0" lang="en-US" sz="4050" spc="-1" strike="noStrike">
+              <a:rPr lang="en-US" sz="4050" b="0" strike="noStrike" spc="-1">
                 <a:solidFill>
                   <a:srgbClr val="000000"/>
                 </a:solidFill>
@@ -1992,7 +2457,7 @@
               </a:rPr>
               <a:t>Experiments</a:t>
             </a:r>
-            <a:endParaRPr b="0" lang="en-US" sz="4050" spc="-1" strike="noStrike">
+            <a:endParaRPr lang="en-US" sz="4050" b="0" strike="noStrike" spc="-1">
               <a:latin typeface="Arial"/>
             </a:endParaRPr>
           </a:p>
@@ -2015,10 +2480,10 @@
           <a:gradFill rotWithShape="0">
             <a:gsLst>
               <a:gs pos="0">
-                <a:srgbClr val="ffffff"/>
+                <a:srgbClr val="FFFFFF"/>
               </a:gs>
               <a:gs pos="100000">
-                <a:srgbClr val="edebff"/>
+                <a:srgbClr val="EDEBFF"/>
               </a:gs>
             </a:gsLst>
             <a:lin ang="10800000"/>
@@ -2028,13 +2493,20 @@
           </a:ln>
         </p:spPr>
         <p:style>
-          <a:lnRef idx="0"/>
-          <a:fillRef idx="0"/>
-          <a:effectRef idx="0"/>
+          <a:lnRef idx="0">
+            <a:scrgbClr r="0" g="0" b="0"/>
+          </a:lnRef>
+          <a:fillRef idx="0">
+            <a:scrgbClr r="0" g="0" b="0"/>
+          </a:fillRef>
+          <a:effectRef idx="0">
+            <a:scrgbClr r="0" g="0" b="0"/>
+          </a:effectRef>
           <a:fontRef idx="minor"/>
         </p:style>
         <p:txBody>
-          <a:bodyPr lIns="0" rIns="0" tIns="0" bIns="0" anchor="ctr"/>
+          <a:bodyPr lIns="0" tIns="0" rIns="0" bIns="0" anchor="ctr"/>
+          <a:lstStyle/>
           <a:p>
             <a:pPr>
               <a:lnSpc>
@@ -2042,7 +2514,7 @@
               </a:lnSpc>
             </a:pPr>
             <a:r>
-              <a:rPr b="0" lang="en-US" sz="4050" spc="-1" strike="noStrike">
+              <a:rPr lang="en-US" sz="4050" b="0" strike="noStrike" spc="-1">
                 <a:solidFill>
                   <a:srgbClr val="000000"/>
                 </a:solidFill>
@@ -2052,7 +2524,7 @@
               <a:t> </a:t>
             </a:r>
             <a:r>
-              <a:rPr b="0" lang="en-US" sz="4050" spc="-1" strike="noStrike">
+              <a:rPr lang="en-US" sz="4050" b="0" strike="noStrike" spc="-1">
                 <a:solidFill>
                   <a:srgbClr val="000000"/>
                 </a:solidFill>
@@ -2061,7 +2533,7 @@
               </a:rPr>
               <a:t>Future Work</a:t>
             </a:r>
-            <a:endParaRPr b="0" lang="en-US" sz="4050" spc="-1" strike="noStrike">
+            <a:endParaRPr lang="en-US" sz="4050" b="0" strike="noStrike" spc="-1">
               <a:latin typeface="Arial"/>
             </a:endParaRPr>
           </a:p>
@@ -2084,10 +2556,10 @@
           <a:gradFill rotWithShape="0">
             <a:gsLst>
               <a:gs pos="0">
-                <a:srgbClr val="ffffff"/>
+                <a:srgbClr val="FFFFFF"/>
               </a:gs>
               <a:gs pos="100000">
-                <a:srgbClr val="edebff"/>
+                <a:srgbClr val="EDEBFF"/>
               </a:gs>
             </a:gsLst>
             <a:lin ang="10800000"/>
@@ -2097,13 +2569,20 @@
           </a:ln>
         </p:spPr>
         <p:style>
-          <a:lnRef idx="0"/>
-          <a:fillRef idx="0"/>
-          <a:effectRef idx="0"/>
+          <a:lnRef idx="0">
+            <a:scrgbClr r="0" g="0" b="0"/>
+          </a:lnRef>
+          <a:fillRef idx="0">
+            <a:scrgbClr r="0" g="0" b="0"/>
+          </a:fillRef>
+          <a:effectRef idx="0">
+            <a:scrgbClr r="0" g="0" b="0"/>
+          </a:effectRef>
           <a:fontRef idx="minor"/>
         </p:style>
         <p:txBody>
-          <a:bodyPr lIns="0" rIns="0" tIns="0" bIns="0" anchor="ctr"/>
+          <a:bodyPr lIns="0" tIns="0" rIns="0" bIns="0" anchor="ctr"/>
+          <a:lstStyle/>
           <a:p>
             <a:pPr>
               <a:lnSpc>
@@ -2111,7 +2590,83 @@
               </a:lnSpc>
             </a:pPr>
             <a:r>
-              <a:rPr b="0" lang="en-US" sz="4050" spc="-1" strike="noStrike">
+              <a:rPr lang="en-US" sz="4050" b="0" strike="noStrike" spc="-1">
+                <a:solidFill>
+                  <a:srgbClr val="000000"/>
+                </a:solidFill>
+                <a:latin typeface="Candara"/>
+                <a:ea typeface="Helvetica Neue UltraLight"/>
+              </a:rPr>
+              <a:t> T</a:t>
+            </a:r>
+            <a:r>
+              <a:rPr lang="en-US" sz="4050" b="0" strike="noStrike" spc="-1">
+                <a:solidFill>
+                  <a:srgbClr val="000000"/>
+                </a:solidFill>
+                <a:latin typeface="Candara"/>
+                <a:ea typeface="Helvetica Neue Light"/>
+              </a:rPr>
+              <a:t>he N-Body Problem</a:t>
+            </a:r>
+            <a:endParaRPr lang="en-US" sz="4050" b="0" strike="noStrike" spc="-1">
+              <a:latin typeface="Arial"/>
+            </a:endParaRPr>
+          </a:p>
+        </p:txBody>
+      </p:sp>
+      <p:sp>
+        <p:nvSpPr>
+          <p:cNvPr id="48" name="CustomShape 10"/>
+          <p:cNvSpPr/>
+          <p:nvPr/>
+        </p:nvSpPr>
+        <p:spPr>
+          <a:xfrm>
+            <a:off x="720720" y="18970560"/>
+            <a:ext cx="23687640" cy="770400"/>
+          </a:xfrm>
+          <a:prstGeom prst="rect">
+            <a:avLst/>
+          </a:prstGeom>
+          <a:gradFill rotWithShape="0">
+            <a:gsLst>
+              <a:gs pos="0">
+                <a:srgbClr val="FFFFFF"/>
+              </a:gs>
+              <a:gs pos="100000">
+                <a:srgbClr val="EDEBFF"/>
+              </a:gs>
+            </a:gsLst>
+            <a:lin ang="10800000"/>
+          </a:gradFill>
+          <a:ln w="12600">
+            <a:noFill/>
+          </a:ln>
+        </p:spPr>
+        <p:style>
+          <a:lnRef idx="0">
+            <a:scrgbClr r="0" g="0" b="0"/>
+          </a:lnRef>
+          <a:fillRef idx="0">
+            <a:scrgbClr r="0" g="0" b="0"/>
+          </a:fillRef>
+          <a:effectRef idx="0">
+            <a:scrgbClr r="0" g="0" b="0"/>
+          </a:effectRef>
+          <a:fontRef idx="minor"/>
+        </p:style>
+        <p:txBody>
+          <a:bodyPr lIns="0" tIns="0" rIns="0" bIns="0" anchor="ctr"/>
+          <a:lstStyle/>
+          <a:p>
+            <a:pPr>
+              <a:lnSpc>
+                <a:spcPct val="100000"/>
+              </a:lnSpc>
+            </a:pPr>
+            <a:r>
+              <a:rPr lang="en-US" sz="4050" b="0" strike="noStrike" spc="-1">
                 <a:solidFill>
                   <a:srgbClr val="000000"/>
                 </a:solidFill>
@@ -2121,86 +2676,7 @@
               <a:t> </a:t>
             </a:r>
             <a:r>
-              <a:rPr b="0" lang="en-US" sz="4050" spc="-1" strike="noStrike">
-                <a:solidFill>
-                  <a:srgbClr val="000000"/>
-                </a:solidFill>
-                <a:latin typeface="Candara"/>
-                <a:ea typeface="Helvetica Neue UltraLight"/>
-              </a:rPr>
-              <a:t>T</a:t>
-            </a:r>
-            <a:r>
-              <a:rPr b="0" lang="en-US" sz="4050" spc="-1" strike="noStrike">
-                <a:solidFill>
-                  <a:srgbClr val="000000"/>
-                </a:solidFill>
-                <a:latin typeface="Candara"/>
-                <a:ea typeface="Helvetica Neue Light"/>
-              </a:rPr>
-              <a:t>he N-Body Problem</a:t>
-            </a:r>
-            <a:endParaRPr b="0" lang="en-US" sz="4050" spc="-1" strike="noStrike">
-              <a:latin typeface="Arial"/>
-            </a:endParaRPr>
-          </a:p>
-        </p:txBody>
-      </p:sp>
-      <p:sp>
-        <p:nvSpPr>
-          <p:cNvPr id="48" name="CustomShape 10"/>
-          <p:cNvSpPr/>
-          <p:nvPr/>
-        </p:nvSpPr>
-        <p:spPr>
-          <a:xfrm>
-            <a:off x="720720" y="18970560"/>
-            <a:ext cx="23687640" cy="770400"/>
-          </a:xfrm>
-          <a:prstGeom prst="rect">
-            <a:avLst/>
-          </a:prstGeom>
-          <a:gradFill rotWithShape="0">
-            <a:gsLst>
-              <a:gs pos="0">
-                <a:srgbClr val="ffffff"/>
-              </a:gs>
-              <a:gs pos="100000">
-                <a:srgbClr val="edebff"/>
-              </a:gs>
-            </a:gsLst>
-            <a:lin ang="10800000"/>
-          </a:gradFill>
-          <a:ln w="12600">
-            <a:noFill/>
-          </a:ln>
-        </p:spPr>
-        <p:style>
-          <a:lnRef idx="0"/>
-          <a:fillRef idx="0"/>
-          <a:effectRef idx="0"/>
-          <a:fontRef idx="minor"/>
-        </p:style>
-        <p:txBody>
-          <a:bodyPr lIns="0" rIns="0" tIns="0" bIns="0" anchor="ctr"/>
-          <a:p>
-            <a:pPr>
-              <a:lnSpc>
-                <a:spcPct val="100000"/>
-              </a:lnSpc>
-            </a:pPr>
-            <a:r>
-              <a:rPr b="0" lang="en-US" sz="4050" spc="-1" strike="noStrike">
-                <a:solidFill>
-                  <a:srgbClr val="000000"/>
-                </a:solidFill>
-                <a:latin typeface="Candara"/>
-                <a:ea typeface="Helvetica Neue UltraLight"/>
-              </a:rPr>
-              <a:t> </a:t>
-            </a:r>
-            <a:r>
-              <a:rPr b="0" lang="en-US" sz="4050" spc="-1" strike="noStrike">
+              <a:rPr lang="en-US" sz="4050" b="0" strike="noStrike" spc="-1">
                 <a:solidFill>
                   <a:srgbClr val="000000"/>
                 </a:solidFill>
@@ -2209,7 +2685,7 @@
               </a:rPr>
               <a:t>References</a:t>
             </a:r>
-            <a:endParaRPr b="0" lang="en-US" sz="4050" spc="-1" strike="noStrike">
+            <a:endParaRPr lang="en-US" sz="4050" b="0" strike="noStrike" spc="-1">
               <a:latin typeface="Arial"/>
             </a:endParaRPr>
           </a:p>
@@ -2235,13 +2711,20 @@
           </a:ln>
         </p:spPr>
         <p:style>
-          <a:lnRef idx="0"/>
-          <a:fillRef idx="0"/>
-          <a:effectRef idx="0"/>
+          <a:lnRef idx="0">
+            <a:scrgbClr r="0" g="0" b="0"/>
+          </a:lnRef>
+          <a:fillRef idx="0">
+            <a:scrgbClr r="0" g="0" b="0"/>
+          </a:fillRef>
+          <a:effectRef idx="0">
+            <a:scrgbClr r="0" g="0" b="0"/>
+          </a:effectRef>
           <a:fontRef idx="minor"/>
         </p:style>
         <p:txBody>
-          <a:bodyPr lIns="0" rIns="0" tIns="0" bIns="0"/>
+          <a:bodyPr lIns="0" tIns="0" rIns="0" bIns="0"/>
+          <a:lstStyle/>
           <a:p>
             <a:pPr>
               <a:lnSpc>
@@ -2252,7 +2735,7 @@
               </a:spcBef>
             </a:pPr>
             <a:r>
-              <a:rPr b="0" lang="en-US" sz="2029" spc="-1" strike="noStrike">
+              <a:rPr lang="en-US" sz="2029" b="0" strike="noStrike" spc="-1">
                 <a:solidFill>
                   <a:srgbClr val="000000"/>
                 </a:solidFill>
@@ -2262,7 +2745,7 @@
               <a:t>Jaswinder Pal Singh, Chris Holt, Takashi Totsuka, Anoop Gupta and John L. Hennessy. </a:t>
             </a:r>
             <a:r>
-              <a:rPr b="1" lang="en-US" sz="2029" spc="-1" strike="noStrike">
+              <a:rPr lang="en-US" sz="2029" b="1" strike="noStrike" spc="-1">
                 <a:solidFill>
                   <a:srgbClr val="000000"/>
                 </a:solidFill>
@@ -2272,7 +2755,7 @@
               <a:t>Load Balancing and Data Locality in Adaptive Hierarchical N-body Methods: Barnes-Hut, Fast Multipole, and Radiosity</a:t>
             </a:r>
             <a:r>
-              <a:rPr b="0" lang="en-US" sz="2029" spc="-1" strike="noStrike">
+              <a:rPr lang="en-US" sz="2029" b="0" strike="noStrike" spc="-1">
                 <a:solidFill>
                   <a:srgbClr val="000000"/>
                 </a:solidFill>
@@ -2282,7 +2765,7 @@
               <a:t>.</a:t>
             </a:r>
             <a:r>
-              <a:rPr b="1" lang="en-US" sz="2029" spc="-1" strike="noStrike">
+              <a:rPr lang="en-US" sz="2029" b="1" strike="noStrike" spc="-1">
                 <a:solidFill>
                   <a:srgbClr val="000000"/>
                 </a:solidFill>
@@ -2292,7 +2775,7 @@
               <a:t> </a:t>
             </a:r>
             <a:r>
-              <a:rPr b="0" lang="en-US" sz="2029" spc="-1" strike="noStrike">
+              <a:rPr lang="en-US" sz="2029" b="0" strike="noStrike" spc="-1">
                 <a:solidFill>
                   <a:srgbClr val="000000"/>
                 </a:solidFill>
@@ -2301,7 +2784,7 @@
               </a:rPr>
               <a:t>Journal of Parallel and Distributed Computing Volume 27, Issue 2, June 1995.</a:t>
             </a:r>
-            <a:endParaRPr b="0" lang="en-US" sz="2029" spc="-1" strike="noStrike">
+            <a:endParaRPr lang="en-US" sz="2029" b="0" strike="noStrike" spc="-1">
               <a:latin typeface="Arial"/>
             </a:endParaRPr>
           </a:p>
@@ -2327,13 +2810,20 @@
           </a:ln>
         </p:spPr>
         <p:style>
-          <a:lnRef idx="0"/>
-          <a:fillRef idx="0"/>
-          <a:effectRef idx="0"/>
+          <a:lnRef idx="0">
+            <a:scrgbClr r="0" g="0" b="0"/>
+          </a:lnRef>
+          <a:fillRef idx="0">
+            <a:scrgbClr r="0" g="0" b="0"/>
+          </a:fillRef>
+          <a:effectRef idx="0">
+            <a:scrgbClr r="0" g="0" b="0"/>
+          </a:effectRef>
           <a:fontRef idx="minor"/>
         </p:style>
         <p:txBody>
-          <a:bodyPr lIns="0" rIns="0" tIns="0" bIns="0"/>
+          <a:bodyPr lIns="0" tIns="0" rIns="0" bIns="0"/>
+          <a:lstStyle/>
           <a:p>
             <a:pPr algn="just">
               <a:lnSpc>
@@ -2344,16 +2834,16 @@
               </a:spcBef>
             </a:pPr>
             <a:r>
-              <a:rPr b="0" lang="en-US" sz="2250" spc="-1" strike="noStrike">
+              <a:rPr lang="en-US" sz="2250" b="0" strike="noStrike" spc="-1" dirty="0">
                 <a:solidFill>
                   <a:srgbClr val="000000"/>
                 </a:solidFill>
                 <a:latin typeface="Cambria"/>
                 <a:ea typeface="American Typewriter"/>
               </a:rPr>
-              <a:t>We began our analysis by building off of three already existent code bases. In order to properly compare these three methods, we manipulated them so that they all had the same input and output format. We then created a script which randomly creates the mass, coordinates, and velocity vectors for each body.</a:t>
+              <a:t>We began our analysis by building off of three already existing code bases. In order to properly compare these three methods, we manipulated them so that they all had the same input and output format. We then created a script which randomly creates the mass, coordinates, and velocity vectors for each body.</a:t>
             </a:r>
-            <a:endParaRPr b="0" lang="en-US" sz="2250" spc="-1" strike="noStrike">
+            <a:endParaRPr lang="en-US" sz="2250" b="0" strike="noStrike" spc="-1" dirty="0">
               <a:latin typeface="Arial"/>
             </a:endParaRPr>
           </a:p>
@@ -2367,7 +2857,7 @@
               </a:spcBef>
             </a:pPr>
             <a:r>
-              <a:rPr b="0" lang="en-US" sz="2250" spc="-1" strike="noStrike">
+              <a:rPr lang="en-US" sz="2250" b="0" strike="noStrike" spc="-1" dirty="0">
                 <a:solidFill>
                   <a:srgbClr val="000000"/>
                 </a:solidFill>
@@ -2376,7 +2866,7 @@
               </a:rPr>
               <a:t>We then began to perform analysis on the serial versions of these three approaches to the N-Bodies problem.</a:t>
             </a:r>
-            <a:endParaRPr b="0" lang="en-US" sz="2250" spc="-1" strike="noStrike">
+            <a:endParaRPr lang="en-US" sz="2250" b="0" strike="noStrike" spc="-1" dirty="0">
               <a:latin typeface="Arial"/>
             </a:endParaRPr>
           </a:p>
@@ -2390,16 +2880,36 @@
               </a:spcBef>
             </a:pPr>
             <a:r>
-              <a:rPr b="0" lang="en-US" sz="2250" spc="-1" strike="noStrike">
+              <a:rPr lang="en-US" sz="2250" b="0" strike="noStrike" spc="-1" dirty="0">
                 <a:solidFill>
                   <a:srgbClr val="000000"/>
                 </a:solidFill>
                 <a:latin typeface="Cambria"/>
                 <a:ea typeface="American Typewriter"/>
               </a:rPr>
-              <a:t>We are now currently analyzing the code for dependencies so that we can know what regions of code are feasibly parallelizable.  </a:t>
+              <a:t>We are now currently analyzing the code for dependencies so that we can </a:t>
             </a:r>
-            <a:endParaRPr b="0" lang="en-US" sz="2250" spc="-1" strike="noStrike">
+            <a:r>
+              <a:rPr lang="en-US" sz="2250" spc="-1" dirty="0">
+                <a:solidFill>
+                  <a:srgbClr val="000000"/>
+                </a:solidFill>
+                <a:latin typeface="Cambria"/>
+                <a:ea typeface="American Typewriter"/>
+              </a:rPr>
+              <a:t>determine which</a:t>
+            </a:r>
+            <a:r>
+              <a:rPr lang="en-US" sz="2250" b="0" strike="noStrike" spc="-1" dirty="0">
+                <a:solidFill>
+                  <a:srgbClr val="000000"/>
+                </a:solidFill>
+                <a:latin typeface="Cambria"/>
+                <a:ea typeface="American Typewriter"/>
+              </a:rPr>
+              <a:t> regions of the code can be parallelized.</a:t>
+            </a:r>
+            <a:endParaRPr lang="en-US" sz="2250" b="0" strike="noStrike" spc="-1" dirty="0">
               <a:latin typeface="Arial"/>
             </a:endParaRPr>
           </a:p>
@@ -2425,13 +2935,20 @@
           </a:ln>
         </p:spPr>
         <p:style>
-          <a:lnRef idx="0"/>
-          <a:fillRef idx="0"/>
-          <a:effectRef idx="0"/>
+          <a:lnRef idx="0">
+            <a:scrgbClr r="0" g="0" b="0"/>
+          </a:lnRef>
+          <a:fillRef idx="0">
+            <a:scrgbClr r="0" g="0" b="0"/>
+          </a:fillRef>
+          <a:effectRef idx="0">
+            <a:scrgbClr r="0" g="0" b="0"/>
+          </a:effectRef>
           <a:fontRef idx="minor"/>
         </p:style>
         <p:txBody>
-          <a:bodyPr lIns="0" rIns="0" tIns="0" bIns="0"/>
+          <a:bodyPr lIns="0" tIns="0" rIns="0" bIns="0"/>
+          <a:lstStyle/>
           <a:p>
             <a:pPr>
               <a:lnSpc>
@@ -2442,7 +2959,7 @@
               </a:spcBef>
             </a:pPr>
             <a:r>
-              <a:rPr b="0" lang="en-US" sz="2029" spc="-1" strike="noStrike">
+              <a:rPr lang="en-US" sz="2029" b="0" strike="noStrike" spc="-1">
                 <a:solidFill>
                   <a:srgbClr val="000000"/>
                 </a:solidFill>
@@ -2451,7 +2968,7 @@
               </a:rPr>
               <a:t>Lorem ipsum dolor sit amet, consectetur adipiscing elit. Nunc eu libero a mauris mollis luctus. Vivamus lectus dui, suscipit vestibulum massa in, lacinia luctus turpis. Nulla fringilla ante et orci commodo scelerisque. Morbi nec tincidunt arcu.</a:t>
             </a:r>
-            <a:endParaRPr b="0" lang="en-US" sz="2029" spc="-1" strike="noStrike">
+            <a:endParaRPr lang="en-US" sz="2029" b="0" strike="noStrike" spc="-1">
               <a:latin typeface="Arial"/>
             </a:endParaRPr>
           </a:p>
@@ -2459,30 +2976,7 @@
       </p:sp>
       <p:pic>
         <p:nvPicPr>
-          <p:cNvPr id="52" name="droppedImage.png" descr=""/>
-          <p:cNvPicPr/>
-          <p:nvPr/>
-        </p:nvPicPr>
-        <p:blipFill>
-          <a:blip r:embed="rId2"/>
-          <a:stretch/>
-        </p:blipFill>
-        <p:spPr>
-          <a:xfrm>
-            <a:off x="27261360" y="14217480"/>
-            <a:ext cx="4185000" cy="2149920"/>
-          </a:xfrm>
-          <a:prstGeom prst="rect">
-            <a:avLst/>
-          </a:prstGeom>
-          <a:ln w="12600">
-            <a:noFill/>
-          </a:ln>
-        </p:spPr>
-      </p:pic>
-      <p:pic>
-        <p:nvPicPr>
-          <p:cNvPr id="53" name="droppedImage.png" descr=""/>
+          <p:cNvPr id="52" name="droppedImage.png"/>
           <p:cNvPicPr/>
           <p:nvPr/>
         </p:nvPicPr>
@@ -2492,8 +2986,8 @@
         </p:blipFill>
         <p:spPr>
           <a:xfrm>
-            <a:off x="23103720" y="15292800"/>
-            <a:ext cx="3793320" cy="3027960"/>
+            <a:off x="27261360" y="14217480"/>
+            <a:ext cx="4185000" cy="2149920"/>
           </a:xfrm>
           <a:prstGeom prst="rect">
             <a:avLst/>
@@ -2505,7 +2999,7 @@
       </p:pic>
       <p:pic>
         <p:nvPicPr>
-          <p:cNvPr id="54" name="droppedImage.png" descr=""/>
+          <p:cNvPr id="53" name="droppedImage.png"/>
           <p:cNvPicPr/>
           <p:nvPr/>
         </p:nvPicPr>
@@ -2515,6 +3009,29 @@
         </p:blipFill>
         <p:spPr>
           <a:xfrm>
+            <a:off x="23103720" y="15292800"/>
+            <a:ext cx="3793320" cy="3027960"/>
+          </a:xfrm>
+          <a:prstGeom prst="rect">
+            <a:avLst/>
+          </a:prstGeom>
+          <a:ln w="12600">
+            <a:noFill/>
+          </a:ln>
+        </p:spPr>
+      </p:pic>
+      <p:pic>
+        <p:nvPicPr>
+          <p:cNvPr id="54" name="droppedImage.png"/>
+          <p:cNvPicPr/>
+          <p:nvPr/>
+        </p:nvPicPr>
+        <p:blipFill>
+          <a:blip r:embed="rId5"/>
+          <a:stretch/>
+        </p:blipFill>
+        <p:spPr>
+          <a:xfrm>
             <a:off x="27577440" y="16694640"/>
             <a:ext cx="3552480" cy="1570680"/>
           </a:xfrm>
@@ -2546,13 +3063,20 @@
           </a:ln>
         </p:spPr>
         <p:style>
-          <a:lnRef idx="0"/>
-          <a:fillRef idx="0"/>
-          <a:effectRef idx="0"/>
+          <a:lnRef idx="0">
+            <a:scrgbClr r="0" g="0" b="0"/>
+          </a:lnRef>
+          <a:fillRef idx="0">
+            <a:scrgbClr r="0" g="0" b="0"/>
+          </a:fillRef>
+          <a:effectRef idx="0">
+            <a:scrgbClr r="0" g="0" b="0"/>
+          </a:effectRef>
           <a:fontRef idx="minor"/>
         </p:style>
         <p:txBody>
-          <a:bodyPr lIns="0" rIns="0" tIns="0" bIns="0"/>
+          <a:bodyPr lIns="0" tIns="0" rIns="0" bIns="0"/>
+          <a:lstStyle/>
           <a:p>
             <a:pPr algn="just">
               <a:lnSpc>
@@ -2563,7 +3087,7 @@
               </a:spcBef>
             </a:pPr>
             <a:r>
-              <a:rPr b="0" lang="en-US" sz="2250" spc="-1" strike="noStrike">
+              <a:rPr lang="en-US" sz="2250" b="0" strike="noStrike" spc="-1" dirty="0">
                 <a:solidFill>
                   <a:srgbClr val="000000"/>
                 </a:solidFill>
@@ -2572,7 +3096,26 @@
               </a:rPr>
               <a:t>Since most of the computation each approach is uses arrays/matrices, we could perform those operations on GPUs in order to speed up performance.</a:t>
             </a:r>
-            <a:endParaRPr b="0" lang="en-US" sz="2250" spc="-1" strike="noStrike">
+          </a:p>
+          <a:p>
+            <a:pPr algn="just">
+              <a:lnSpc>
+                <a:spcPct val="100000"/>
+              </a:lnSpc>
+              <a:spcBef>
+                <a:spcPts val="901"/>
+              </a:spcBef>
+            </a:pPr>
+            <a:r>
+              <a:rPr lang="en-US" sz="2250" spc="-1" dirty="0">
+                <a:solidFill>
+                  <a:srgbClr val="000000"/>
+                </a:solidFill>
+                <a:latin typeface="Cambria"/>
+              </a:rPr>
+              <a:t>The BHS implementation uses MPI whereas FMM does not. It may be possible to parallelize FMM with MPI since they have similar tree structures. Our current FMM implementation only uses OpenMP.</a:t>
+            </a:r>
+            <a:endParaRPr lang="en-US" sz="2250" b="0" strike="noStrike" spc="-1" dirty="0">
               <a:latin typeface="Arial"/>
             </a:endParaRPr>
           </a:p>
@@ -2598,13 +3141,20 @@
           </a:ln>
         </p:spPr>
         <p:style>
-          <a:lnRef idx="0"/>
-          <a:fillRef idx="0"/>
-          <a:effectRef idx="0"/>
+          <a:lnRef idx="0">
+            <a:scrgbClr r="0" g="0" b="0"/>
+          </a:lnRef>
+          <a:fillRef idx="0">
+            <a:scrgbClr r="0" g="0" b="0"/>
+          </a:fillRef>
+          <a:effectRef idx="0">
+            <a:scrgbClr r="0" g="0" b="0"/>
+          </a:effectRef>
           <a:fontRef idx="minor"/>
         </p:style>
         <p:txBody>
-          <a:bodyPr lIns="0" rIns="0" tIns="0" bIns="0"/>
+          <a:bodyPr lIns="0" tIns="0" rIns="0" bIns="0"/>
+          <a:lstStyle/>
           <a:p>
             <a:pPr algn="just">
               <a:lnSpc>
@@ -2615,16 +3165,56 @@
               </a:spcBef>
             </a:pPr>
             <a:r>
-              <a:rPr b="0" lang="en-US" sz="2250" spc="-1" strike="noStrike">
+              <a:rPr lang="en-US" sz="2250" b="0" strike="noStrike" spc="-1" dirty="0">
                 <a:solidFill>
                   <a:srgbClr val="000000"/>
                 </a:solidFill>
                 <a:latin typeface="Cambria"/>
                 <a:ea typeface="American Typewriter"/>
               </a:rPr>
-              <a:t>The N-Body Problem seeks to simulate forces between bodies. The problem of simulation when n &lt; 3 is trivial, however, when n &gt;= 3, simulation becomes computationally intensive. The three approaches we examined to the N-Body problem seek to speed up simulation by parallelizing the computation of forces.</a:t>
+              <a:t>The N-Body Problem seeks to simulate forces between bodies. The problem of simulation when the number of bodies is less than three is trivial, however, when </a:t>
             </a:r>
-            <a:endParaRPr b="0" lang="en-US" sz="2250" spc="-1" strike="noStrike">
+            <a:r>
+              <a:rPr lang="en-US" sz="2250" spc="-1" dirty="0">
+                <a:solidFill>
+                  <a:srgbClr val="000000"/>
+                </a:solidFill>
+                <a:latin typeface="Cambria"/>
+                <a:ea typeface="American Typewriter"/>
+              </a:rPr>
+              <a:t>the number of bodies is greater than three,</a:t>
+            </a:r>
+            <a:r>
+              <a:rPr lang="en-US" sz="2250" b="0" strike="noStrike" spc="-1" dirty="0">
+                <a:solidFill>
+                  <a:srgbClr val="000000"/>
+                </a:solidFill>
+                <a:latin typeface="Cambria"/>
+                <a:ea typeface="American Typewriter"/>
+              </a:rPr>
+              <a:t>, simulation becomes computationally intensive. The three approaches we examined to the N-Body problem </a:t>
+            </a:r>
+            <a:r>
+              <a:rPr lang="en-US" sz="2250" spc="-1" dirty="0">
+                <a:solidFill>
+                  <a:srgbClr val="000000"/>
+                </a:solidFill>
+                <a:latin typeface="Cambria"/>
+                <a:ea typeface="American Typewriter"/>
+              </a:rPr>
+              <a:t>attempt</a:t>
+            </a:r>
+            <a:r>
+              <a:rPr lang="en-US" sz="2250" b="0" strike="noStrike" spc="-1" dirty="0">
+                <a:solidFill>
+                  <a:srgbClr val="000000"/>
+                </a:solidFill>
+                <a:latin typeface="Cambria"/>
+                <a:ea typeface="American Typewriter"/>
+              </a:rPr>
+              <a:t> to speed up simulation by parallelizing the computation of forces.</a:t>
+            </a:r>
+            <a:endParaRPr lang="en-US" sz="2250" b="0" strike="noStrike" spc="-1" dirty="0">
               <a:latin typeface="Arial"/>
             </a:endParaRPr>
           </a:p>
@@ -2650,13 +3240,20 @@
           </a:ln>
         </p:spPr>
         <p:style>
-          <a:lnRef idx="0"/>
-          <a:fillRef idx="0"/>
-          <a:effectRef idx="0"/>
+          <a:lnRef idx="0">
+            <a:scrgbClr r="0" g="0" b="0"/>
+          </a:lnRef>
+          <a:fillRef idx="0">
+            <a:scrgbClr r="0" g="0" b="0"/>
+          </a:fillRef>
+          <a:effectRef idx="0">
+            <a:scrgbClr r="0" g="0" b="0"/>
+          </a:effectRef>
           <a:fontRef idx="minor"/>
         </p:style>
         <p:txBody>
-          <a:bodyPr lIns="0" rIns="0" tIns="0" bIns="0"/>
+          <a:bodyPr lIns="0" tIns="0" rIns="0" bIns="0"/>
+          <a:lstStyle/>
           <a:p>
             <a:pPr algn="ctr">
               <a:lnSpc>
@@ -2667,7 +3264,7 @@
               </a:spcBef>
             </a:pPr>
             <a:r>
-              <a:rPr b="0" lang="en-US" sz="2029" spc="-1" strike="noStrike">
+              <a:rPr lang="en-US" sz="2029" b="0" strike="noStrike" spc="-1">
                 <a:solidFill>
                   <a:srgbClr val="000000"/>
                 </a:solidFill>
@@ -2676,22 +3273,562 @@
               </a:rPr>
               <a:t>A representation of the Barnes Hut Simulation in two dimensions</a:t>
             </a:r>
-            <a:endParaRPr b="0" lang="en-US" sz="2029" spc="-1" strike="noStrike">
-              <a:latin typeface="Arial"/>
-            </a:endParaRPr>
-          </a:p>
-        </p:txBody>
-      </p:sp>
-      <p:sp>
-        <p:nvSpPr>
-          <p:cNvPr id="58" name="CustomShape 17"/>
+            <a:endParaRPr lang="en-US" sz="2029" b="0" strike="noStrike" spc="-1">
+              <a:latin typeface="Arial"/>
+            </a:endParaRPr>
+          </a:p>
+        </p:txBody>
+      </p:sp>
+      <mc:AlternateContent xmlns:mc="http://schemas.openxmlformats.org/markup-compatibility/2006">
+        <mc:Choice xmlns:a14="http://schemas.microsoft.com/office/drawing/2010/main" Requires="a14">
+          <p:sp>
+            <p:nvSpPr>
+              <p:cNvPr id="58" name="CustomShape 17"/>
+              <p:cNvSpPr/>
+              <p:nvPr/>
+            </p:nvSpPr>
+            <p:spPr>
+              <a:xfrm>
+                <a:off x="1145760" y="6740280"/>
+                <a:ext cx="8399880" cy="7615800"/>
+              </a:xfrm>
+              <a:prstGeom prst="rect">
+                <a:avLst/>
+              </a:prstGeom>
+              <a:noFill/>
+              <a:ln w="12600">
+                <a:noFill/>
+              </a:ln>
+            </p:spPr>
+            <p:style>
+              <a:lnRef idx="0">
+                <a:scrgbClr r="0" g="0" b="0"/>
+              </a:lnRef>
+              <a:fillRef idx="0">
+                <a:scrgbClr r="0" g="0" b="0"/>
+              </a:fillRef>
+              <a:effectRef idx="0">
+                <a:scrgbClr r="0" g="0" b="0"/>
+              </a:effectRef>
+              <a:fontRef idx="minor"/>
+            </p:style>
+            <p:txBody>
+              <a:bodyPr lIns="0" tIns="0" rIns="0" bIns="0"/>
+              <a:lstStyle/>
+              <a:p>
+                <a:pPr algn="just">
+                  <a:lnSpc>
+                    <a:spcPct val="100000"/>
+                  </a:lnSpc>
+                  <a:spcBef>
+                    <a:spcPts val="1001"/>
+                  </a:spcBef>
+                </a:pPr>
+                <a:r>
+                  <a:rPr lang="en-US" sz="2250" b="0" strike="noStrike" spc="-1" dirty="0">
+                    <a:solidFill>
+                      <a:srgbClr val="000000"/>
+                    </a:solidFill>
+                    <a:latin typeface="Cambria"/>
+                    <a:ea typeface="American Typewriter"/>
+                  </a:rPr>
+                  <a:t>We compare the Parker-Sochacki Method (PSM), the Barnes-Hut Simulation (BSM), and the Fast Multipole Method (</a:t>
+                </a:r>
+                <a:r>
+                  <a:rPr lang="en-US" sz="2250" spc="-1" dirty="0">
+                    <a:solidFill>
+                      <a:srgbClr val="000000"/>
+                    </a:solidFill>
+                    <a:latin typeface="Cambria"/>
+                    <a:ea typeface="American Typewriter"/>
+                  </a:rPr>
+                  <a:t>FMM</a:t>
+                </a:r>
+                <a:r>
+                  <a:rPr lang="en-US" sz="2250" b="0" strike="noStrike" spc="-1" dirty="0">
+                    <a:solidFill>
+                      <a:srgbClr val="000000"/>
+                    </a:solidFill>
+                    <a:latin typeface="Cambria"/>
+                    <a:ea typeface="American Typewriter"/>
+                  </a:rPr>
+                  <a:t>) approaches to simulating the N-Body problem, and determine which is the superior approach.</a:t>
+                </a:r>
+                <a:endParaRPr lang="en-US" sz="2250" b="0" strike="noStrike" spc="-1" dirty="0">
+                  <a:latin typeface="Arial"/>
+                </a:endParaRPr>
+              </a:p>
+              <a:p>
+                <a:pPr algn="just">
+                  <a:lnSpc>
+                    <a:spcPct val="100000"/>
+                  </a:lnSpc>
+                  <a:spcBef>
+                    <a:spcPts val="1001"/>
+                  </a:spcBef>
+                </a:pPr>
+                <a:endParaRPr lang="en-US" sz="2250" b="0" strike="noStrike" spc="-1" dirty="0">
+                  <a:latin typeface="Arial"/>
+                </a:endParaRPr>
+              </a:p>
+              <a:p>
+                <a:pPr algn="just">
+                  <a:lnSpc>
+                    <a:spcPct val="100000"/>
+                  </a:lnSpc>
+                  <a:spcBef>
+                    <a:spcPts val="1001"/>
+                  </a:spcBef>
+                </a:pPr>
+                <a:endParaRPr lang="en-US" sz="2250" b="0" strike="noStrike" spc="-1" dirty="0">
+                  <a:latin typeface="Arial"/>
+                </a:endParaRPr>
+              </a:p>
+              <a:p>
+                <a:pPr algn="just">
+                  <a:lnSpc>
+                    <a:spcPct val="100000"/>
+                  </a:lnSpc>
+                  <a:spcBef>
+                    <a:spcPts val="1001"/>
+                  </a:spcBef>
+                </a:pPr>
+                <a:endParaRPr lang="en-US" sz="2250" b="0" strike="noStrike" spc="-1" dirty="0">
+                  <a:latin typeface="Arial"/>
+                </a:endParaRPr>
+              </a:p>
+              <a:p>
+                <a:pPr algn="just">
+                  <a:lnSpc>
+                    <a:spcPct val="100000"/>
+                  </a:lnSpc>
+                  <a:spcBef>
+                    <a:spcPts val="1001"/>
+                  </a:spcBef>
+                </a:pPr>
+                <a:endParaRPr lang="en-US" sz="2250" b="0" strike="noStrike" spc="-1" dirty="0">
+                  <a:latin typeface="Arial"/>
+                </a:endParaRPr>
+              </a:p>
+              <a:p>
+                <a:pPr algn="just">
+                  <a:lnSpc>
+                    <a:spcPct val="100000"/>
+                  </a:lnSpc>
+                  <a:spcBef>
+                    <a:spcPts val="1001"/>
+                  </a:spcBef>
+                </a:pPr>
+                <a:endParaRPr lang="en-US" sz="2250" b="0" strike="noStrike" spc="-1" dirty="0">
+                  <a:latin typeface="Arial"/>
+                </a:endParaRPr>
+              </a:p>
+              <a:p>
+                <a:pPr algn="just">
+                  <a:lnSpc>
+                    <a:spcPct val="100000"/>
+                  </a:lnSpc>
+                  <a:spcBef>
+                    <a:spcPts val="1001"/>
+                  </a:spcBef>
+                </a:pPr>
+                <a:endParaRPr lang="en-US" sz="2250" b="0" strike="noStrike" spc="-1" dirty="0">
+                  <a:latin typeface="Arial"/>
+                </a:endParaRPr>
+              </a:p>
+              <a:p>
+                <a:pPr algn="just">
+                  <a:lnSpc>
+                    <a:spcPct val="100000"/>
+                  </a:lnSpc>
+                  <a:spcBef>
+                    <a:spcPts val="1001"/>
+                  </a:spcBef>
+                </a:pPr>
+                <a:endParaRPr lang="en-US" sz="2250" b="0" strike="noStrike" spc="-1" dirty="0">
+                  <a:latin typeface="Arial"/>
+                </a:endParaRPr>
+              </a:p>
+              <a:p>
+                <a:pPr algn="just">
+                  <a:lnSpc>
+                    <a:spcPct val="100000"/>
+                  </a:lnSpc>
+                  <a:spcBef>
+                    <a:spcPts val="1001"/>
+                  </a:spcBef>
+                </a:pPr>
+                <a:endParaRPr lang="en-US" sz="2250" b="0" strike="noStrike" spc="-1" dirty="0">
+                  <a:latin typeface="Arial"/>
+                </a:endParaRPr>
+              </a:p>
+              <a:p>
+                <a:pPr algn="just">
+                  <a:lnSpc>
+                    <a:spcPct val="100000"/>
+                  </a:lnSpc>
+                  <a:spcBef>
+                    <a:spcPts val="1001"/>
+                  </a:spcBef>
+                </a:pPr>
+                <a:endParaRPr lang="en-US" sz="2250" b="0" strike="noStrike" spc="-1" dirty="0">
+                  <a:latin typeface="Arial"/>
+                </a:endParaRPr>
+              </a:p>
+              <a:p>
+                <a:pPr algn="just">
+                  <a:lnSpc>
+                    <a:spcPct val="100000"/>
+                  </a:lnSpc>
+                  <a:spcBef>
+                    <a:spcPts val="1001"/>
+                  </a:spcBef>
+                </a:pPr>
+                <a:endParaRPr lang="en-US" sz="2250" b="0" strike="noStrike" spc="-1" dirty="0">
+                  <a:solidFill>
+                    <a:srgbClr val="000000"/>
+                  </a:solidFill>
+                  <a:latin typeface="Cambria"/>
+                  <a:ea typeface="American Typewriter"/>
+                </a:endParaRPr>
+              </a:p>
+              <a:p>
+                <a:pPr algn="just">
+                  <a:lnSpc>
+                    <a:spcPct val="100000"/>
+                  </a:lnSpc>
+                  <a:spcBef>
+                    <a:spcPts val="1001"/>
+                  </a:spcBef>
+                </a:pPr>
+                <a:r>
+                  <a:rPr lang="en-US" sz="2250" b="0" strike="noStrike" spc="-1" dirty="0">
+                    <a:solidFill>
+                      <a:srgbClr val="000000"/>
+                    </a:solidFill>
+                    <a:latin typeface="Cambria"/>
+                    <a:ea typeface="American Typewriter"/>
+                  </a:rPr>
+                  <a:t>The Barnes-Hut Simulation treats the space as a tree that is recursively divided until each leaf node contains either one or zero bodies. Because of the tree structure BHS uses, it has a runtime of </a:t>
+                </a:r>
+                <a14:m>
+                  <m:oMath xmlns:m="http://schemas.openxmlformats.org/officeDocument/2006/math">
+                    <m:r>
+                      <a:rPr lang="en-US" sz="2250" b="0" i="1" strike="noStrike" spc="-1" smtClean="0">
+                        <a:solidFill>
+                          <a:srgbClr val="000000"/>
+                        </a:solidFill>
+                        <a:latin typeface="Cambria Math" panose="02040503050406030204" pitchFamily="18" charset="0"/>
+                        <a:ea typeface="American Typewriter"/>
+                      </a:rPr>
+                      <m:t>𝑂</m:t>
+                    </m:r>
+                    <m:r>
+                      <a:rPr lang="en-US" sz="2250" b="0" i="1" strike="noStrike" spc="-1" smtClean="0">
+                        <a:solidFill>
+                          <a:srgbClr val="000000"/>
+                        </a:solidFill>
+                        <a:latin typeface="Cambria Math" panose="02040503050406030204" pitchFamily="18" charset="0"/>
+                        <a:ea typeface="American Typewriter"/>
+                      </a:rPr>
+                      <m:t>(</m:t>
+                    </m:r>
+                    <m:r>
+                      <a:rPr lang="en-US" sz="2250" b="0" i="1" strike="noStrike" spc="-1" smtClean="0">
+                        <a:solidFill>
+                          <a:srgbClr val="000000"/>
+                        </a:solidFill>
+                        <a:latin typeface="Cambria Math" panose="02040503050406030204" pitchFamily="18" charset="0"/>
+                        <a:ea typeface="American Typewriter"/>
+                      </a:rPr>
+                      <m:t>𝑛𝑙𝑜𝑔𝑛</m:t>
+                    </m:r>
+                    <m:r>
+                      <a:rPr lang="en-US" sz="2250" b="0" i="1" strike="noStrike" spc="-1" smtClean="0">
+                        <a:solidFill>
+                          <a:srgbClr val="000000"/>
+                        </a:solidFill>
+                        <a:latin typeface="Cambria Math" panose="02040503050406030204" pitchFamily="18" charset="0"/>
+                        <a:ea typeface="American Typewriter"/>
+                      </a:rPr>
+                      <m:t>)</m:t>
+                    </m:r>
+                  </m:oMath>
+                </a14:m>
+                <a:r>
+                  <a:rPr lang="en-US" sz="2250" b="0" strike="noStrike" spc="-1" dirty="0">
+                    <a:solidFill>
+                      <a:srgbClr val="000000"/>
+                    </a:solidFill>
+                    <a:latin typeface="Cambria"/>
+                    <a:ea typeface="American Typewriter"/>
+                  </a:rPr>
+                  <a:t>.</a:t>
+                </a:r>
+              </a:p>
+              <a:p>
+                <a:pPr algn="just">
+                  <a:lnSpc>
+                    <a:spcPct val="100000"/>
+                  </a:lnSpc>
+                  <a:spcBef>
+                    <a:spcPts val="1001"/>
+                  </a:spcBef>
+                </a:pPr>
+                <a:r>
+                  <a:rPr lang="en-US" sz="2250" b="0" strike="noStrike" spc="-1" dirty="0">
+                    <a:solidFill>
+                      <a:srgbClr val="000000"/>
+                    </a:solidFill>
+                    <a:latin typeface="Cambria"/>
+                    <a:ea typeface="American Typewriter"/>
+                  </a:rPr>
+                  <a:t>The Parker-Sochacki Method treats the simulation of forces between bodies as a metric space. This allows the simulation to take advantage of many computations which can only be performed on metric spaces.</a:t>
+                </a:r>
+                <a:endParaRPr lang="en-US" sz="2250" b="0" strike="noStrike" spc="-1" dirty="0">
+                  <a:latin typeface="Arial"/>
+                </a:endParaRPr>
+              </a:p>
+              <a:p>
+                <a:pPr algn="just">
+                  <a:lnSpc>
+                    <a:spcPct val="100000"/>
+                  </a:lnSpc>
+                  <a:spcBef>
+                    <a:spcPts val="1001"/>
+                  </a:spcBef>
+                </a:pPr>
+                <a:r>
+                  <a:rPr lang="en-US" sz="2250" b="0" strike="noStrike" spc="-1" dirty="0">
+                    <a:solidFill>
+                      <a:srgbClr val="000000"/>
+                    </a:solidFill>
+                    <a:latin typeface="Cambria"/>
+                    <a:ea typeface="American Typewriter"/>
+                  </a:rPr>
+                  <a:t>The Fast Multipole Method uses a tree similar to BSM, but instead of calculating the force of the particles it calculates the potential. </a:t>
+                </a:r>
+                <a:r>
+                  <a:rPr lang="en-US" sz="2250" spc="-1" dirty="0">
+                    <a:solidFill>
+                      <a:srgbClr val="000000"/>
+                    </a:solidFill>
+                    <a:latin typeface="Cambria"/>
+                    <a:ea typeface="American Typewriter"/>
+                  </a:rPr>
+                  <a:t>For each timestep, the tree is traversed three times, computing outer expansions on the way up, inner expansions on the way down, and then accumulates the potential for each particle. It uses a special error value </a:t>
+                </a:r>
+                <a14:m>
+                  <m:oMath xmlns:m="http://schemas.openxmlformats.org/officeDocument/2006/math">
+                    <m:r>
+                      <a:rPr lang="en-US" sz="2250" b="0" i="1" spc="-1" smtClean="0">
+                        <a:solidFill>
+                          <a:srgbClr val="000000"/>
+                        </a:solidFill>
+                        <a:latin typeface="Cambria Math" panose="02040503050406030204" pitchFamily="18" charset="0"/>
+                        <a:ea typeface="Cambria Math" panose="02040503050406030204" pitchFamily="18" charset="0"/>
+                      </a:rPr>
+                      <m:t>𝜀</m:t>
+                    </m:r>
+                  </m:oMath>
+                </a14:m>
+                <a:r>
+                  <a:rPr lang="en-US" sz="2250" spc="-1" dirty="0">
+                    <a:solidFill>
+                      <a:srgbClr val="000000"/>
+                    </a:solidFill>
+                    <a:latin typeface="Cambria"/>
+                    <a:ea typeface="American Typewriter"/>
+                  </a:rPr>
+                  <a:t> which determines how accurate the results are, resulting in a running time of  </a:t>
+                </a:r>
+                <a14:m>
+                  <m:oMath xmlns:m="http://schemas.openxmlformats.org/officeDocument/2006/math">
+                    <m:r>
+                      <a:rPr lang="en-US" sz="2250" b="0" i="1" spc="-1" smtClean="0">
+                        <a:solidFill>
+                          <a:srgbClr val="000000"/>
+                        </a:solidFill>
+                        <a:latin typeface="Cambria Math" panose="02040503050406030204" pitchFamily="18" charset="0"/>
+                        <a:ea typeface="American Typewriter"/>
+                      </a:rPr>
+                      <m:t>𝑂</m:t>
+                    </m:r>
+                    <m:d>
+                      <m:dPr>
+                        <m:ctrlPr>
+                          <a:rPr lang="en-US" sz="2250" b="0" i="1" spc="-1" smtClean="0">
+                            <a:solidFill>
+                              <a:srgbClr val="000000"/>
+                            </a:solidFill>
+                            <a:latin typeface="Cambria Math" panose="02040503050406030204" pitchFamily="18" charset="0"/>
+                            <a:ea typeface="American Typewriter"/>
+                          </a:rPr>
+                        </m:ctrlPr>
+                      </m:dPr>
+                      <m:e>
+                        <m:func>
+                          <m:funcPr>
+                            <m:ctrlPr>
+                              <a:rPr lang="en-US" sz="2250" b="0" i="1" spc="-1" smtClean="0">
+                                <a:solidFill>
+                                  <a:srgbClr val="000000"/>
+                                </a:solidFill>
+                                <a:latin typeface="Cambria Math" panose="02040503050406030204" pitchFamily="18" charset="0"/>
+                                <a:ea typeface="American Typewriter"/>
+                              </a:rPr>
+                            </m:ctrlPr>
+                          </m:funcPr>
+                          <m:fName>
+                            <m:r>
+                              <m:rPr>
+                                <m:sty m:val="p"/>
+                              </m:rPr>
+                              <a:rPr lang="en-US" sz="2250" b="0" i="0" spc="-1" smtClean="0">
+                                <a:solidFill>
+                                  <a:srgbClr val="000000"/>
+                                </a:solidFill>
+                                <a:latin typeface="Cambria Math" panose="02040503050406030204" pitchFamily="18" charset="0"/>
+                                <a:ea typeface="American Typewriter"/>
+                              </a:rPr>
+                              <m:t>log</m:t>
+                            </m:r>
+                          </m:fName>
+                          <m:e>
+                            <m:d>
+                              <m:dPr>
+                                <m:ctrlPr>
+                                  <a:rPr lang="en-US" sz="2250" b="0" i="1" spc="-1" smtClean="0">
+                                    <a:solidFill>
+                                      <a:srgbClr val="000000"/>
+                                    </a:solidFill>
+                                    <a:latin typeface="Cambria Math" panose="02040503050406030204" pitchFamily="18" charset="0"/>
+                                    <a:ea typeface="American Typewriter"/>
+                                  </a:rPr>
+                                </m:ctrlPr>
+                              </m:dPr>
+                              <m:e>
+                                <m:f>
+                                  <m:fPr>
+                                    <m:ctrlPr>
+                                      <a:rPr lang="en-US" sz="2250" b="0" i="1" spc="-1" smtClean="0">
+                                        <a:solidFill>
+                                          <a:srgbClr val="000000"/>
+                                        </a:solidFill>
+                                        <a:latin typeface="Cambria Math" panose="02040503050406030204" pitchFamily="18" charset="0"/>
+                                      </a:rPr>
+                                    </m:ctrlPr>
+                                  </m:fPr>
+                                  <m:num>
+                                    <m:r>
+                                      <a:rPr lang="en-US" sz="2250" b="0" i="1" spc="-1" smtClean="0">
+                                        <a:solidFill>
+                                          <a:srgbClr val="000000"/>
+                                        </a:solidFill>
+                                        <a:latin typeface="Cambria Math" panose="02040503050406030204" pitchFamily="18" charset="0"/>
+                                      </a:rPr>
+                                      <m:t>1</m:t>
+                                    </m:r>
+                                  </m:num>
+                                  <m:den>
+                                    <m:r>
+                                      <a:rPr lang="en-US" sz="2250" b="0" i="1" spc="-1" smtClean="0">
+                                        <a:solidFill>
+                                          <a:srgbClr val="000000"/>
+                                        </a:solidFill>
+                                        <a:latin typeface="Cambria Math" panose="02040503050406030204" pitchFamily="18" charset="0"/>
+                                        <a:ea typeface="Cambria Math" panose="02040503050406030204" pitchFamily="18" charset="0"/>
+                                      </a:rPr>
+                                      <m:t>𝜀</m:t>
+                                    </m:r>
+                                  </m:den>
+                                </m:f>
+                              </m:e>
+                            </m:d>
+                          </m:e>
+                        </m:func>
+                        <m:r>
+                          <a:rPr lang="en-US" sz="2250" b="0" i="1" spc="-1" smtClean="0">
+                            <a:solidFill>
+                              <a:srgbClr val="000000"/>
+                            </a:solidFill>
+                            <a:latin typeface="Cambria Math" panose="02040503050406030204" pitchFamily="18" charset="0"/>
+                          </a:rPr>
+                          <m:t>𝑛</m:t>
+                        </m:r>
+                      </m:e>
+                    </m:d>
+                  </m:oMath>
+                </a14:m>
+                <a:r>
+                  <a:rPr lang="en-US" sz="2250" spc="-1" dirty="0">
+                    <a:solidFill>
+                      <a:srgbClr val="000000"/>
+                    </a:solidFill>
+                    <a:latin typeface="Cambria"/>
+                    <a:ea typeface="American Typewriter"/>
+                  </a:rPr>
+                  <a:t>, where n is the number of bodies.</a:t>
+                </a:r>
+                <a:endParaRPr lang="en-US" sz="2250" b="0" strike="noStrike" spc="-1" dirty="0">
+                  <a:latin typeface="Arial"/>
+                </a:endParaRPr>
+              </a:p>
+            </p:txBody>
+          </p:sp>
+        </mc:Choice>
+        <mc:Fallback>
+          <p:sp>
+            <p:nvSpPr>
+              <p:cNvPr id="58" name="CustomShape 17"/>
+              <p:cNvSpPr>
+                <a:spLocks noRot="1" noChangeAspect="1" noMove="1" noResize="1" noEditPoints="1" noAdjustHandles="1" noChangeArrowheads="1" noChangeShapeType="1" noTextEdit="1"/>
+              </p:cNvSpPr>
+              <p:nvPr/>
+            </p:nvSpPr>
+            <p:spPr>
+              <a:xfrm>
+                <a:off x="1145760" y="6740280"/>
+                <a:ext cx="8399880" cy="7615800"/>
+              </a:xfrm>
+              <a:prstGeom prst="rect">
+                <a:avLst/>
+              </a:prstGeom>
+              <a:blipFill>
+                <a:blip r:embed="rId6"/>
+                <a:stretch>
+                  <a:fillRect l="-2104" t="-1201" r="-2032" b="-61249"/>
+                </a:stretch>
+              </a:blipFill>
+              <a:ln w="12600">
+                <a:noFill/>
+              </a:ln>
+            </p:spPr>
+            <p:txBody>
+              <a:bodyPr/>
+              <a:lstStyle/>
+              <a:p>
+                <a:r>
+                  <a:rPr lang="en-US">
+                    <a:noFill/>
+                  </a:rPr>
+                  <a:t> </a:t>
+                </a:r>
+              </a:p>
+            </p:txBody>
+          </p:sp>
+        </mc:Fallback>
+      </mc:AlternateContent>
+      <p:sp>
+        <p:nvSpPr>
+          <p:cNvPr id="59" name="CustomShape 18"/>
           <p:cNvSpPr/>
           <p:nvPr/>
         </p:nvSpPr>
         <p:spPr>
           <a:xfrm>
-            <a:off x="1115280" y="6740280"/>
-            <a:ext cx="8399880" cy="7615800"/>
+            <a:off x="1115280" y="13798440"/>
+            <a:ext cx="8399880" cy="4740120"/>
           </a:xfrm>
           <a:prstGeom prst="rect">
             <a:avLst/>
@@ -2702,260 +3839,28 @@
           </a:ln>
         </p:spPr>
         <p:style>
-          <a:lnRef idx="0"/>
-          <a:fillRef idx="0"/>
-          <a:effectRef idx="0"/>
+          <a:lnRef idx="0">
+            <a:scrgbClr r="0" g="0" b="0"/>
+          </a:lnRef>
+          <a:fillRef idx="0">
+            <a:scrgbClr r="0" g="0" b="0"/>
+          </a:fillRef>
+          <a:effectRef idx="0">
+            <a:scrgbClr r="0" g="0" b="0"/>
+          </a:effectRef>
           <a:fontRef idx="minor"/>
         </p:style>
-        <p:txBody>
-          <a:bodyPr lIns="0" rIns="0" tIns="0" bIns="0"/>
-          <a:p>
-            <a:pPr algn="just">
-              <a:lnSpc>
-                <a:spcPct val="100000"/>
-              </a:lnSpc>
-              <a:spcBef>
-                <a:spcPts val="1001"/>
-              </a:spcBef>
-            </a:pPr>
-            <a:r>
-              <a:rPr b="0" lang="en-US" sz="2250" spc="-1" strike="noStrike">
-                <a:solidFill>
-                  <a:srgbClr val="000000"/>
-                </a:solidFill>
-                <a:latin typeface="Cambria"/>
-                <a:ea typeface="American Typewriter"/>
-              </a:rPr>
-              <a:t>We seek to compare the Parker-Sochacki Method (PSM), the Barnes-Hut Simulation (BSM), and the Particle-Particle-Particle Method (P3M) approaches to simulating the N-Body problem, and determine which is the superior approach.</a:t>
-            </a:r>
-            <a:endParaRPr b="0" lang="en-US" sz="2250" spc="-1" strike="noStrike">
-              <a:latin typeface="Arial"/>
-            </a:endParaRPr>
-          </a:p>
-          <a:p>
-            <a:pPr algn="just">
-              <a:lnSpc>
-                <a:spcPct val="100000"/>
-              </a:lnSpc>
-              <a:spcBef>
-                <a:spcPts val="1001"/>
-              </a:spcBef>
-            </a:pPr>
-            <a:endParaRPr b="0" lang="en-US" sz="2250" spc="-1" strike="noStrike">
-              <a:latin typeface="Arial"/>
-            </a:endParaRPr>
-          </a:p>
-          <a:p>
-            <a:pPr algn="just">
-              <a:lnSpc>
-                <a:spcPct val="100000"/>
-              </a:lnSpc>
-              <a:spcBef>
-                <a:spcPts val="1001"/>
-              </a:spcBef>
-            </a:pPr>
-            <a:endParaRPr b="0" lang="en-US" sz="2250" spc="-1" strike="noStrike">
-              <a:latin typeface="Arial"/>
-            </a:endParaRPr>
-          </a:p>
-          <a:p>
-            <a:pPr algn="just">
-              <a:lnSpc>
-                <a:spcPct val="100000"/>
-              </a:lnSpc>
-              <a:spcBef>
-                <a:spcPts val="1001"/>
-              </a:spcBef>
-            </a:pPr>
-            <a:endParaRPr b="0" lang="en-US" sz="2250" spc="-1" strike="noStrike">
-              <a:latin typeface="Arial"/>
-            </a:endParaRPr>
-          </a:p>
-          <a:p>
-            <a:pPr algn="just">
-              <a:lnSpc>
-                <a:spcPct val="100000"/>
-              </a:lnSpc>
-              <a:spcBef>
-                <a:spcPts val="1001"/>
-              </a:spcBef>
-            </a:pPr>
-            <a:endParaRPr b="0" lang="en-US" sz="2250" spc="-1" strike="noStrike">
-              <a:latin typeface="Arial"/>
-            </a:endParaRPr>
-          </a:p>
-          <a:p>
-            <a:pPr algn="just">
-              <a:lnSpc>
-                <a:spcPct val="100000"/>
-              </a:lnSpc>
-              <a:spcBef>
-                <a:spcPts val="1001"/>
-              </a:spcBef>
-            </a:pPr>
-            <a:endParaRPr b="0" lang="en-US" sz="2250" spc="-1" strike="noStrike">
-              <a:latin typeface="Arial"/>
-            </a:endParaRPr>
-          </a:p>
-          <a:p>
-            <a:pPr algn="just">
-              <a:lnSpc>
-                <a:spcPct val="100000"/>
-              </a:lnSpc>
-              <a:spcBef>
-                <a:spcPts val="1001"/>
-              </a:spcBef>
-            </a:pPr>
-            <a:endParaRPr b="0" lang="en-US" sz="2250" spc="-1" strike="noStrike">
-              <a:latin typeface="Arial"/>
-            </a:endParaRPr>
-          </a:p>
-          <a:p>
-            <a:pPr algn="just">
-              <a:lnSpc>
-                <a:spcPct val="100000"/>
-              </a:lnSpc>
-              <a:spcBef>
-                <a:spcPts val="1001"/>
-              </a:spcBef>
-            </a:pPr>
-            <a:endParaRPr b="0" lang="en-US" sz="2250" spc="-1" strike="noStrike">
-              <a:latin typeface="Arial"/>
-            </a:endParaRPr>
-          </a:p>
-          <a:p>
-            <a:pPr algn="just">
-              <a:lnSpc>
-                <a:spcPct val="100000"/>
-              </a:lnSpc>
-              <a:spcBef>
-                <a:spcPts val="1001"/>
-              </a:spcBef>
-            </a:pPr>
-            <a:endParaRPr b="0" lang="en-US" sz="2250" spc="-1" strike="noStrike">
-              <a:latin typeface="Arial"/>
-            </a:endParaRPr>
-          </a:p>
-          <a:p>
-            <a:pPr algn="just">
-              <a:lnSpc>
-                <a:spcPct val="100000"/>
-              </a:lnSpc>
-              <a:spcBef>
-                <a:spcPts val="1001"/>
-              </a:spcBef>
-            </a:pPr>
-            <a:endParaRPr b="0" lang="en-US" sz="2250" spc="-1" strike="noStrike">
-              <a:latin typeface="Arial"/>
-            </a:endParaRPr>
-          </a:p>
-          <a:p>
-            <a:pPr algn="just">
-              <a:lnSpc>
-                <a:spcPct val="100000"/>
-              </a:lnSpc>
-              <a:spcBef>
-                <a:spcPts val="1001"/>
-              </a:spcBef>
-            </a:pPr>
-            <a:r>
-              <a:rPr b="0" lang="en-US" sz="2250" spc="-1" strike="noStrike">
-                <a:solidFill>
-                  <a:srgbClr val="000000"/>
-                </a:solidFill>
-                <a:latin typeface="Cambria"/>
-                <a:ea typeface="American Typewriter"/>
-              </a:rPr>
-              <a:t>The Barnes-Hut Simulation seeks to treat the space as a tree, recursively divided until each leaf node contains either one or zero bodies. Because of the tree structure BHS uses, it has a runtime of O(nlogn).</a:t>
-            </a:r>
-            <a:endParaRPr b="0" lang="en-US" sz="2250" spc="-1" strike="noStrike">
-              <a:latin typeface="Arial"/>
-            </a:endParaRPr>
-          </a:p>
-          <a:p>
-            <a:pPr algn="just">
-              <a:lnSpc>
-                <a:spcPct val="100000"/>
-              </a:lnSpc>
-              <a:spcBef>
-                <a:spcPts val="1001"/>
-              </a:spcBef>
-            </a:pPr>
-            <a:endParaRPr b="0" lang="en-US" sz="2250" spc="-1" strike="noStrike">
-              <a:latin typeface="Arial"/>
-            </a:endParaRPr>
-          </a:p>
-          <a:p>
-            <a:pPr algn="just">
-              <a:lnSpc>
-                <a:spcPct val="100000"/>
-              </a:lnSpc>
-              <a:spcBef>
-                <a:spcPts val="1001"/>
-              </a:spcBef>
-            </a:pPr>
-            <a:r>
-              <a:rPr b="0" lang="en-US" sz="2250" spc="-1" strike="noStrike">
-                <a:solidFill>
-                  <a:srgbClr val="000000"/>
-                </a:solidFill>
-                <a:latin typeface="Cambria"/>
-                <a:ea typeface="American Typewriter"/>
-              </a:rPr>
-              <a:t>The Parker-Sochacki Method seeks to treat the simulation of forces between bodies as a metric space. This allows the simulation to take advantage of many computations which can only be performed on metric spaces.</a:t>
-            </a:r>
-            <a:endParaRPr b="0" lang="en-US" sz="2250" spc="-1" strike="noStrike">
-              <a:latin typeface="Arial"/>
-            </a:endParaRPr>
-          </a:p>
-          <a:p>
-            <a:pPr algn="just">
-              <a:lnSpc>
-                <a:spcPct val="100000"/>
-              </a:lnSpc>
-              <a:spcBef>
-                <a:spcPts val="1001"/>
-              </a:spcBef>
-            </a:pPr>
-            <a:endParaRPr b="0" lang="en-US" sz="2250" spc="-1" strike="noStrike">
-              <a:latin typeface="Arial"/>
-            </a:endParaRPr>
-          </a:p>
-          <a:p>
-            <a:pPr algn="just">
-              <a:lnSpc>
-                <a:spcPct val="100000"/>
-              </a:lnSpc>
-              <a:spcBef>
-                <a:spcPts val="1001"/>
-              </a:spcBef>
-            </a:pPr>
-            <a:r>
-              <a:rPr b="0" lang="en-US" sz="2250" spc="-1" strike="noStrike">
-                <a:solidFill>
-                  <a:srgbClr val="000000"/>
-                </a:solidFill>
-                <a:latin typeface="Cambria"/>
-                <a:ea typeface="American Typewriter"/>
-              </a:rPr>
-              <a:t>The P3M Approach interpolates all bodies to points on a grid. Forces are calculated on points of the grid instead of on individual bodies.</a:t>
-            </a:r>
-            <a:endParaRPr b="0" lang="en-US" sz="2250" spc="-1" strike="noStrike">
-              <a:latin typeface="Arial"/>
-            </a:endParaRPr>
-          </a:p>
-        </p:txBody>
-      </p:sp>
-      <p:sp>
-        <p:nvSpPr>
-          <p:cNvPr id="59" name="CustomShape 18"/>
+      </p:sp>
+      <p:sp>
+        <p:nvSpPr>
+          <p:cNvPr id="60" name="CustomShape 19"/>
           <p:cNvSpPr/>
           <p:nvPr/>
         </p:nvSpPr>
         <p:spPr>
           <a:xfrm>
-            <a:off x="1115280" y="13798440"/>
-            <a:ext cx="8399880" cy="4740120"/>
+            <a:off x="17257080" y="9378720"/>
+            <a:ext cx="14334120" cy="3026520"/>
           </a:xfrm>
           <a:prstGeom prst="rect">
             <a:avLst/>
@@ -2966,39 +3871,20 @@
           </a:ln>
         </p:spPr>
         <p:style>
-          <a:lnRef idx="0"/>
-          <a:fillRef idx="0"/>
-          <a:effectRef idx="0"/>
+          <a:lnRef idx="0">
+            <a:scrgbClr r="0" g="0" b="0"/>
+          </a:lnRef>
+          <a:fillRef idx="0">
+            <a:scrgbClr r="0" g="0" b="0"/>
+          </a:fillRef>
+          <a:effectRef idx="0">
+            <a:scrgbClr r="0" g="0" b="0"/>
+          </a:effectRef>
           <a:fontRef idx="minor"/>
         </p:style>
-      </p:sp>
-      <p:sp>
-        <p:nvSpPr>
-          <p:cNvPr id="60" name="CustomShape 19"/>
-          <p:cNvSpPr/>
-          <p:nvPr/>
-        </p:nvSpPr>
-        <p:spPr>
-          <a:xfrm>
-            <a:off x="17241840" y="9378720"/>
-            <a:ext cx="14334120" cy="3026520"/>
-          </a:xfrm>
-          <a:prstGeom prst="rect">
-            <a:avLst/>
-          </a:prstGeom>
-          <a:noFill/>
-          <a:ln w="12600">
-            <a:noFill/>
-          </a:ln>
-        </p:spPr>
-        <p:style>
-          <a:lnRef idx="0"/>
-          <a:fillRef idx="0"/>
-          <a:effectRef idx="0"/>
-          <a:fontRef idx="minor"/>
-        </p:style>
-        <p:txBody>
-          <a:bodyPr lIns="0" rIns="0" tIns="0" bIns="0"/>
+        <p:txBody>
+          <a:bodyPr lIns="0" tIns="0" rIns="0" bIns="0"/>
+          <a:lstStyle/>
           <a:p>
             <a:pPr algn="just">
               <a:lnSpc>
@@ -3009,18 +3895,14 @@
               </a:spcBef>
             </a:pPr>
             <a:r>
-              <a:rPr b="0" lang="en-US" sz="2250" spc="-1" strike="noStrike">
+              <a:rPr lang="en-US" sz="2250" spc="-1" dirty="0">
                 <a:solidFill>
                   <a:srgbClr val="000000"/>
                 </a:solidFill>
                 <a:latin typeface="Cambria"/>
-                <a:ea typeface="American Typewriter"/>
               </a:rPr>
-              <a:t>Lorem ipsum dolor sit amet, consectetur adipiscing elit. Nunc eu libero a mauris mollis luctus. Vivamus lectus dui, suscipit vestibulum massa in, lacinia luctus turpis. Nulla fringilla ante et orci commodo scelerisque. Morbi nec tincidunt arcu. Integer vel nisl viverra leo luctus dignissim vel nec diam. </a:t>
+              <a:t>We will start by testing our programs with an accurate description of our solar system, to confirm that our code is correct.</a:t>
             </a:r>
-            <a:endParaRPr b="0" lang="en-US" sz="2250" spc="-1" strike="noStrike">
-              <a:latin typeface="Arial"/>
-            </a:endParaRPr>
           </a:p>
           <a:p>
             <a:pPr algn="just">
@@ -3032,56 +3914,34 @@
               </a:spcBef>
             </a:pPr>
             <a:r>
-              <a:rPr b="0" lang="en-US" sz="2250" spc="-1" strike="noStrike">
+              <a:rPr lang="en-US" sz="2250" b="0" strike="noStrike" spc="-1" dirty="0">
                 <a:solidFill>
                   <a:srgbClr val="000000"/>
                 </a:solidFill>
                 <a:latin typeface="Cambria"/>
-                <a:ea typeface="American Typewriter"/>
               </a:rPr>
-              <a:t>Fusce venenatis pulvinar euismod. </a:t>
+              <a:t>We will then use the script we created to generate the same input parameters for each program, and compare each program’s running time and scaling behavior using 1, 2, 4, 8, 16, 32, and 64 threads. We will start with 10,000 bodies and work up to 64,000 to determine weak scaling behavior, and will use a constant 100,000 bodies to determine strong scaling behavior.</a:t>
             </a:r>
+          </a:p>
+          <a:p>
+            <a:pPr algn="just">
+              <a:lnSpc>
+                <a:spcPct val="100000"/>
+              </a:lnSpc>
+              <a:spcBef>
+                <a:spcPts val="2251"/>
+              </a:spcBef>
+            </a:pPr>
             <a:r>
-              <a:rPr b="1" lang="en-US" sz="2250" spc="-1" strike="noStrike">
+              <a:rPr lang="en-US" sz="2250" b="0" strike="noStrike" spc="-1" dirty="0">
                 <a:solidFill>
                   <a:srgbClr val="000000"/>
                 </a:solidFill>
                 <a:latin typeface="Cambria"/>
-                <a:ea typeface="American Typewriter"/>
               </a:rPr>
-              <a:t>Integer</a:t>
+              <a:t>For FMM, we will also experiment with different bin sizes and number of bins, in order to determine the optimal set up.</a:t>
             </a:r>
-            <a:r>
-              <a:rPr b="0" lang="en-US" sz="2250" spc="-1" strike="noStrike">
-                <a:solidFill>
-                  <a:srgbClr val="000000"/>
-                </a:solidFill>
-                <a:latin typeface="Cambria"/>
-                <a:ea typeface="American Typewriter"/>
-              </a:rPr>
-              <a:t> </a:t>
-            </a:r>
-            <a:r>
-              <a:rPr b="1" lang="en-US" sz="2250" spc="-1" strike="noStrike">
-                <a:solidFill>
-                  <a:srgbClr val="000000"/>
-                </a:solidFill>
-                <a:latin typeface="Cambria"/>
-                <a:ea typeface="American Typewriter"/>
-              </a:rPr>
-              <a:t>interdum</a:t>
-            </a:r>
-            <a:r>
-              <a:rPr b="0" lang="en-US" sz="2250" spc="-1" strike="noStrike">
-                <a:solidFill>
-                  <a:srgbClr val="000000"/>
-                </a:solidFill>
-                <a:latin typeface="Cambria"/>
-                <a:ea typeface="American Typewriter"/>
-              </a:rPr>
-              <a:t> nec elit vitae facilisis. Proin nisi erat, vulputate aliquet dui non, finibus scelerisque risus. Proin nisi erat, vulputate aliquet dui non, finibus scelerisque risus. Proin nisi erat, vulputate aliquet dui non, finibus scelerisque risus. Proin nisi erat, vulputate aliquet dui non, finibus scelerisque risus.</a:t>
-            </a:r>
-            <a:endParaRPr b="0" lang="en-US" sz="2250" spc="-1" strike="noStrike">
+            <a:endParaRPr lang="en-US" sz="2250" b="0" strike="noStrike" spc="-1" dirty="0">
               <a:latin typeface="Arial"/>
             </a:endParaRPr>
           </a:p>
@@ -3089,7 +3949,7 @@
       </p:sp>
       <p:pic>
         <p:nvPicPr>
-          <p:cNvPr id="61" name="droppedImage.png" descr=""/>
+          <p:cNvPr id="61" name="droppedImage.png"/>
           <p:cNvPicPr/>
           <p:nvPr/>
         </p:nvPicPr>
@@ -3112,30 +3972,7 @@
       </p:pic>
       <p:pic>
         <p:nvPicPr>
-          <p:cNvPr id="62" name="Picture 2" descr=""/>
-          <p:cNvPicPr/>
-          <p:nvPr/>
-        </p:nvPicPr>
-        <p:blipFill>
-          <a:blip r:embed="rId6"/>
-          <a:stretch/>
-        </p:blipFill>
-        <p:spPr>
-          <a:xfrm>
-            <a:off x="25001280" y="345600"/>
-            <a:ext cx="7068600" cy="2393280"/>
-          </a:xfrm>
-          <a:prstGeom prst="rect">
-            <a:avLst/>
-          </a:prstGeom>
-          <a:ln>
-            <a:noFill/>
-          </a:ln>
-        </p:spPr>
-      </p:pic>
-      <p:pic>
-        <p:nvPicPr>
-          <p:cNvPr id="63" name="" descr=""/>
+          <p:cNvPr id="62" name="Picture 2"/>
           <p:cNvPicPr/>
           <p:nvPr/>
         </p:nvPicPr>
@@ -3145,8 +3982,8 @@
         </p:blipFill>
         <p:spPr>
           <a:xfrm>
-            <a:off x="2103120" y="8439120"/>
-            <a:ext cx="6008760" cy="3448080"/>
+            <a:off x="25001280" y="345600"/>
+            <a:ext cx="7068600" cy="2393280"/>
           </a:xfrm>
           <a:prstGeom prst="rect">
             <a:avLst/>
@@ -3156,8 +3993,34 @@
           </a:ln>
         </p:spPr>
       </p:pic>
+      <p:pic>
+        <p:nvPicPr>
+          <p:cNvPr id="63" name="Picture 62"/>
+          <p:cNvPicPr/>
+          <p:nvPr/>
+        </p:nvPicPr>
+        <p:blipFill>
+          <a:blip r:embed="rId8"/>
+          <a:stretch/>
+        </p:blipFill>
+        <p:spPr>
+          <a:xfrm>
+            <a:off x="2103120" y="8439120"/>
+            <a:ext cx="6008760" cy="3448080"/>
+          </a:xfrm>
+          <a:prstGeom prst="rect">
+            <a:avLst/>
+          </a:prstGeom>
+          <a:ln>
+            <a:noFill/>
+          </a:ln>
+        </p:spPr>
+      </p:pic>
     </p:spTree>
   </p:cSld>
+  <p:clrMapOvr>
+    <a:masterClrMapping/>
+  </p:clrMapOvr>
   <p:timing>
     <p:tnLst>
       <p:par>
@@ -3166,14 +4029,14 @@
             <p:seq>
               <p:cTn id="2" dur="indefinite" nodeType="mainSeq"/>
               <p:prevCondLst>
-                <p:cond delay="0" evt="onPrev">
+                <p:cond evt="onPrev" delay="0">
                   <p:tgtEl>
                     <p:sldTgt/>
                   </p:tgtEl>
                 </p:cond>
               </p:prevCondLst>
               <p:nextCondLst>
-                <p:cond delay="0" evt="onNext">
+                <p:cond evt="onNext" delay="0">
                   <p:tgtEl>
                     <p:sldTgt/>
                   </p:tgtEl>
@@ -3199,34 +4062,34 @@
         <a:sysClr val="window" lastClr="FFFFFF"/>
       </a:lt1>
       <a:dk2>
-        <a:srgbClr val="53585f"/>
+        <a:srgbClr val="53585F"/>
       </a:dk2>
       <a:lt2>
-        <a:srgbClr val="dcdee0"/>
+        <a:srgbClr val="DCDEE0"/>
       </a:lt2>
       <a:accent1>
-        <a:srgbClr val="0365c0"/>
+        <a:srgbClr val="0365C0"/>
       </a:accent1>
       <a:accent2>
-        <a:srgbClr val="00882b"/>
+        <a:srgbClr val="00882B"/>
       </a:accent2>
       <a:accent3>
-        <a:srgbClr val="dcbd23"/>
+        <a:srgbClr val="DCBD23"/>
       </a:accent3>
       <a:accent4>
-        <a:srgbClr val="de6a10"/>
+        <a:srgbClr val="DE6A10"/>
       </a:accent4>
       <a:accent5>
-        <a:srgbClr val="c82506"/>
+        <a:srgbClr val="C82506"/>
       </a:accent5>
       <a:accent6>
-        <a:srgbClr val="773f9b"/>
+        <a:srgbClr val="773F9B"/>
       </a:accent6>
       <a:hlink>
-        <a:srgbClr val="0000ff"/>
+        <a:srgbClr val="0000FF"/>
       </a:hlink>
       <a:folHlink>
-        <a:srgbClr val="ff00ff"/>
+        <a:srgbClr val="FF00FF"/>
       </a:folHlink>
     </a:clrScheme>
     <a:fontScheme name="Office">
@@ -3408,5 +4271,7 @@
       </a:bgFillStyleLst>
     </a:fmtScheme>
   </a:themeElements>
+  <a:objectDefaults/>
+  <a:extraClrSchemeLst/>
 </a:theme>
 </file>
</xml_diff>